<commit_message>
lagt till fler bilder
</commit_message>
<xml_diff>
--- a/groovyseminarie/dokument/groovyseminarium_source_w_logo.pptx
+++ b/groovyseminarie/dokument/groovyseminarium_source_w_logo.pptx
@@ -5,10 +5,10 @@
     <p:sldMasterId id="2147483683" r:id="rId1"/>
   </p:sldMasterIdLst>
   <p:notesMasterIdLst>
-    <p:notesMasterId r:id="rId61"/>
+    <p:notesMasterId r:id="rId62"/>
   </p:notesMasterIdLst>
   <p:handoutMasterIdLst>
-    <p:handoutMasterId r:id="rId62"/>
+    <p:handoutMasterId r:id="rId63"/>
   </p:handoutMasterIdLst>
   <p:sldIdLst>
     <p:sldId id="268" r:id="rId2"/>
@@ -23,53 +23,54 @@
     <p:sldId id="277" r:id="rId11"/>
     <p:sldId id="278" r:id="rId12"/>
     <p:sldId id="279" r:id="rId13"/>
-    <p:sldId id="280" r:id="rId14"/>
-    <p:sldId id="281" r:id="rId15"/>
-    <p:sldId id="282" r:id="rId16"/>
-    <p:sldId id="283" r:id="rId17"/>
-    <p:sldId id="284" r:id="rId18"/>
-    <p:sldId id="285" r:id="rId19"/>
-    <p:sldId id="286" r:id="rId20"/>
-    <p:sldId id="287" r:id="rId21"/>
-    <p:sldId id="288" r:id="rId22"/>
-    <p:sldId id="289" r:id="rId23"/>
-    <p:sldId id="290" r:id="rId24"/>
-    <p:sldId id="291" r:id="rId25"/>
-    <p:sldId id="292" r:id="rId26"/>
-    <p:sldId id="293" r:id="rId27"/>
-    <p:sldId id="294" r:id="rId28"/>
-    <p:sldId id="295" r:id="rId29"/>
-    <p:sldId id="296" r:id="rId30"/>
-    <p:sldId id="297" r:id="rId31"/>
-    <p:sldId id="298" r:id="rId32"/>
-    <p:sldId id="299" r:id="rId33"/>
-    <p:sldId id="300" r:id="rId34"/>
-    <p:sldId id="301" r:id="rId35"/>
-    <p:sldId id="302" r:id="rId36"/>
-    <p:sldId id="303" r:id="rId37"/>
-    <p:sldId id="304" r:id="rId38"/>
-    <p:sldId id="305" r:id="rId39"/>
-    <p:sldId id="306" r:id="rId40"/>
-    <p:sldId id="307" r:id="rId41"/>
-    <p:sldId id="308" r:id="rId42"/>
-    <p:sldId id="309" r:id="rId43"/>
-    <p:sldId id="310" r:id="rId44"/>
-    <p:sldId id="311" r:id="rId45"/>
-    <p:sldId id="312" r:id="rId46"/>
-    <p:sldId id="313" r:id="rId47"/>
-    <p:sldId id="315" r:id="rId48"/>
-    <p:sldId id="316" r:id="rId49"/>
-    <p:sldId id="317" r:id="rId50"/>
-    <p:sldId id="318" r:id="rId51"/>
-    <p:sldId id="319" r:id="rId52"/>
-    <p:sldId id="320" r:id="rId53"/>
-    <p:sldId id="321" r:id="rId54"/>
-    <p:sldId id="322" r:id="rId55"/>
-    <p:sldId id="323" r:id="rId56"/>
-    <p:sldId id="324" r:id="rId57"/>
-    <p:sldId id="325" r:id="rId58"/>
-    <p:sldId id="326" r:id="rId59"/>
-    <p:sldId id="327" r:id="rId60"/>
+    <p:sldId id="328" r:id="rId14"/>
+    <p:sldId id="280" r:id="rId15"/>
+    <p:sldId id="281" r:id="rId16"/>
+    <p:sldId id="282" r:id="rId17"/>
+    <p:sldId id="283" r:id="rId18"/>
+    <p:sldId id="284" r:id="rId19"/>
+    <p:sldId id="285" r:id="rId20"/>
+    <p:sldId id="286" r:id="rId21"/>
+    <p:sldId id="287" r:id="rId22"/>
+    <p:sldId id="288" r:id="rId23"/>
+    <p:sldId id="289" r:id="rId24"/>
+    <p:sldId id="290" r:id="rId25"/>
+    <p:sldId id="291" r:id="rId26"/>
+    <p:sldId id="292" r:id="rId27"/>
+    <p:sldId id="293" r:id="rId28"/>
+    <p:sldId id="294" r:id="rId29"/>
+    <p:sldId id="295" r:id="rId30"/>
+    <p:sldId id="296" r:id="rId31"/>
+    <p:sldId id="297" r:id="rId32"/>
+    <p:sldId id="298" r:id="rId33"/>
+    <p:sldId id="299" r:id="rId34"/>
+    <p:sldId id="300" r:id="rId35"/>
+    <p:sldId id="301" r:id="rId36"/>
+    <p:sldId id="302" r:id="rId37"/>
+    <p:sldId id="303" r:id="rId38"/>
+    <p:sldId id="304" r:id="rId39"/>
+    <p:sldId id="305" r:id="rId40"/>
+    <p:sldId id="306" r:id="rId41"/>
+    <p:sldId id="307" r:id="rId42"/>
+    <p:sldId id="308" r:id="rId43"/>
+    <p:sldId id="309" r:id="rId44"/>
+    <p:sldId id="310" r:id="rId45"/>
+    <p:sldId id="311" r:id="rId46"/>
+    <p:sldId id="312" r:id="rId47"/>
+    <p:sldId id="313" r:id="rId48"/>
+    <p:sldId id="315" r:id="rId49"/>
+    <p:sldId id="316" r:id="rId50"/>
+    <p:sldId id="317" r:id="rId51"/>
+    <p:sldId id="318" r:id="rId52"/>
+    <p:sldId id="319" r:id="rId53"/>
+    <p:sldId id="320" r:id="rId54"/>
+    <p:sldId id="321" r:id="rId55"/>
+    <p:sldId id="322" r:id="rId56"/>
+    <p:sldId id="323" r:id="rId57"/>
+    <p:sldId id="324" r:id="rId58"/>
+    <p:sldId id="325" r:id="rId59"/>
+    <p:sldId id="326" r:id="rId60"/>
+    <p:sldId id="327" r:id="rId61"/>
   </p:sldIdLst>
   <p:sldSz cx="9144000" cy="6858000" type="screen4x3"/>
   <p:notesSz cx="6711950" cy="9844088"/>
@@ -4554,12 +4555,6 @@
             <a:pPr>
               <a:buNone/>
             </a:pPr>
-            <a:r>
-              <a:rPr lang="sv-SE" dirty="0" smtClean="0"/>
-              <a:t>[bild på kod med vingar]</a:t>
-            </a:r>
-          </a:p>
-          <a:p>
             <a:endParaRPr lang="sv-SE" dirty="0"/>
           </a:p>
         </p:txBody>
@@ -4662,6 +4657,13 @@
   <p:clrMapOvr>
     <a:masterClrMapping/>
   </p:clrMapOvr>
+  <p:timing>
+    <p:tnLst>
+      <p:par>
+        <p:cTn id="1" dur="indefinite" restart="never" nodeType="tmRoot"/>
+      </p:par>
+    </p:tnLst>
+  </p:timing>
 </p:sld>
 </file>
 
@@ -4722,13 +4724,25 @@
           <a:p>
             <a:r>
               <a:rPr lang="sv-SE" dirty="0" smtClean="0"/>
-              <a:t>Program som ändrar program, inklusive sig själv</a:t>
-            </a:r>
-          </a:p>
-          <a:p>
-            <a:r>
-              <a:rPr lang="sv-SE" dirty="0" smtClean="0"/>
-              <a:t>Skapa klasser och metoder medan programmet körs</a:t>
+              <a:t>Program som ändrar program, </a:t>
+            </a:r>
+            <a:r>
+              <a:rPr lang="sv-SE" dirty="0" smtClean="0"/>
+              <a:t>inklusive </a:t>
+            </a:r>
+            <a:r>
+              <a:rPr lang="sv-SE" dirty="0" smtClean="0"/>
+              <a:t>sig själv</a:t>
+            </a:r>
+          </a:p>
+          <a:p>
+            <a:r>
+              <a:rPr lang="sv-SE" dirty="0" smtClean="0"/>
+              <a:t>Ändra hur språket </a:t>
+            </a:r>
+            <a:r>
+              <a:rPr lang="sv-SE" dirty="0" smtClean="0"/>
+              <a:t>fungerar</a:t>
             </a:r>
           </a:p>
           <a:p>
@@ -4742,7 +4756,11 @@
             </a:r>
             <a:r>
               <a:rPr lang="sv-SE" dirty="0" smtClean="0"/>
-              <a:t> (</a:t>
+              <a:t> </a:t>
+            </a:r>
+            <a:r>
+              <a:rPr lang="sv-SE" dirty="0" smtClean="0"/>
+              <a:t>(</a:t>
             </a:r>
             <a:r>
               <a:rPr lang="sv-SE" dirty="0" err="1" smtClean="0"/>
@@ -4768,10 +4786,58 @@
               <a:rPr lang="sv-SE" dirty="0" smtClean="0"/>
               <a:t>)</a:t>
             </a:r>
-            <a:endParaRPr lang="sv-SE" dirty="0"/>
-          </a:p>
-        </p:txBody>
-      </p:sp>
+            <a:endParaRPr lang="sv-SE" dirty="0" smtClean="0"/>
+          </a:p>
+          <a:p>
+            <a:r>
+              <a:rPr lang="sv-SE" dirty="0" smtClean="0"/>
+              <a:t>Skapa </a:t>
+            </a:r>
+            <a:r>
+              <a:rPr lang="sv-SE" dirty="0" smtClean="0"/>
+              <a:t>klasser och metoder medan programmet </a:t>
+            </a:r>
+            <a:r>
+              <a:rPr lang="sv-SE" dirty="0" smtClean="0"/>
+              <a:t>körs</a:t>
+            </a:r>
+            <a:endParaRPr lang="sv-SE" dirty="0" smtClean="0"/>
+          </a:p>
+        </p:txBody>
+      </p:sp>
+      <p:pic>
+        <p:nvPicPr>
+          <p:cNvPr id="4098" name="Picture 2"/>
+          <p:cNvPicPr>
+            <a:picLocks noChangeAspect="1" noChangeArrowheads="1"/>
+          </p:cNvPicPr>
+          <p:nvPr/>
+        </p:nvPicPr>
+        <p:blipFill>
+          <a:blip r:embed="rId2"/>
+          <a:srcRect/>
+          <a:stretch>
+            <a:fillRect/>
+          </a:stretch>
+        </p:blipFill>
+        <p:spPr bwMode="auto">
+          <a:xfrm>
+            <a:off x="7524300" y="4023360"/>
+            <a:ext cx="1619700" cy="2098766"/>
+          </a:xfrm>
+          <a:prstGeom prst="rect">
+            <a:avLst/>
+          </a:prstGeom>
+          <a:noFill/>
+          <a:ln w="9525">
+            <a:noFill/>
+            <a:miter lim="800000"/>
+            <a:headEnd/>
+            <a:tailEnd/>
+          </a:ln>
+          <a:effectLst/>
+        </p:spPr>
+      </p:pic>
     </p:spTree>
   </p:cSld>
   <p:clrMapOvr>
@@ -4816,22 +4882,12 @@
         </p:nvSpPr>
         <p:spPr/>
         <p:txBody>
-          <a:bodyPr>
-            <a:normAutofit fontScale="90000"/>
-          </a:bodyPr>
-          <a:lstStyle/>
-          <a:p>
-            <a:r>
-              <a:rPr lang="sv-SE" dirty="0" smtClean="0"/>
-              <a:t>GPL(General </a:t>
-            </a:r>
-            <a:r>
-              <a:rPr lang="sv-SE" dirty="0" err="1" smtClean="0"/>
-              <a:t>Purpose</a:t>
-            </a:r>
-            <a:r>
-              <a:rPr lang="sv-SE" dirty="0" smtClean="0"/>
-              <a:t> Languages)</a:t>
+          <a:bodyPr/>
+          <a:lstStyle/>
+          <a:p>
+            <a:r>
+              <a:rPr lang="sv-SE" dirty="0" smtClean="0"/>
+              <a:t>Ändra hur språket fungerar</a:t>
             </a:r>
             <a:endParaRPr lang="sv-SE" dirty="0"/>
           </a:p>
@@ -4849,50 +4905,66 @@
         </p:nvSpPr>
         <p:spPr>
           <a:xfrm>
-            <a:off x="469900" y="2020530"/>
-            <a:ext cx="8229600" cy="4443412"/>
+            <a:off x="469900" y="1576388"/>
+            <a:ext cx="4128226" cy="4443412"/>
           </a:xfrm>
         </p:spPr>
         <p:txBody>
           <a:bodyPr/>
           <a:lstStyle/>
           <a:p>
-            <a:r>
-              <a:rPr lang="sv-SE" dirty="0" smtClean="0"/>
-              <a:t>Java, C, Ruby, </a:t>
+            <a:pPr>
+              <a:buNone/>
+            </a:pPr>
+            <a:r>
+              <a:rPr lang="sv-SE" dirty="0" smtClean="0"/>
+              <a:t>[</a:t>
             </a:r>
             <a:r>
               <a:rPr lang="sv-SE" dirty="0" err="1" smtClean="0"/>
-              <a:t>Groovy</a:t>
-            </a:r>
-            <a:r>
-              <a:rPr lang="sv-SE" dirty="0" smtClean="0"/>
-              <a:t> och liknande språk kallas GPL, General </a:t>
-            </a:r>
-            <a:r>
-              <a:rPr lang="sv-SE" dirty="0" err="1" smtClean="0"/>
-              <a:t>Purpose</a:t>
-            </a:r>
-            <a:r>
-              <a:rPr lang="sv-SE" dirty="0" smtClean="0"/>
-              <a:t> Languages. </a:t>
-            </a:r>
-          </a:p>
-          <a:p>
-            <a:r>
-              <a:rPr lang="sv-SE" dirty="0" smtClean="0"/>
-              <a:t>Har en generell syntax, oberoende av område.</a:t>
-            </a:r>
-          </a:p>
-          <a:p>
-            <a:r>
-              <a:rPr lang="sv-SE" dirty="0" smtClean="0"/>
-              <a:t>Allt går att göra, men det är sällan det enklaste eller snabbaste sättet</a:t>
+              <a:t>Unreadable.groovy</a:t>
+            </a:r>
+            <a:r>
+              <a:rPr lang="sv-SE" dirty="0" smtClean="0"/>
+              <a:t>]</a:t>
             </a:r>
             <a:endParaRPr lang="sv-SE" dirty="0"/>
           </a:p>
         </p:txBody>
       </p:sp>
+      <p:pic>
+        <p:nvPicPr>
+          <p:cNvPr id="3074" name="Picture 2"/>
+          <p:cNvPicPr>
+            <a:picLocks noChangeAspect="1" noChangeArrowheads="1"/>
+          </p:cNvPicPr>
+          <p:nvPr/>
+        </p:nvPicPr>
+        <p:blipFill>
+          <a:blip r:embed="rId2" cstate="print"/>
+          <a:srcRect/>
+          <a:stretch>
+            <a:fillRect/>
+          </a:stretch>
+        </p:blipFill>
+        <p:spPr bwMode="auto">
+          <a:xfrm>
+            <a:off x="6058105" y="2442754"/>
+            <a:ext cx="3085895" cy="3596096"/>
+          </a:xfrm>
+          <a:prstGeom prst="rect">
+            <a:avLst/>
+          </a:prstGeom>
+          <a:noFill/>
+          <a:ln w="9525">
+            <a:noFill/>
+            <a:miter lim="800000"/>
+            <a:headEnd/>
+            <a:tailEnd/>
+          </a:ln>
+          <a:effectLst/>
+        </p:spPr>
+      </p:pic>
     </p:spTree>
   </p:cSld>
   <p:clrMapOvr>
@@ -4935,84 +5007,87 @@
             <p:ph type="title"/>
           </p:nvPr>
         </p:nvSpPr>
-        <p:spPr/>
-        <p:txBody>
-          <a:bodyPr>
-            <a:normAutofit fontScale="90000"/>
-          </a:bodyPr>
-          <a:lstStyle/>
-          <a:p>
-            <a:r>
-              <a:rPr lang="sv-SE" dirty="0" smtClean="0"/>
-              <a:t>DSL (</a:t>
-            </a:r>
-            <a:r>
-              <a:rPr lang="sv-SE" dirty="0" err="1" smtClean="0"/>
-              <a:t>Domain</a:t>
-            </a:r>
-            <a:r>
-              <a:rPr lang="sv-SE" dirty="0" smtClean="0"/>
-              <a:t> </a:t>
-            </a:r>
-            <a:r>
-              <a:rPr lang="sv-SE" dirty="0" err="1" smtClean="0"/>
-              <a:t>Specific</a:t>
-            </a:r>
-            <a:r>
-              <a:rPr lang="sv-SE" dirty="0" smtClean="0"/>
-              <a:t> Languages)</a:t>
-            </a:r>
-            <a:endParaRPr lang="sv-SE" dirty="0"/>
-          </a:p>
-        </p:txBody>
-      </p:sp>
-      <p:sp>
-        <p:nvSpPr>
-          <p:cNvPr id="3" name="Platshållare för innehåll 2"/>
-          <p:cNvSpPr>
-            <a:spLocks noGrp="1"/>
-          </p:cNvSpPr>
-          <p:nvPr>
-            <p:ph idx="1"/>
-          </p:nvPr>
-        </p:nvSpPr>
         <p:spPr>
           <a:xfrm>
-            <a:off x="469900" y="1955215"/>
+            <a:off x="481013" y="349250"/>
+            <a:ext cx="7543800" cy="1375047"/>
+          </a:xfrm>
+        </p:spPr>
+        <p:txBody>
+          <a:bodyPr>
+            <a:normAutofit/>
+          </a:bodyPr>
+          <a:lstStyle/>
+          <a:p>
+            <a:r>
+              <a:rPr lang="sv-SE" dirty="0" smtClean="0"/>
+              <a:t>DSL vs GPL(General </a:t>
+            </a:r>
+            <a:r>
+              <a:rPr lang="sv-SE" dirty="0" err="1" smtClean="0"/>
+              <a:t>Purpose</a:t>
+            </a:r>
+            <a:r>
+              <a:rPr lang="sv-SE" dirty="0" smtClean="0"/>
+              <a:t> Languages)</a:t>
+            </a:r>
+            <a:endParaRPr lang="sv-SE" dirty="0"/>
+          </a:p>
+        </p:txBody>
+      </p:sp>
+      <p:sp>
+        <p:nvSpPr>
+          <p:cNvPr id="3" name="Platshållare för innehåll 2"/>
+          <p:cNvSpPr>
+            <a:spLocks noGrp="1"/>
+          </p:cNvSpPr>
+          <p:nvPr>
+            <p:ph idx="1"/>
+          </p:nvPr>
+        </p:nvSpPr>
+        <p:spPr>
+          <a:xfrm>
+            <a:off x="469900" y="2020530"/>
             <a:ext cx="8229600" cy="4443412"/>
           </a:xfrm>
         </p:spPr>
         <p:txBody>
-          <a:bodyPr>
-            <a:normAutofit/>
-          </a:bodyPr>
-          <a:lstStyle/>
-          <a:p>
-            <a:r>
-              <a:rPr lang="sv-SE" dirty="0" smtClean="0"/>
-              <a:t>Språket är designat utifrån domänen det används i.</a:t>
-            </a:r>
-          </a:p>
-          <a:p>
-            <a:r>
-              <a:rPr lang="sv-SE" dirty="0" smtClean="0"/>
-              <a:t>Går snabbare att utveckla i ett språk som ligger nära problemdomänen</a:t>
-            </a:r>
-          </a:p>
-          <a:p>
-            <a:r>
-              <a:rPr lang="sv-SE" dirty="0" smtClean="0"/>
-              <a:t>Lätt att kommunicera med beställare och användare</a:t>
-            </a:r>
-          </a:p>
-          <a:p>
-            <a:r>
-              <a:rPr lang="sv-SE" dirty="0" smtClean="0"/>
-              <a:t>Koden läsbar även för icke-programmerare</a:t>
-            </a:r>
-          </a:p>
-          <a:p>
-            <a:endParaRPr lang="sv-SE" dirty="0" smtClean="0"/>
+          <a:bodyPr/>
+          <a:lstStyle/>
+          <a:p>
+            <a:r>
+              <a:rPr lang="sv-SE" dirty="0" smtClean="0"/>
+              <a:t>Java, C, Ruby, </a:t>
+            </a:r>
+            <a:r>
+              <a:rPr lang="sv-SE" dirty="0" err="1" smtClean="0"/>
+              <a:t>Groovy</a:t>
+            </a:r>
+            <a:r>
+              <a:rPr lang="sv-SE" dirty="0" smtClean="0"/>
+              <a:t> och liknande språk kallas GPL, General </a:t>
+            </a:r>
+            <a:r>
+              <a:rPr lang="sv-SE" dirty="0" err="1" smtClean="0"/>
+              <a:t>Purpose</a:t>
+            </a:r>
+            <a:r>
+              <a:rPr lang="sv-SE" dirty="0" smtClean="0"/>
+              <a:t> Languages. </a:t>
+            </a:r>
+          </a:p>
+          <a:p>
+            <a:r>
+              <a:rPr lang="sv-SE" dirty="0" smtClean="0"/>
+              <a:t>Har en generell syntax, oberoende av område.</a:t>
+            </a:r>
+          </a:p>
+          <a:p>
+            <a:r>
+              <a:rPr lang="sv-SE" dirty="0" smtClean="0"/>
+              <a:t>Allt går att göra, men det är sällan det enklaste eller snabbaste sättet</a:t>
+            </a:r>
+            <a:endParaRPr lang="sv-SE" dirty="0"/>
           </a:p>
         </p:txBody>
       </p:sp>
@@ -5060,16 +5135,30 @@
         </p:nvSpPr>
         <p:spPr/>
         <p:txBody>
-          <a:bodyPr/>
-          <a:lstStyle/>
-          <a:p>
-            <a:r>
-              <a:rPr lang="sv-SE" dirty="0" smtClean="0"/>
-              <a:t>DSL i </a:t>
+          <a:bodyPr>
+            <a:normAutofit fontScale="90000"/>
+          </a:bodyPr>
+          <a:lstStyle/>
+          <a:p>
+            <a:r>
+              <a:rPr lang="sv-SE" dirty="0" smtClean="0"/>
+              <a:t>DSL (</a:t>
             </a:r>
             <a:r>
               <a:rPr lang="sv-SE" dirty="0" err="1" smtClean="0"/>
-              <a:t>Groovy</a:t>
+              <a:t>Domain</a:t>
+            </a:r>
+            <a:r>
+              <a:rPr lang="sv-SE" dirty="0" smtClean="0"/>
+              <a:t> </a:t>
+            </a:r>
+            <a:r>
+              <a:rPr lang="sv-SE" dirty="0" err="1" smtClean="0"/>
+              <a:t>Specific</a:t>
+            </a:r>
+            <a:r>
+              <a:rPr lang="sv-SE" dirty="0" smtClean="0"/>
+              <a:t> Languages)</a:t>
             </a:r>
             <a:endParaRPr lang="sv-SE" dirty="0"/>
           </a:p>
@@ -5085,23 +5174,73 @@
             <p:ph idx="1"/>
           </p:nvPr>
         </p:nvSpPr>
-        <p:spPr/>
+        <p:spPr>
+          <a:xfrm>
+            <a:off x="469900" y="1589451"/>
+            <a:ext cx="8229600" cy="4443412"/>
+          </a:xfrm>
+        </p:spPr>
         <p:txBody>
           <a:bodyPr>
             <a:normAutofit/>
           </a:bodyPr>
           <a:lstStyle/>
           <a:p>
-            <a:pPr lvl="1">
-              <a:buNone/>
-            </a:pPr>
-            <a:r>
-              <a:rPr lang="sv-SE" dirty="0" smtClean="0">
-                <a:latin typeface="Courier New" pitchFamily="49" charset="0"/>
-                <a:cs typeface="Courier New" pitchFamily="49" charset="0"/>
-              </a:rPr>
-              <a:t>4.days.ago</a:t>
-            </a:r>
+            <a:r>
+              <a:rPr lang="sv-SE" dirty="0" smtClean="0"/>
+              <a:t>Språket är designat utifrån domänen det </a:t>
+            </a:r>
+            <a:r>
+              <a:rPr lang="sv-SE" dirty="0" smtClean="0"/>
+              <a:t>används i.</a:t>
+            </a:r>
+            <a:endParaRPr lang="sv-SE" dirty="0" smtClean="0"/>
+          </a:p>
+          <a:p>
+            <a:r>
+              <a:rPr lang="sv-SE" dirty="0" smtClean="0"/>
+              <a:t>Går snabbare att utveckla i ett språk som ligger nära problemdomänen</a:t>
+            </a:r>
+          </a:p>
+          <a:p>
+            <a:r>
+              <a:rPr lang="sv-SE" dirty="0" smtClean="0"/>
+              <a:t>Ett väl designat DSL kan användas i kommunikation med icke-programmerare, </a:t>
+            </a:r>
+            <a:r>
+              <a:rPr lang="sv-SE" dirty="0" err="1" smtClean="0"/>
+              <a:t>tex</a:t>
+            </a:r>
+            <a:r>
+              <a:rPr lang="sv-SE" dirty="0" smtClean="0"/>
+              <a:t> beställare </a:t>
+            </a:r>
+            <a:r>
+              <a:rPr lang="sv-SE" dirty="0" smtClean="0"/>
+              <a:t>och användare</a:t>
+            </a:r>
+          </a:p>
+          <a:p>
+            <a:r>
+              <a:rPr lang="sv-SE" dirty="0" smtClean="0"/>
+              <a:t>Exempel på DSL: SQL, </a:t>
+            </a:r>
+            <a:r>
+              <a:rPr lang="sv-SE" dirty="0" smtClean="0"/>
+              <a:t>HTML, </a:t>
+            </a:r>
+            <a:r>
+              <a:rPr lang="sv-SE" dirty="0" smtClean="0"/>
+              <a:t>CSS, </a:t>
+            </a:r>
+            <a:r>
+              <a:rPr lang="sv-SE" dirty="0" err="1" smtClean="0"/>
+              <a:t>Ant</a:t>
+            </a:r>
+            <a:endParaRPr lang="sv-SE" dirty="0" smtClean="0"/>
+          </a:p>
+          <a:p>
+            <a:endParaRPr lang="sv-SE" dirty="0" smtClean="0"/>
           </a:p>
         </p:txBody>
       </p:sp>
@@ -5189,21 +5328,7 @@
                 <a:latin typeface="Courier New" pitchFamily="49" charset="0"/>
                 <a:cs typeface="Courier New" pitchFamily="49" charset="0"/>
               </a:rPr>
-              <a:t>[</a:t>
-            </a:r>
-            <a:r>
-              <a:rPr lang="sv-SE" dirty="0" err="1" smtClean="0">
-                <a:latin typeface="Courier New" pitchFamily="49" charset="0"/>
-                <a:cs typeface="Courier New" pitchFamily="49" charset="0"/>
-              </a:rPr>
-              <a:t>DaysAgo.groovy</a:t>
-            </a:r>
-            <a:r>
-              <a:rPr lang="sv-SE" dirty="0" smtClean="0">
-                <a:latin typeface="Courier New" pitchFamily="49" charset="0"/>
-                <a:cs typeface="Courier New" pitchFamily="49" charset="0"/>
-              </a:rPr>
-              <a:t>]</a:t>
+              <a:t>4.days.ago</a:t>
             </a:r>
           </a:p>
         </p:txBody>
@@ -5261,7 +5386,7 @@
             </a:r>
             <a:r>
               <a:rPr lang="sv-SE" dirty="0" err="1" smtClean="0"/>
-              <a:t>Grails</a:t>
+              <a:t>Groovy</a:t>
             </a:r>
             <a:endParaRPr lang="sv-SE" dirty="0"/>
           </a:p>
@@ -5279,25 +5404,35 @@
         </p:nvSpPr>
         <p:spPr/>
         <p:txBody>
-          <a:bodyPr/>
-          <a:lstStyle/>
-          <a:p>
-            <a:pPr>
+          <a:bodyPr>
+            <a:normAutofit/>
+          </a:bodyPr>
+          <a:lstStyle/>
+          <a:p>
+            <a:pPr lvl="1">
               <a:buNone/>
             </a:pPr>
             <a:r>
-              <a:rPr lang="sv-SE" dirty="0" smtClean="0"/>
+              <a:rPr lang="sv-SE" dirty="0" smtClean="0">
+                <a:latin typeface="Courier New" pitchFamily="49" charset="0"/>
+                <a:cs typeface="Courier New" pitchFamily="49" charset="0"/>
+              </a:rPr>
               <a:t>[</a:t>
             </a:r>
             <a:r>
-              <a:rPr lang="sv-SE" dirty="0" err="1" smtClean="0"/>
-              <a:t>GrailsDomainClass.groovy</a:t>
-            </a:r>
-            <a:r>
-              <a:rPr lang="sv-SE" dirty="0" smtClean="0"/>
+              <a:rPr lang="sv-SE" dirty="0" err="1" smtClean="0">
+                <a:latin typeface="Courier New" pitchFamily="49" charset="0"/>
+                <a:cs typeface="Courier New" pitchFamily="49" charset="0"/>
+              </a:rPr>
+              <a:t>DaysAgo.groovy</a:t>
+            </a:r>
+            <a:r>
+              <a:rPr lang="sv-SE" dirty="0" smtClean="0">
+                <a:latin typeface="Courier New" pitchFamily="49" charset="0"/>
+                <a:cs typeface="Courier New" pitchFamily="49" charset="0"/>
+              </a:rPr>
               <a:t>]</a:t>
             </a:r>
-            <a:endParaRPr lang="sv-SE" dirty="0"/>
           </a:p>
         </p:txBody>
       </p:sp>
@@ -5306,6 +5441,13 @@
   <p:clrMapOvr>
     <a:masterClrMapping/>
   </p:clrMapOvr>
+  <p:timing>
+    <p:tnLst>
+      <p:par>
+        <p:cTn id="1" dur="indefinite" restart="never" nodeType="tmRoot"/>
+      </p:par>
+    </p:tnLst>
+  </p:timing>
 </p:sld>
 </file>
 
@@ -5338,131 +5480,89 @@
         </p:nvSpPr>
         <p:spPr/>
         <p:txBody>
-          <a:bodyPr>
-            <a:normAutofit/>
-          </a:bodyPr>
-          <a:lstStyle/>
-          <a:p>
-            <a:r>
-              <a:rPr lang="sv-SE" dirty="0" smtClean="0"/>
-              <a:t>Varför </a:t>
+          <a:bodyPr/>
+          <a:lstStyle/>
+          <a:p>
+            <a:r>
+              <a:rPr lang="sv-SE" dirty="0" smtClean="0"/>
+              <a:t>DSL i</a:t>
+            </a:r>
+            <a:endParaRPr lang="sv-SE" dirty="0"/>
+          </a:p>
+        </p:txBody>
+      </p:sp>
+      <p:sp>
+        <p:nvSpPr>
+          <p:cNvPr id="3" name="Platshållare för innehåll 2"/>
+          <p:cNvSpPr>
+            <a:spLocks noGrp="1"/>
+          </p:cNvSpPr>
+          <p:nvPr>
+            <p:ph idx="1"/>
+          </p:nvPr>
+        </p:nvSpPr>
+        <p:spPr>
+          <a:xfrm>
+            <a:off x="469900" y="1044116"/>
+            <a:ext cx="8229600" cy="4443412"/>
+          </a:xfrm>
+        </p:spPr>
+        <p:txBody>
+          <a:bodyPr/>
+          <a:lstStyle/>
+          <a:p>
+            <a:pPr>
+              <a:buNone/>
+            </a:pPr>
+            <a:r>
+              <a:rPr lang="sv-SE" dirty="0" smtClean="0"/>
+              <a:t>[</a:t>
             </a:r>
             <a:r>
               <a:rPr lang="sv-SE" dirty="0" err="1" smtClean="0"/>
-              <a:t>Groovy</a:t>
-            </a:r>
-            <a:r>
-              <a:rPr lang="sv-SE" dirty="0" smtClean="0"/>
-              <a:t>?</a:t>
+              <a:t>GrailsDomainClass.groovy</a:t>
+            </a:r>
+            <a:r>
+              <a:rPr lang="sv-SE" dirty="0" smtClean="0"/>
+              <a:t>]</a:t>
             </a:r>
             <a:endParaRPr lang="sv-SE" dirty="0"/>
           </a:p>
         </p:txBody>
       </p:sp>
-      <p:sp>
-        <p:nvSpPr>
-          <p:cNvPr id="3" name="Platshållare för innehåll 2"/>
-          <p:cNvSpPr>
-            <a:spLocks noGrp="1"/>
-          </p:cNvSpPr>
-          <p:nvPr>
-            <p:ph idx="1"/>
-          </p:nvPr>
-        </p:nvSpPr>
-        <p:spPr/>
-        <p:txBody>
-          <a:bodyPr>
-            <a:normAutofit fontScale="92500" lnSpcReduction="10000"/>
-          </a:bodyPr>
-          <a:lstStyle/>
-          <a:p>
-            <a:r>
-              <a:rPr lang="sv-SE" dirty="0" smtClean="0"/>
-              <a:t>Det finns andra dynamiska språk som kan köras på Java-plattformen, med stöd för metaprogrammering och </a:t>
-            </a:r>
-            <a:r>
-              <a:rPr lang="sv-SE" dirty="0" err="1" smtClean="0"/>
-              <a:t>closures</a:t>
-            </a:r>
-            <a:endParaRPr lang="sv-SE" dirty="0" smtClean="0"/>
-          </a:p>
-          <a:p>
-            <a:r>
-              <a:rPr lang="sv-SE" dirty="0" smtClean="0"/>
-              <a:t>Sammanlagt över 150 språk kan köras på  Java-plattformen</a:t>
-            </a:r>
-          </a:p>
-          <a:p>
-            <a:pPr lvl="1"/>
-            <a:r>
-              <a:rPr lang="sv-SE" dirty="0" smtClean="0"/>
-              <a:t>Java</a:t>
-            </a:r>
-          </a:p>
-          <a:p>
-            <a:pPr lvl="1"/>
-            <a:r>
-              <a:rPr lang="sv-SE" dirty="0" smtClean="0"/>
-              <a:t>Ruby (</a:t>
-            </a:r>
-            <a:r>
-              <a:rPr lang="sv-SE" dirty="0" err="1" smtClean="0"/>
-              <a:t>JRuby</a:t>
-            </a:r>
-            <a:r>
-              <a:rPr lang="sv-SE" dirty="0" smtClean="0"/>
-              <a:t>)</a:t>
-            </a:r>
-          </a:p>
-          <a:p>
-            <a:pPr lvl="1"/>
-            <a:r>
-              <a:rPr lang="sv-SE" dirty="0" err="1" smtClean="0"/>
-              <a:t>Python</a:t>
-            </a:r>
-            <a:r>
-              <a:rPr lang="sv-SE" dirty="0" smtClean="0"/>
-              <a:t> (</a:t>
-            </a:r>
-            <a:r>
-              <a:rPr lang="sv-SE" dirty="0" err="1" smtClean="0"/>
-              <a:t>Jython</a:t>
-            </a:r>
-            <a:r>
-              <a:rPr lang="sv-SE" dirty="0" smtClean="0"/>
-              <a:t>)</a:t>
-            </a:r>
-          </a:p>
-          <a:p>
-            <a:pPr lvl="1"/>
-            <a:r>
-              <a:rPr lang="sv-SE" dirty="0" err="1" smtClean="0"/>
-              <a:t>BeanShell</a:t>
-            </a:r>
-            <a:endParaRPr lang="sv-SE" dirty="0" smtClean="0"/>
-          </a:p>
-          <a:p>
-            <a:r>
-              <a:rPr lang="sv-SE" dirty="0" smtClean="0"/>
-              <a:t>Varför </a:t>
-            </a:r>
-            <a:r>
-              <a:rPr lang="sv-SE" dirty="0" err="1" smtClean="0"/>
-              <a:t>Groovy</a:t>
-            </a:r>
-            <a:r>
-              <a:rPr lang="sv-SE" dirty="0" smtClean="0"/>
-              <a:t>?</a:t>
-            </a:r>
-          </a:p>
-          <a:p>
-            <a:pPr lvl="1">
-              <a:buNone/>
-            </a:pPr>
-            <a:endParaRPr lang="sv-SE" dirty="0" smtClean="0"/>
-          </a:p>
-        </p:txBody>
-      </p:sp>
+      <p:pic>
+        <p:nvPicPr>
+          <p:cNvPr id="5123" name="Picture 3"/>
+          <p:cNvPicPr>
+            <a:picLocks noChangeAspect="1" noChangeArrowheads="1"/>
+          </p:cNvPicPr>
+          <p:nvPr/>
+        </p:nvPicPr>
+        <p:blipFill>
+          <a:blip r:embed="rId2"/>
+          <a:srcRect/>
+          <a:stretch>
+            <a:fillRect/>
+          </a:stretch>
+        </p:blipFill>
+        <p:spPr bwMode="auto">
+          <a:xfrm>
+            <a:off x="1956322" y="599781"/>
+            <a:ext cx="2028825" cy="561975"/>
+          </a:xfrm>
+          <a:prstGeom prst="rect">
+            <a:avLst/>
+          </a:prstGeom>
+          <a:noFill/>
+          <a:ln w="9525">
+            <a:noFill/>
+            <a:miter lim="800000"/>
+            <a:headEnd/>
+            <a:tailEnd/>
+          </a:ln>
+          <a:effectLst/>
+        </p:spPr>
+      </p:pic>
     </p:spTree>
   </p:cSld>
   <p:clrMapOvr>
@@ -5507,17 +5607,23 @@
         </p:nvSpPr>
         <p:spPr/>
         <p:txBody>
-          <a:bodyPr/>
-          <a:lstStyle/>
-          <a:p>
-            <a:r>
-              <a:rPr lang="sv-SE" dirty="0" smtClean="0"/>
-              <a:t>Fördelar med </a:t>
+          <a:bodyPr>
+            <a:normAutofit/>
+          </a:bodyPr>
+          <a:lstStyle/>
+          <a:p>
+            <a:r>
+              <a:rPr lang="sv-SE" dirty="0" smtClean="0"/>
+              <a:t>Varför </a:t>
             </a:r>
             <a:r>
               <a:rPr lang="sv-SE" dirty="0" err="1" smtClean="0"/>
               <a:t>Groovy</a:t>
             </a:r>
+            <a:r>
+              <a:rPr lang="sv-SE" dirty="0" smtClean="0"/>
+              <a:t>?</a:t>
+            </a:r>
             <a:endParaRPr lang="sv-SE" dirty="0"/>
           </a:p>
         </p:txBody>
@@ -5534,44 +5640,131 @@
         </p:nvSpPr>
         <p:spPr/>
         <p:txBody>
-          <a:bodyPr/>
-          <a:lstStyle/>
-          <a:p>
-            <a:r>
-              <a:rPr lang="sv-SE" dirty="0" smtClean="0"/>
-              <a:t>Enkelt att lära för en Javaprogrammerare</a:t>
-            </a:r>
-          </a:p>
-          <a:p>
-            <a:r>
-              <a:rPr lang="sv-SE" dirty="0" smtClean="0"/>
-              <a:t>Helt kompatibelt med existerande Javaprojekt</a:t>
-            </a:r>
-          </a:p>
-          <a:p>
+          <a:bodyPr>
+            <a:normAutofit fontScale="92500" lnSpcReduction="10000"/>
+          </a:bodyPr>
+          <a:lstStyle/>
+          <a:p>
+            <a:r>
+              <a:rPr lang="sv-SE" dirty="0" smtClean="0"/>
+              <a:t>Det finns andra dynamiska språk som kan köras på Java-plattformen, med stöd för metaprogrammering och </a:t>
+            </a:r>
+            <a:r>
+              <a:rPr lang="sv-SE" dirty="0" err="1" smtClean="0"/>
+              <a:t>closures</a:t>
+            </a:r>
+            <a:endParaRPr lang="sv-SE" dirty="0" smtClean="0"/>
+          </a:p>
+          <a:p>
+            <a:r>
+              <a:rPr lang="sv-SE" dirty="0" smtClean="0"/>
+              <a:t>Sammanlagt över 150 språk kan köras på  Java-plattformen</a:t>
+            </a:r>
+          </a:p>
+          <a:p>
+            <a:pPr lvl="1"/>
+            <a:r>
+              <a:rPr lang="sv-SE" dirty="0" smtClean="0"/>
+              <a:t>Java</a:t>
+            </a:r>
+          </a:p>
+          <a:p>
+            <a:pPr lvl="1"/>
+            <a:r>
+              <a:rPr lang="sv-SE" dirty="0" smtClean="0"/>
+              <a:t>Ruby (</a:t>
+            </a:r>
+            <a:r>
+              <a:rPr lang="sv-SE" dirty="0" err="1" smtClean="0"/>
+              <a:t>JRuby</a:t>
+            </a:r>
+            <a:r>
+              <a:rPr lang="sv-SE" dirty="0" smtClean="0"/>
+              <a:t>)</a:t>
+            </a:r>
+          </a:p>
+          <a:p>
+            <a:pPr lvl="1"/>
+            <a:r>
+              <a:rPr lang="sv-SE" dirty="0" err="1" smtClean="0"/>
+              <a:t>Python</a:t>
+            </a:r>
+            <a:r>
+              <a:rPr lang="sv-SE" dirty="0" smtClean="0"/>
+              <a:t> (</a:t>
+            </a:r>
+            <a:r>
+              <a:rPr lang="sv-SE" dirty="0" err="1" smtClean="0"/>
+              <a:t>Jython</a:t>
+            </a:r>
+            <a:r>
+              <a:rPr lang="sv-SE" dirty="0" smtClean="0"/>
+              <a:t>)</a:t>
+            </a:r>
+          </a:p>
+          <a:p>
+            <a:pPr lvl="1"/>
+            <a:r>
+              <a:rPr lang="sv-SE" dirty="0" err="1" smtClean="0"/>
+              <a:t>BeanShell</a:t>
+            </a:r>
+            <a:endParaRPr lang="sv-SE" dirty="0" smtClean="0"/>
+          </a:p>
+          <a:p>
+            <a:r>
+              <a:rPr lang="sv-SE" dirty="0" smtClean="0"/>
+              <a:t>Varför </a:t>
+            </a:r>
             <a:r>
               <a:rPr lang="sv-SE" dirty="0" err="1" smtClean="0"/>
               <a:t>Groovy</a:t>
             </a:r>
             <a:r>
               <a:rPr lang="sv-SE" dirty="0" smtClean="0"/>
-              <a:t> ÄR Java – kompileras till .</a:t>
-            </a:r>
-            <a:r>
-              <a:rPr lang="sv-SE" dirty="0" err="1" smtClean="0"/>
-              <a:t>class-filer</a:t>
-            </a:r>
+              <a:t>?</a:t>
+            </a:r>
+          </a:p>
+          <a:p>
+            <a:pPr lvl="1">
+              <a:buNone/>
+            </a:pPr>
             <a:endParaRPr lang="sv-SE" dirty="0" smtClean="0"/>
           </a:p>
-          <a:p>
-            <a:r>
-              <a:rPr lang="sv-SE" dirty="0" smtClean="0"/>
-              <a:t>Utökar JDK för att förenkla utveckling</a:t>
-            </a:r>
-            <a:endParaRPr lang="sv-SE" dirty="0"/>
-          </a:p>
-        </p:txBody>
-      </p:sp>
+        </p:txBody>
+      </p:sp>
+      <p:pic>
+        <p:nvPicPr>
+          <p:cNvPr id="6146" name="Picture 2"/>
+          <p:cNvPicPr>
+            <a:picLocks noChangeAspect="1" noChangeArrowheads="1"/>
+          </p:cNvPicPr>
+          <p:nvPr/>
+        </p:nvPicPr>
+        <p:blipFill>
+          <a:blip r:embed="rId2"/>
+          <a:srcRect/>
+          <a:stretch>
+            <a:fillRect/>
+          </a:stretch>
+        </p:blipFill>
+        <p:spPr bwMode="auto">
+          <a:xfrm>
+            <a:off x="5175924" y="3603594"/>
+            <a:ext cx="3968075" cy="2499887"/>
+          </a:xfrm>
+          <a:prstGeom prst="rect">
+            <a:avLst/>
+          </a:prstGeom>
+          <a:noFill/>
+          <a:ln w="9525">
+            <a:noFill/>
+            <a:miter lim="800000"/>
+            <a:headEnd/>
+            <a:tailEnd/>
+          </a:ln>
+          <a:effectLst/>
+        </p:spPr>
+      </p:pic>
     </p:spTree>
   </p:cSld>
   <p:clrMapOvr>
@@ -5776,11 +5969,11 @@
           <a:p>
             <a:r>
               <a:rPr lang="sv-SE" dirty="0" smtClean="0"/>
-              <a:t>Enkelt att lära: </a:t>
+              <a:t>Fördelar med </a:t>
             </a:r>
             <a:r>
               <a:rPr lang="sv-SE" dirty="0" err="1" smtClean="0"/>
-              <a:t>HelloWorld.java</a:t>
+              <a:t>Groovy</a:t>
             </a:r>
             <a:endParaRPr lang="sv-SE" dirty="0"/>
           </a:p>
@@ -5801,23 +5994,37 @@
           <a:bodyPr/>
           <a:lstStyle/>
           <a:p>
-            <a:pPr>
-              <a:buNone/>
-            </a:pPr>
-            <a:r>
-              <a:rPr lang="sv-SE" dirty="0" smtClean="0"/>
-              <a:t>[</a:t>
-            </a:r>
+            <a:r>
+              <a:rPr lang="sv-SE" dirty="0" smtClean="0"/>
+              <a:t>Enkelt att lära för en Javaprogrammerare</a:t>
+            </a:r>
+          </a:p>
+          <a:p>
+            <a:r>
+              <a:rPr lang="sv-SE" dirty="0" smtClean="0"/>
+              <a:t>Helt kompatibelt med existerande Javaprojekt</a:t>
+            </a:r>
+          </a:p>
+          <a:p>
             <a:r>
               <a:rPr lang="sv-SE" dirty="0" err="1" smtClean="0"/>
-              <a:t>helloWorld.java</a:t>
-            </a:r>
-            <a:r>
-              <a:rPr lang="sv-SE" dirty="0" smtClean="0"/>
-              <a:t>]</a:t>
-            </a:r>
-          </a:p>
-          <a:p>
+              <a:t>Groovy</a:t>
+            </a:r>
+            <a:r>
+              <a:rPr lang="sv-SE" dirty="0" smtClean="0"/>
+              <a:t> ÄR Java – kompileras till .</a:t>
+            </a:r>
+            <a:r>
+              <a:rPr lang="sv-SE" dirty="0" err="1" smtClean="0"/>
+              <a:t>class-filer</a:t>
+            </a:r>
+            <a:endParaRPr lang="sv-SE" dirty="0" smtClean="0"/>
+          </a:p>
+          <a:p>
+            <a:r>
+              <a:rPr lang="sv-SE" dirty="0" smtClean="0"/>
+              <a:t>Utökar JDK för att förenkla utveckling</a:t>
+            </a:r>
             <a:endParaRPr lang="sv-SE" dirty="0"/>
           </a:p>
         </p:txBody>
@@ -5827,6 +6034,13 @@
   <p:clrMapOvr>
     <a:masterClrMapping/>
   </p:clrMapOvr>
+  <p:timing>
+    <p:tnLst>
+      <p:par>
+        <p:cTn id="1" dur="indefinite" restart="never" nodeType="tmRoot"/>
+      </p:par>
+    </p:tnLst>
+  </p:timing>
 </p:sld>
 </file>
 
@@ -5863,8 +6077,12 @@
           <a:lstStyle/>
           <a:p>
             <a:r>
+              <a:rPr lang="sv-SE" dirty="0" smtClean="0"/>
+              <a:t>Enkelt att lära: </a:t>
+            </a:r>
+            <a:r>
               <a:rPr lang="sv-SE" dirty="0" err="1" smtClean="0"/>
-              <a:t>HelloWorld.groovy</a:t>
+              <a:t>HelloWorld.java</a:t>
             </a:r>
             <a:endParaRPr lang="sv-SE" dirty="0"/>
           </a:p>
@@ -5894,7 +6112,7 @@
             </a:r>
             <a:r>
               <a:rPr lang="sv-SE" dirty="0" err="1" smtClean="0"/>
-              <a:t>helloWorld.groovy</a:t>
+              <a:t>helloWorld.java</a:t>
             </a:r>
             <a:r>
               <a:rPr lang="sv-SE" dirty="0" smtClean="0"/>
@@ -5911,6 +6129,13 @@
   <p:clrMapOvr>
     <a:masterClrMapping/>
   </p:clrMapOvr>
+  <p:timing>
+    <p:tnLst>
+      <p:par>
+        <p:cTn id="1" dur="indefinite" restart="never" nodeType="tmRoot"/>
+      </p:par>
+    </p:tnLst>
+  </p:timing>
 </p:sld>
 </file>
 
@@ -5941,48 +6166,55 @@
             <p:ph type="title"/>
           </p:nvPr>
         </p:nvSpPr>
-        <p:spPr>
-          <a:xfrm>
-            <a:off x="481013" y="349250"/>
-            <a:ext cx="7543800" cy="1283607"/>
-          </a:xfrm>
-        </p:spPr>
-        <p:txBody>
-          <a:bodyPr>
-            <a:normAutofit/>
-          </a:bodyPr>
-          <a:lstStyle/>
-          <a:p>
-            <a:r>
-              <a:rPr lang="sv-SE" dirty="0" smtClean="0"/>
-              <a:t>Helt kompatibelt med existerande Javaprojekt</a:t>
-            </a:r>
-          </a:p>
-        </p:txBody>
-      </p:sp>
-      <p:pic>
-        <p:nvPicPr>
-          <p:cNvPr id="10" name="Platshållare för innehåll 7" descr="groovyOnJvm.gif"/>
-          <p:cNvPicPr>
-            <a:picLocks noGrp="1" noChangeAspect="1"/>
-          </p:cNvPicPr>
+        <p:spPr/>
+        <p:txBody>
+          <a:bodyPr/>
+          <a:lstStyle/>
+          <a:p>
+            <a:r>
+              <a:rPr lang="sv-SE" dirty="0" err="1" smtClean="0"/>
+              <a:t>HelloWorld.groovy</a:t>
+            </a:r>
+            <a:endParaRPr lang="sv-SE" dirty="0"/>
+          </a:p>
+        </p:txBody>
+      </p:sp>
+      <p:sp>
+        <p:nvSpPr>
+          <p:cNvPr id="3" name="Platshållare för innehåll 2"/>
+          <p:cNvSpPr>
+            <a:spLocks noGrp="1"/>
+          </p:cNvSpPr>
           <p:nvPr>
             <p:ph idx="1"/>
           </p:nvPr>
-        </p:nvPicPr>
-        <p:blipFill>
-          <a:blip r:embed="rId2"/>
-          <a:stretch>
-            <a:fillRect/>
-          </a:stretch>
-        </p:blipFill>
-        <p:spPr>
-          <a:xfrm>
-            <a:off x="1192260" y="1600200"/>
-            <a:ext cx="6759479" cy="4525963"/>
-          </a:xfrm>
-        </p:spPr>
-      </p:pic>
+        </p:nvSpPr>
+        <p:spPr/>
+        <p:txBody>
+          <a:bodyPr/>
+          <a:lstStyle/>
+          <a:p>
+            <a:pPr>
+              <a:buNone/>
+            </a:pPr>
+            <a:r>
+              <a:rPr lang="sv-SE" dirty="0" smtClean="0"/>
+              <a:t>[</a:t>
+            </a:r>
+            <a:r>
+              <a:rPr lang="sv-SE" dirty="0" err="1" smtClean="0"/>
+              <a:t>helloWorld.groovy</a:t>
+            </a:r>
+            <a:r>
+              <a:rPr lang="sv-SE" dirty="0" smtClean="0"/>
+              <a:t>]</a:t>
+            </a:r>
+          </a:p>
+          <a:p>
+            <a:endParaRPr lang="sv-SE" dirty="0"/>
+          </a:p>
+        </p:txBody>
+      </p:sp>
     </p:spTree>
   </p:cSld>
   <p:clrMapOvr>
@@ -6028,7 +6260,7 @@
         <p:spPr>
           <a:xfrm>
             <a:off x="481013" y="349250"/>
-            <a:ext cx="7543800" cy="1492613"/>
+            <a:ext cx="7543800" cy="1283607"/>
           </a:xfrm>
         </p:spPr>
         <p:txBody>
@@ -6039,75 +6271,46 @@
           <a:p>
             <a:r>
               <a:rPr lang="sv-SE" dirty="0" smtClean="0"/>
-              <a:t>Utökar JDK för att förenkla utveckling</a:t>
-            </a:r>
-            <a:endParaRPr lang="sv-SE" dirty="0"/>
-          </a:p>
-        </p:txBody>
-      </p:sp>
-      <p:sp>
-        <p:nvSpPr>
-          <p:cNvPr id="4" name="Platshållare för innehåll 2"/>
-          <p:cNvSpPr txBox="1">
-            <a:spLocks/>
-          </p:cNvSpPr>
-          <p:nvPr/>
-        </p:nvSpPr>
+              <a:t>Helt kompatibelt med existerande Javaprojekt</a:t>
+            </a:r>
+          </a:p>
+        </p:txBody>
+      </p:sp>
+      <p:pic>
+        <p:nvPicPr>
+          <p:cNvPr id="10" name="Platshållare för innehåll 7" descr="groovyOnJvm.gif"/>
+          <p:cNvPicPr>
+            <a:picLocks noGrp="1" noChangeAspect="1"/>
+          </p:cNvPicPr>
+          <p:nvPr>
+            <p:ph idx="1"/>
+          </p:nvPr>
+        </p:nvPicPr>
+        <p:blipFill>
+          <a:blip r:embed="rId2"/>
+          <a:stretch>
+            <a:fillRect/>
+          </a:stretch>
+        </p:blipFill>
         <p:spPr>
           <a:xfrm>
-            <a:off x="376345" y="2283130"/>
-            <a:ext cx="8229600" cy="2286016"/>
+            <a:off x="1192260" y="1600200"/>
+            <a:ext cx="6759479" cy="4525963"/>
           </a:xfrm>
-          <a:prstGeom prst="rect">
-            <a:avLst/>
-          </a:prstGeom>
         </p:spPr>
-        <p:txBody>
-          <a:bodyPr vert="horz" lIns="91440" tIns="45720" rIns="91440" bIns="45720" rtlCol="0">
-            <a:normAutofit/>
-          </a:bodyPr>
-          <a:lstStyle/>
-          <a:p>
-            <a:pPr marL="342900" indent="-342900">
-              <a:spcBef>
-                <a:spcPct val="20000"/>
-              </a:spcBef>
-            </a:pPr>
-            <a:r>
-              <a:rPr lang="sv-SE" sz="3200" dirty="0" smtClean="0"/>
-              <a:t>Utmaning: Hur läser man en fil i Java?</a:t>
-            </a:r>
-          </a:p>
-          <a:p>
-            <a:pPr marL="342900" marR="0" lvl="0" indent="-342900" algn="l" defTabSz="914400" rtl="0" eaLnBrk="1" fontAlgn="auto" latinLnBrk="0" hangingPunct="1">
-              <a:lnSpc>
-                <a:spcPct val="100000"/>
-              </a:lnSpc>
-              <a:spcBef>
-                <a:spcPct val="20000"/>
-              </a:spcBef>
-              <a:spcAft>
-                <a:spcPts val="0"/>
-              </a:spcAft>
-              <a:buClrTx/>
-              <a:buSzTx/>
-              <a:buFont typeface="Arial" pitchFamily="34" charset="0"/>
-              <a:buNone/>
-              <a:tabLst/>
-              <a:defRPr/>
-            </a:pPr>
-            <a:r>
-              <a:rPr lang="sv-SE" sz="3200" dirty="0" smtClean="0"/>
-              <a:t> </a:t>
-            </a:r>
-          </a:p>
-        </p:txBody>
-      </p:sp>
+      </p:pic>
     </p:spTree>
   </p:cSld>
   <p:clrMapOvr>
     <a:masterClrMapping/>
   </p:clrMapOvr>
+  <p:timing>
+    <p:tnLst>
+      <p:par>
+        <p:cTn id="1" dur="indefinite" restart="never" nodeType="tmRoot"/>
+      </p:par>
+    </p:tnLst>
+  </p:timing>
 </p:sld>
 </file>
 
@@ -6138,14 +6341,21 @@
             <p:ph type="title"/>
           </p:nvPr>
         </p:nvSpPr>
-        <p:spPr/>
-        <p:txBody>
-          <a:bodyPr/>
-          <a:lstStyle/>
-          <a:p>
-            <a:r>
-              <a:rPr lang="sv-SE" dirty="0" smtClean="0"/>
-              <a:t>Läsa fil i Java 1.4</a:t>
+        <p:spPr>
+          <a:xfrm>
+            <a:off x="481013" y="349250"/>
+            <a:ext cx="7543800" cy="1492613"/>
+          </a:xfrm>
+        </p:spPr>
+        <p:txBody>
+          <a:bodyPr>
+            <a:normAutofit/>
+          </a:bodyPr>
+          <a:lstStyle/>
+          <a:p>
+            <a:r>
+              <a:rPr lang="sv-SE" dirty="0" smtClean="0"/>
+              <a:t>Utökar JDK för att förenkla utveckling</a:t>
             </a:r>
             <a:endParaRPr lang="sv-SE" dirty="0"/>
           </a:p>
@@ -6153,35 +6363,107 @@
       </p:sp>
       <p:sp>
         <p:nvSpPr>
-          <p:cNvPr id="3" name="Platshållare för innehåll 2"/>
-          <p:cNvSpPr>
-            <a:spLocks noGrp="1"/>
-          </p:cNvSpPr>
-          <p:nvPr>
-            <p:ph idx="1"/>
-          </p:nvPr>
-        </p:nvSpPr>
-        <p:spPr/>
-        <p:txBody>
-          <a:bodyPr/>
-          <a:lstStyle/>
-          <a:p>
-            <a:pPr>
-              <a:buNone/>
+          <p:cNvPr id="4" name="Platshållare för innehåll 2"/>
+          <p:cNvSpPr txBox="1">
+            <a:spLocks/>
+          </p:cNvSpPr>
+          <p:nvPr/>
+        </p:nvSpPr>
+        <p:spPr>
+          <a:xfrm>
+            <a:off x="376345" y="2283130"/>
+            <a:ext cx="8229600" cy="2286016"/>
+          </a:xfrm>
+          <a:prstGeom prst="rect">
+            <a:avLst/>
+          </a:prstGeom>
+        </p:spPr>
+        <p:txBody>
+          <a:bodyPr vert="horz" lIns="91440" tIns="45720" rIns="91440" bIns="45720" rtlCol="0">
+            <a:normAutofit/>
+          </a:bodyPr>
+          <a:lstStyle/>
+          <a:p>
+            <a:pPr marL="342900" indent="-342900">
+              <a:spcBef>
+                <a:spcPct val="20000"/>
+              </a:spcBef>
             </a:pPr>
             <a:r>
-              <a:rPr lang="sv-SE" dirty="0" smtClean="0"/>
-              <a:t>[ReadFileJava14.java]</a:t>
-            </a:r>
-            <a:endParaRPr lang="sv-SE" dirty="0"/>
-          </a:p>
-        </p:txBody>
-      </p:sp>
+              <a:rPr lang="sv-SE" sz="3200" dirty="0" smtClean="0"/>
+              <a:t>Utmaning: Hur läser man en fil i Java?</a:t>
+            </a:r>
+          </a:p>
+          <a:p>
+            <a:pPr marL="342900" marR="0" lvl="0" indent="-342900" algn="l" defTabSz="914400" rtl="0" eaLnBrk="1" fontAlgn="auto" latinLnBrk="0" hangingPunct="1">
+              <a:lnSpc>
+                <a:spcPct val="100000"/>
+              </a:lnSpc>
+              <a:spcBef>
+                <a:spcPct val="20000"/>
+              </a:spcBef>
+              <a:spcAft>
+                <a:spcPts val="0"/>
+              </a:spcAft>
+              <a:buClrTx/>
+              <a:buSzTx/>
+              <a:buFont typeface="Arial" pitchFamily="34" charset="0"/>
+              <a:buNone/>
+              <a:tabLst/>
+              <a:defRPr/>
+            </a:pPr>
+            <a:r>
+              <a:rPr lang="sv-SE" sz="3200" dirty="0" smtClean="0"/>
+              <a:t> </a:t>
+            </a:r>
+          </a:p>
+        </p:txBody>
+      </p:sp>
+      <p:pic>
+        <p:nvPicPr>
+          <p:cNvPr id="7170" name="Picture 2"/>
+          <p:cNvPicPr>
+            <a:picLocks noChangeAspect="1" noChangeArrowheads="1"/>
+          </p:cNvPicPr>
+          <p:nvPr/>
+        </p:nvPicPr>
+        <p:blipFill>
+          <a:blip r:embed="rId2"/>
+          <a:srcRect/>
+          <a:stretch>
+            <a:fillRect/>
+          </a:stretch>
+        </p:blipFill>
+        <p:spPr bwMode="auto">
+          <a:xfrm>
+            <a:off x="6286500" y="3241222"/>
+            <a:ext cx="2857500" cy="2857500"/>
+          </a:xfrm>
+          <a:prstGeom prst="rect">
+            <a:avLst/>
+          </a:prstGeom>
+          <a:noFill/>
+          <a:ln w="9525">
+            <a:noFill/>
+            <a:miter lim="800000"/>
+            <a:headEnd/>
+            <a:tailEnd/>
+          </a:ln>
+          <a:effectLst/>
+        </p:spPr>
+      </p:pic>
     </p:spTree>
   </p:cSld>
   <p:clrMapOvr>
     <a:masterClrMapping/>
   </p:clrMapOvr>
+  <p:timing>
+    <p:tnLst>
+      <p:par>
+        <p:cTn id="1" dur="indefinite" restart="never" nodeType="tmRoot"/>
+      </p:par>
+    </p:tnLst>
+  </p:timing>
 </p:sld>
 </file>
 
@@ -6219,7 +6501,7 @@
           <a:p>
             <a:r>
               <a:rPr lang="sv-SE" dirty="0" smtClean="0"/>
-              <a:t>Läsa fil i Java 5</a:t>
+              <a:t>Läsa fil i Java 1.4</a:t>
             </a:r>
             <a:endParaRPr lang="sv-SE" dirty="0"/>
           </a:p>
@@ -6235,32 +6517,67 @@
             <p:ph idx="1"/>
           </p:nvPr>
         </p:nvSpPr>
-        <p:spPr>
+        <p:spPr/>
+        <p:txBody>
+          <a:bodyPr/>
+          <a:lstStyle/>
+          <a:p>
+            <a:pPr>
+              <a:buNone/>
+            </a:pPr>
+            <a:r>
+              <a:rPr lang="sv-SE" dirty="0" smtClean="0"/>
+              <a:t>[ReadFileJava14.java]</a:t>
+            </a:r>
+            <a:endParaRPr lang="sv-SE" dirty="0"/>
+          </a:p>
+        </p:txBody>
+      </p:sp>
+      <p:pic>
+        <p:nvPicPr>
+          <p:cNvPr id="8194" name="Picture 2"/>
+          <p:cNvPicPr>
+            <a:picLocks noChangeAspect="1" noChangeArrowheads="1"/>
+          </p:cNvPicPr>
+          <p:nvPr/>
+        </p:nvPicPr>
+        <p:blipFill>
+          <a:blip r:embed="rId2"/>
+          <a:srcRect/>
+          <a:stretch>
+            <a:fillRect/>
+          </a:stretch>
+        </p:blipFill>
+        <p:spPr bwMode="auto">
           <a:xfrm>
-            <a:off x="428596" y="1285860"/>
-            <a:ext cx="8229600" cy="4525963"/>
+            <a:off x="7402620" y="3579222"/>
+            <a:ext cx="1741379" cy="2515325"/>
           </a:xfrm>
+          <a:prstGeom prst="rect">
+            <a:avLst/>
+          </a:prstGeom>
+          <a:noFill/>
+          <a:ln w="9525">
+            <a:noFill/>
+            <a:miter lim="800000"/>
+            <a:headEnd/>
+            <a:tailEnd/>
+          </a:ln>
+          <a:effectLst/>
         </p:spPr>
-        <p:txBody>
-          <a:bodyPr/>
-          <a:lstStyle/>
-          <a:p>
-            <a:pPr>
-              <a:buNone/>
-            </a:pPr>
-            <a:r>
-              <a:rPr lang="sv-SE" dirty="0" smtClean="0"/>
-              <a:t>[ReadFileJava5.java]</a:t>
-            </a:r>
-            <a:endParaRPr lang="sv-SE" dirty="0"/>
-          </a:p>
-        </p:txBody>
-      </p:sp>
+      </p:pic>
     </p:spTree>
   </p:cSld>
   <p:clrMapOvr>
     <a:masterClrMapping/>
   </p:clrMapOvr>
+  <p:timing>
+    <p:tnLst>
+      <p:par>
+        <p:cTn id="1" dur="indefinite" restart="never" nodeType="tmRoot"/>
+      </p:par>
+    </p:tnLst>
+  </p:timing>
 </p:sld>
 </file>
 
@@ -6298,11 +6615,7 @@
           <a:p>
             <a:r>
               <a:rPr lang="sv-SE" dirty="0" smtClean="0"/>
-              <a:t>Läsa fil i </a:t>
-            </a:r>
-            <a:r>
-              <a:rPr lang="sv-SE" dirty="0" err="1" smtClean="0"/>
-              <a:t>Groovy</a:t>
+              <a:t>Läsa fil i Java 5</a:t>
             </a:r>
             <a:endParaRPr lang="sv-SE" dirty="0"/>
           </a:p>
@@ -6318,7 +6631,12 @@
             <p:ph idx="1"/>
           </p:nvPr>
         </p:nvSpPr>
-        <p:spPr/>
+        <p:spPr>
+          <a:xfrm>
+            <a:off x="428596" y="1285860"/>
+            <a:ext cx="8229600" cy="4525963"/>
+          </a:xfrm>
+        </p:spPr>
         <p:txBody>
           <a:bodyPr/>
           <a:lstStyle/>
@@ -6328,20 +6646,45 @@
             </a:pPr>
             <a:r>
               <a:rPr lang="sv-SE" dirty="0" smtClean="0"/>
-              <a:t>[</a:t>
-            </a:r>
-            <a:r>
-              <a:rPr lang="sv-SE" dirty="0" err="1" smtClean="0"/>
-              <a:t>ReadFile.groovy</a:t>
-            </a:r>
-            <a:r>
-              <a:rPr lang="sv-SE" dirty="0" smtClean="0"/>
-              <a:t>]</a:t>
+              <a:t>[ReadFileJava5.java]</a:t>
             </a:r>
             <a:endParaRPr lang="sv-SE" dirty="0"/>
           </a:p>
         </p:txBody>
       </p:sp>
+      <p:pic>
+        <p:nvPicPr>
+          <p:cNvPr id="9218" name="Picture 2"/>
+          <p:cNvPicPr>
+            <a:picLocks noChangeAspect="1" noChangeArrowheads="1"/>
+          </p:cNvPicPr>
+          <p:nvPr/>
+        </p:nvPicPr>
+        <p:blipFill>
+          <a:blip r:embed="rId2"/>
+          <a:srcRect/>
+          <a:stretch>
+            <a:fillRect/>
+          </a:stretch>
+        </p:blipFill>
+        <p:spPr bwMode="auto">
+          <a:xfrm>
+            <a:off x="6561906" y="3136583"/>
+            <a:ext cx="3048000" cy="2962275"/>
+          </a:xfrm>
+          <a:prstGeom prst="rect">
+            <a:avLst/>
+          </a:prstGeom>
+          <a:noFill/>
+          <a:ln w="9525">
+            <a:noFill/>
+            <a:miter lim="800000"/>
+            <a:headEnd/>
+            <a:tailEnd/>
+          </a:ln>
+          <a:effectLst/>
+        </p:spPr>
+      </p:pic>
     </p:spTree>
   </p:cSld>
   <p:clrMapOvr>
@@ -6383,12 +6726,12 @@
           <a:lstStyle/>
           <a:p>
             <a:r>
+              <a:rPr lang="sv-SE" dirty="0" smtClean="0"/>
+              <a:t>Läsa fil i </a:t>
+            </a:r>
+            <a:r>
               <a:rPr lang="sv-SE" dirty="0" err="1" smtClean="0"/>
-              <a:t>Exceptions</a:t>
-            </a:r>
-            <a:r>
-              <a:rPr lang="sv-SE" dirty="0" smtClean="0"/>
-              <a:t> i java</a:t>
+              <a:t>Groovy</a:t>
             </a:r>
             <a:endParaRPr lang="sv-SE" dirty="0"/>
           </a:p>
@@ -6418,7 +6761,7 @@
             </a:r>
             <a:r>
               <a:rPr lang="sv-SE" dirty="0" err="1" smtClean="0"/>
-              <a:t>Exceptions.java</a:t>
+              <a:t>ReadFile.groovy</a:t>
             </a:r>
             <a:r>
               <a:rPr lang="sv-SE" dirty="0" smtClean="0"/>
@@ -6474,41 +6817,37 @@
             </a:r>
             <a:r>
               <a:rPr lang="sv-SE" dirty="0" smtClean="0"/>
-              <a:t> i </a:t>
+              <a:t> i java</a:t>
+            </a:r>
+            <a:endParaRPr lang="sv-SE" dirty="0"/>
+          </a:p>
+        </p:txBody>
+      </p:sp>
+      <p:sp>
+        <p:nvSpPr>
+          <p:cNvPr id="3" name="Platshållare för innehåll 2"/>
+          <p:cNvSpPr>
+            <a:spLocks noGrp="1"/>
+          </p:cNvSpPr>
+          <p:nvPr>
+            <p:ph idx="1"/>
+          </p:nvPr>
+        </p:nvSpPr>
+        <p:spPr/>
+        <p:txBody>
+          <a:bodyPr/>
+          <a:lstStyle/>
+          <a:p>
+            <a:pPr>
+              <a:buNone/>
+            </a:pPr>
+            <a:r>
+              <a:rPr lang="sv-SE" dirty="0" smtClean="0"/>
+              <a:t>[</a:t>
             </a:r>
             <a:r>
               <a:rPr lang="sv-SE" dirty="0" err="1" smtClean="0"/>
-              <a:t>Groovy</a:t>
-            </a:r>
-            <a:endParaRPr lang="sv-SE" dirty="0"/>
-          </a:p>
-        </p:txBody>
-      </p:sp>
-      <p:sp>
-        <p:nvSpPr>
-          <p:cNvPr id="3" name="Platshållare för innehåll 2"/>
-          <p:cNvSpPr>
-            <a:spLocks noGrp="1"/>
-          </p:cNvSpPr>
-          <p:nvPr>
-            <p:ph idx="1"/>
-          </p:nvPr>
-        </p:nvSpPr>
-        <p:spPr/>
-        <p:txBody>
-          <a:bodyPr/>
-          <a:lstStyle/>
-          <a:p>
-            <a:pPr>
-              <a:buNone/>
-            </a:pPr>
-            <a:r>
-              <a:rPr lang="sv-SE" dirty="0" smtClean="0"/>
-              <a:t>[</a:t>
-            </a:r>
-            <a:r>
-              <a:rPr lang="sv-SE" dirty="0" err="1" smtClean="0"/>
-              <a:t>Exceptions.groovy</a:t>
+              <a:t>Exceptions.java</a:t>
             </a:r>
             <a:r>
               <a:rPr lang="sv-SE" dirty="0" smtClean="0"/>
@@ -6543,39 +6882,6 @@
           <a:chExt cx="0" cy="0"/>
         </a:xfrm>
       </p:grpSpPr>
-      <p:pic>
-        <p:nvPicPr>
-          <p:cNvPr id="3075" name="Picture 3"/>
-          <p:cNvPicPr>
-            <a:picLocks noChangeAspect="1" noChangeArrowheads="1"/>
-          </p:cNvPicPr>
-          <p:nvPr/>
-        </p:nvPicPr>
-        <p:blipFill>
-          <a:blip r:embed="rId2"/>
-          <a:srcRect/>
-          <a:stretch>
-            <a:fillRect/>
-          </a:stretch>
-        </p:blipFill>
-        <p:spPr bwMode="auto">
-          <a:xfrm>
-            <a:off x="3165875" y="3774579"/>
-            <a:ext cx="3249497" cy="2310950"/>
-          </a:xfrm>
-          <a:prstGeom prst="rect">
-            <a:avLst/>
-          </a:prstGeom>
-          <a:noFill/>
-          <a:ln w="9525">
-            <a:noFill/>
-            <a:miter lim="800000"/>
-            <a:headEnd/>
-            <a:tailEnd/>
-          </a:ln>
-          <a:effectLst/>
-        </p:spPr>
-      </p:pic>
       <p:sp>
         <p:nvSpPr>
           <p:cNvPr id="2" name="Rubrik 1"/>
@@ -6586,35 +6892,22 @@
             <p:ph type="title"/>
           </p:nvPr>
         </p:nvSpPr>
-        <p:spPr>
-          <a:xfrm>
-            <a:off x="481013" y="349250"/>
-            <a:ext cx="7543800" cy="1257481"/>
-          </a:xfrm>
-        </p:spPr>
-        <p:txBody>
-          <a:bodyPr/>
-          <a:lstStyle/>
-          <a:p>
-            <a:r>
-              <a:rPr lang="sv-SE" dirty="0" smtClean="0"/>
-              <a:t>Dynamisk typning (</a:t>
-            </a:r>
+        <p:spPr/>
+        <p:txBody>
+          <a:bodyPr/>
+          <a:lstStyle/>
+          <a:p>
             <a:r>
               <a:rPr lang="sv-SE" dirty="0" err="1" smtClean="0"/>
-              <a:t>Duck</a:t>
-            </a:r>
-            <a:r>
-              <a:rPr lang="sv-SE" dirty="0" smtClean="0"/>
-              <a:t> </a:t>
+              <a:t>Exceptions</a:t>
+            </a:r>
+            <a:r>
+              <a:rPr lang="sv-SE" dirty="0" smtClean="0"/>
+              <a:t> i </a:t>
             </a:r>
             <a:r>
               <a:rPr lang="sv-SE" dirty="0" err="1" smtClean="0"/>
-              <a:t>typing</a:t>
-            </a:r>
-            <a:r>
-              <a:rPr lang="sv-SE" dirty="0" smtClean="0"/>
-              <a:t>)</a:t>
+              <a:t>Groovy</a:t>
             </a:r>
             <a:endParaRPr lang="sv-SE" dirty="0"/>
           </a:p>
@@ -6630,161 +6923,26 @@
             <p:ph idx="1"/>
           </p:nvPr>
         </p:nvSpPr>
-        <p:spPr>
-          <a:xfrm>
-            <a:off x="469900" y="1798459"/>
-            <a:ext cx="8229600" cy="4443412"/>
-          </a:xfrm>
-        </p:spPr>
-        <p:txBody>
-          <a:bodyPr/>
-          <a:lstStyle/>
-          <a:p>
-            <a:r>
-              <a:rPr lang="en-US" i="1" dirty="0" smtClean="0"/>
-              <a:t>If it walks like a duck and quacks like a duck, it must be a duck</a:t>
-            </a:r>
-            <a:endParaRPr lang="en-US" dirty="0" smtClean="0"/>
-          </a:p>
-          <a:p>
-            <a:r>
-              <a:rPr lang="en-US" dirty="0" err="1" smtClean="0"/>
-              <a:t>Det</a:t>
-            </a:r>
-            <a:r>
-              <a:rPr lang="en-US" dirty="0" smtClean="0"/>
-              <a:t> </a:t>
-            </a:r>
-            <a:r>
-              <a:rPr lang="en-US" dirty="0" err="1" smtClean="0"/>
-              <a:t>spelar</a:t>
-            </a:r>
-            <a:r>
-              <a:rPr lang="en-US" dirty="0" smtClean="0"/>
-              <a:t> </a:t>
-            </a:r>
-            <a:r>
-              <a:rPr lang="en-US" dirty="0" err="1" smtClean="0"/>
-              <a:t>ingen</a:t>
-            </a:r>
-            <a:r>
-              <a:rPr lang="en-US" dirty="0" smtClean="0"/>
-              <a:t> roll </a:t>
-            </a:r>
-            <a:r>
-              <a:rPr lang="en-US" dirty="0" err="1" smtClean="0"/>
-              <a:t>vilken</a:t>
-            </a:r>
-            <a:r>
-              <a:rPr lang="en-US" dirty="0" smtClean="0"/>
-              <a:t> </a:t>
-            </a:r>
-            <a:r>
-              <a:rPr lang="en-US" dirty="0" err="1" smtClean="0"/>
-              <a:t>typ</a:t>
-            </a:r>
-            <a:r>
-              <a:rPr lang="en-US" dirty="0" smtClean="0"/>
-              <a:t> </a:t>
-            </a:r>
-            <a:r>
-              <a:rPr lang="en-US" dirty="0" err="1" smtClean="0"/>
-              <a:t>ett</a:t>
-            </a:r>
-            <a:r>
-              <a:rPr lang="en-US" dirty="0" smtClean="0"/>
-              <a:t> </a:t>
-            </a:r>
-            <a:r>
-              <a:rPr lang="en-US" dirty="0" err="1" smtClean="0"/>
-              <a:t>objekt</a:t>
-            </a:r>
-            <a:r>
-              <a:rPr lang="en-US" dirty="0" smtClean="0"/>
-              <a:t> </a:t>
-            </a:r>
-            <a:r>
-              <a:rPr lang="en-US" dirty="0" err="1" smtClean="0"/>
-              <a:t>är</a:t>
-            </a:r>
-            <a:r>
-              <a:rPr lang="en-US" dirty="0" smtClean="0"/>
-              <a:t>, </a:t>
-            </a:r>
-            <a:r>
-              <a:rPr lang="en-US" dirty="0" err="1" smtClean="0"/>
-              <a:t>det</a:t>
-            </a:r>
-            <a:r>
-              <a:rPr lang="en-US" dirty="0" smtClean="0"/>
-              <a:t> </a:t>
-            </a:r>
-            <a:r>
-              <a:rPr lang="en-US" dirty="0" err="1" smtClean="0"/>
-              <a:t>enda</a:t>
-            </a:r>
-            <a:r>
-              <a:rPr lang="en-US" dirty="0" smtClean="0"/>
-              <a:t> man </a:t>
-            </a:r>
-            <a:r>
-              <a:rPr lang="en-US" dirty="0" err="1" smtClean="0"/>
-              <a:t>bryr</a:t>
-            </a:r>
-            <a:r>
-              <a:rPr lang="en-US" dirty="0" smtClean="0"/>
-              <a:t> sig </a:t>
-            </a:r>
-            <a:r>
-              <a:rPr lang="en-US" dirty="0" err="1" smtClean="0"/>
-              <a:t>om</a:t>
-            </a:r>
-            <a:r>
-              <a:rPr lang="en-US" dirty="0" smtClean="0"/>
-              <a:t> </a:t>
-            </a:r>
-            <a:r>
-              <a:rPr lang="en-US" dirty="0" err="1" smtClean="0"/>
-              <a:t>är</a:t>
-            </a:r>
-            <a:r>
-              <a:rPr lang="en-US" dirty="0" smtClean="0"/>
-              <a:t> </a:t>
-            </a:r>
-            <a:r>
-              <a:rPr lang="en-US" dirty="0" err="1" smtClean="0"/>
-              <a:t>vilka</a:t>
-            </a:r>
-            <a:r>
-              <a:rPr lang="en-US" dirty="0" smtClean="0"/>
-              <a:t> </a:t>
-            </a:r>
-            <a:r>
-              <a:rPr lang="en-US" dirty="0" err="1" smtClean="0"/>
-              <a:t>metoder</a:t>
-            </a:r>
-            <a:r>
-              <a:rPr lang="en-US" dirty="0" smtClean="0"/>
-              <a:t> </a:t>
-            </a:r>
-            <a:r>
-              <a:rPr lang="en-US" dirty="0" err="1" smtClean="0"/>
-              <a:t>det</a:t>
-            </a:r>
-            <a:r>
-              <a:rPr lang="en-US" dirty="0" smtClean="0"/>
-              <a:t> </a:t>
-            </a:r>
-            <a:r>
-              <a:rPr lang="en-US" dirty="0" err="1" smtClean="0"/>
-              <a:t>har</a:t>
-            </a:r>
-            <a:endParaRPr lang="en-US" dirty="0" smtClean="0"/>
-          </a:p>
+        <p:spPr/>
+        <p:txBody>
+          <a:bodyPr/>
+          <a:lstStyle/>
           <a:p>
             <a:pPr>
               <a:buNone/>
             </a:pPr>
+            <a:r>
+              <a:rPr lang="sv-SE" dirty="0" smtClean="0"/>
+              <a:t>[</a:t>
+            </a:r>
+            <a:r>
+              <a:rPr lang="sv-SE" dirty="0" err="1" smtClean="0"/>
+              <a:t>Exceptions.groovy</a:t>
+            </a:r>
+            <a:r>
+              <a:rPr lang="sv-SE" dirty="0" smtClean="0"/>
+              <a:t>]</a:t>
+            </a:r>
             <a:endParaRPr lang="sv-SE" dirty="0"/>
           </a:p>
         </p:txBody>
@@ -7002,6 +7160,39 @@
           <a:chExt cx="0" cy="0"/>
         </a:xfrm>
       </p:grpSpPr>
+      <p:pic>
+        <p:nvPicPr>
+          <p:cNvPr id="3075" name="Picture 3"/>
+          <p:cNvPicPr>
+            <a:picLocks noChangeAspect="1" noChangeArrowheads="1"/>
+          </p:cNvPicPr>
+          <p:nvPr/>
+        </p:nvPicPr>
+        <p:blipFill>
+          <a:blip r:embed="rId2"/>
+          <a:srcRect/>
+          <a:stretch>
+            <a:fillRect/>
+          </a:stretch>
+        </p:blipFill>
+        <p:spPr bwMode="auto">
+          <a:xfrm>
+            <a:off x="3165875" y="3774579"/>
+            <a:ext cx="3249497" cy="2310950"/>
+          </a:xfrm>
+          <a:prstGeom prst="rect">
+            <a:avLst/>
+          </a:prstGeom>
+          <a:noFill/>
+          <a:ln w="9525">
+            <a:noFill/>
+            <a:miter lim="800000"/>
+            <a:headEnd/>
+            <a:tailEnd/>
+          </a:ln>
+          <a:effectLst/>
+        </p:spPr>
+      </p:pic>
       <p:sp>
         <p:nvSpPr>
           <p:cNvPr id="2" name="Rubrik 1"/>
@@ -7012,14 +7203,35 @@
             <p:ph type="title"/>
           </p:nvPr>
         </p:nvSpPr>
-        <p:spPr/>
-        <p:txBody>
-          <a:bodyPr/>
-          <a:lstStyle/>
-          <a:p>
-            <a:r>
-              <a:rPr lang="sv-SE" dirty="0" smtClean="0"/>
-              <a:t>Dynamisk/frivillig typning</a:t>
+        <p:spPr>
+          <a:xfrm>
+            <a:off x="481013" y="349250"/>
+            <a:ext cx="7543800" cy="1257481"/>
+          </a:xfrm>
+        </p:spPr>
+        <p:txBody>
+          <a:bodyPr/>
+          <a:lstStyle/>
+          <a:p>
+            <a:r>
+              <a:rPr lang="sv-SE" dirty="0" smtClean="0"/>
+              <a:t>Dynamisk typning (</a:t>
+            </a:r>
+            <a:r>
+              <a:rPr lang="sv-SE" dirty="0" err="1" smtClean="0"/>
+              <a:t>Duck</a:t>
+            </a:r>
+            <a:r>
+              <a:rPr lang="sv-SE" dirty="0" smtClean="0"/>
+              <a:t> </a:t>
+            </a:r>
+            <a:r>
+              <a:rPr lang="sv-SE" dirty="0" err="1" smtClean="0"/>
+              <a:t>typing</a:t>
+            </a:r>
+            <a:r>
+              <a:rPr lang="sv-SE" dirty="0" smtClean="0"/>
+              <a:t>)</a:t>
             </a:r>
             <a:endParaRPr lang="sv-SE" dirty="0"/>
           </a:p>
@@ -7035,26 +7247,161 @@
             <p:ph idx="1"/>
           </p:nvPr>
         </p:nvSpPr>
-        <p:spPr/>
-        <p:txBody>
-          <a:bodyPr/>
-          <a:lstStyle/>
+        <p:spPr>
+          <a:xfrm>
+            <a:off x="469900" y="1798459"/>
+            <a:ext cx="8229600" cy="4443412"/>
+          </a:xfrm>
+        </p:spPr>
+        <p:txBody>
+          <a:bodyPr/>
+          <a:lstStyle/>
+          <a:p>
+            <a:r>
+              <a:rPr lang="en-US" i="1" dirty="0" smtClean="0"/>
+              <a:t>If it walks like a duck and quacks like a duck, it must be a duck</a:t>
+            </a:r>
+            <a:endParaRPr lang="en-US" dirty="0" smtClean="0"/>
+          </a:p>
+          <a:p>
+            <a:r>
+              <a:rPr lang="en-US" dirty="0" err="1" smtClean="0"/>
+              <a:t>Det</a:t>
+            </a:r>
+            <a:r>
+              <a:rPr lang="en-US" dirty="0" smtClean="0"/>
+              <a:t> </a:t>
+            </a:r>
+            <a:r>
+              <a:rPr lang="en-US" dirty="0" err="1" smtClean="0"/>
+              <a:t>spelar</a:t>
+            </a:r>
+            <a:r>
+              <a:rPr lang="en-US" dirty="0" smtClean="0"/>
+              <a:t> </a:t>
+            </a:r>
+            <a:r>
+              <a:rPr lang="en-US" dirty="0" err="1" smtClean="0"/>
+              <a:t>ingen</a:t>
+            </a:r>
+            <a:r>
+              <a:rPr lang="en-US" dirty="0" smtClean="0"/>
+              <a:t> roll </a:t>
+            </a:r>
+            <a:r>
+              <a:rPr lang="en-US" dirty="0" err="1" smtClean="0"/>
+              <a:t>vilken</a:t>
+            </a:r>
+            <a:r>
+              <a:rPr lang="en-US" dirty="0" smtClean="0"/>
+              <a:t> </a:t>
+            </a:r>
+            <a:r>
+              <a:rPr lang="en-US" dirty="0" err="1" smtClean="0"/>
+              <a:t>typ</a:t>
+            </a:r>
+            <a:r>
+              <a:rPr lang="en-US" dirty="0" smtClean="0"/>
+              <a:t> </a:t>
+            </a:r>
+            <a:r>
+              <a:rPr lang="en-US" dirty="0" err="1" smtClean="0"/>
+              <a:t>ett</a:t>
+            </a:r>
+            <a:r>
+              <a:rPr lang="en-US" dirty="0" smtClean="0"/>
+              <a:t> </a:t>
+            </a:r>
+            <a:r>
+              <a:rPr lang="en-US" dirty="0" err="1" smtClean="0"/>
+              <a:t>objekt</a:t>
+            </a:r>
+            <a:r>
+              <a:rPr lang="en-US" dirty="0" smtClean="0"/>
+              <a:t> </a:t>
+            </a:r>
+            <a:r>
+              <a:rPr lang="en-US" dirty="0" err="1" smtClean="0"/>
+              <a:t>är</a:t>
+            </a:r>
+            <a:r>
+              <a:rPr lang="en-US" dirty="0" smtClean="0"/>
+              <a:t>, </a:t>
+            </a:r>
+            <a:r>
+              <a:rPr lang="en-US" dirty="0" err="1" smtClean="0"/>
+              <a:t>det</a:t>
+            </a:r>
+            <a:r>
+              <a:rPr lang="en-US" dirty="0" smtClean="0"/>
+              <a:t> </a:t>
+            </a:r>
+            <a:r>
+              <a:rPr lang="en-US" dirty="0" err="1" smtClean="0"/>
+              <a:t>enda</a:t>
+            </a:r>
+            <a:r>
+              <a:rPr lang="en-US" dirty="0" smtClean="0"/>
+              <a:t> man </a:t>
+            </a:r>
+            <a:r>
+              <a:rPr lang="en-US" dirty="0" err="1" smtClean="0"/>
+              <a:t>bryr</a:t>
+            </a:r>
+            <a:r>
+              <a:rPr lang="en-US" dirty="0" smtClean="0"/>
+              <a:t> sig </a:t>
+            </a:r>
+            <a:r>
+              <a:rPr lang="en-US" dirty="0" err="1" smtClean="0"/>
+              <a:t>om</a:t>
+            </a:r>
+            <a:r>
+              <a:rPr lang="en-US" dirty="0" smtClean="0"/>
+              <a:t> </a:t>
+            </a:r>
+            <a:r>
+              <a:rPr lang="en-US" dirty="0" err="1" smtClean="0"/>
+              <a:t>är</a:t>
+            </a:r>
+            <a:r>
+              <a:rPr lang="en-US" dirty="0" smtClean="0"/>
+              <a:t> </a:t>
+            </a:r>
+            <a:r>
+              <a:rPr lang="en-US" dirty="0" err="1" smtClean="0"/>
+              <a:t>vilka</a:t>
+            </a:r>
+            <a:r>
+              <a:rPr lang="en-US" dirty="0" smtClean="0"/>
+              <a:t> </a:t>
+            </a:r>
+            <a:r>
+              <a:rPr lang="en-US" dirty="0" err="1" smtClean="0"/>
+              <a:t>metoder</a:t>
+            </a:r>
+            <a:r>
+              <a:rPr lang="en-US" dirty="0" smtClean="0"/>
+              <a:t> </a:t>
+            </a:r>
+            <a:r>
+              <a:rPr lang="en-US" dirty="0" err="1" smtClean="0"/>
+              <a:t>det</a:t>
+            </a:r>
+            <a:r>
+              <a:rPr lang="en-US" dirty="0" smtClean="0"/>
+              <a:t> </a:t>
+            </a:r>
+            <a:r>
+              <a:rPr lang="en-US" dirty="0" err="1" smtClean="0"/>
+              <a:t>har</a:t>
+            </a:r>
+            <a:endParaRPr lang="en-US" dirty="0" smtClean="0"/>
+          </a:p>
           <a:p>
             <a:pPr>
               <a:buNone/>
             </a:pPr>
-            <a:r>
-              <a:rPr lang="sv-SE" dirty="0" smtClean="0"/>
-              <a:t>[</a:t>
-            </a:r>
-            <a:r>
-              <a:rPr lang="sv-SE" dirty="0" err="1" smtClean="0"/>
-              <a:t>optionalTyping.groovy</a:t>
-            </a:r>
-            <a:r>
-              <a:rPr lang="sv-SE" dirty="0" smtClean="0"/>
-              <a:t>]</a:t>
-            </a:r>
             <a:endParaRPr lang="sv-SE" dirty="0"/>
           </a:p>
         </p:txBody>
@@ -7096,52 +7443,42 @@
         </p:nvSpPr>
         <p:spPr/>
         <p:txBody>
-          <a:bodyPr>
-            <a:normAutofit/>
-          </a:bodyPr>
-          <a:lstStyle/>
-          <a:p>
-            <a:r>
-              <a:rPr lang="sv-SE" dirty="0" smtClean="0"/>
-              <a:t>Hantera </a:t>
+          <a:bodyPr/>
+          <a:lstStyle/>
+          <a:p>
+            <a:r>
+              <a:rPr lang="sv-SE" dirty="0" smtClean="0"/>
+              <a:t>Dynamisk/frivillig typning</a:t>
+            </a:r>
+            <a:endParaRPr lang="sv-SE" dirty="0"/>
+          </a:p>
+        </p:txBody>
+      </p:sp>
+      <p:sp>
+        <p:nvSpPr>
+          <p:cNvPr id="3" name="Platshållare för innehåll 2"/>
+          <p:cNvSpPr>
+            <a:spLocks noGrp="1"/>
+          </p:cNvSpPr>
+          <p:nvPr>
+            <p:ph idx="1"/>
+          </p:nvPr>
+        </p:nvSpPr>
+        <p:spPr/>
+        <p:txBody>
+          <a:bodyPr/>
+          <a:lstStyle/>
+          <a:p>
+            <a:pPr>
+              <a:buNone/>
+            </a:pPr>
+            <a:r>
+              <a:rPr lang="sv-SE" dirty="0" smtClean="0"/>
+              <a:t>[</a:t>
             </a:r>
             <a:r>
               <a:rPr lang="sv-SE" dirty="0" err="1" smtClean="0"/>
-              <a:t>null</a:t>
-            </a:r>
-            <a:r>
-              <a:rPr lang="sv-SE" dirty="0" smtClean="0"/>
-              <a:t> i Java</a:t>
-            </a:r>
-            <a:endParaRPr lang="sv-SE" dirty="0"/>
-          </a:p>
-        </p:txBody>
-      </p:sp>
-      <p:sp>
-        <p:nvSpPr>
-          <p:cNvPr id="3" name="Platshållare för innehåll 2"/>
-          <p:cNvSpPr>
-            <a:spLocks noGrp="1"/>
-          </p:cNvSpPr>
-          <p:nvPr>
-            <p:ph idx="1"/>
-          </p:nvPr>
-        </p:nvSpPr>
-        <p:spPr/>
-        <p:txBody>
-          <a:bodyPr/>
-          <a:lstStyle/>
-          <a:p>
-            <a:pPr>
-              <a:buNone/>
-            </a:pPr>
-            <a:r>
-              <a:rPr lang="sv-SE" dirty="0" smtClean="0"/>
-              <a:t>[</a:t>
-            </a:r>
-            <a:r>
-              <a:rPr lang="sv-SE" dirty="0" err="1" smtClean="0"/>
-              <a:t>Nullsafe.java</a:t>
+              <a:t>optionalTyping.groovy</a:t>
             </a:r>
             <a:r>
               <a:rPr lang="sv-SE" dirty="0" smtClean="0"/>
@@ -7203,41 +7540,37 @@
             </a:r>
             <a:r>
               <a:rPr lang="sv-SE" dirty="0" smtClean="0"/>
-              <a:t> i </a:t>
+              <a:t> i Java</a:t>
+            </a:r>
+            <a:endParaRPr lang="sv-SE" dirty="0"/>
+          </a:p>
+        </p:txBody>
+      </p:sp>
+      <p:sp>
+        <p:nvSpPr>
+          <p:cNvPr id="3" name="Platshållare för innehåll 2"/>
+          <p:cNvSpPr>
+            <a:spLocks noGrp="1"/>
+          </p:cNvSpPr>
+          <p:nvPr>
+            <p:ph idx="1"/>
+          </p:nvPr>
+        </p:nvSpPr>
+        <p:spPr/>
+        <p:txBody>
+          <a:bodyPr/>
+          <a:lstStyle/>
+          <a:p>
+            <a:pPr>
+              <a:buNone/>
+            </a:pPr>
+            <a:r>
+              <a:rPr lang="sv-SE" dirty="0" smtClean="0"/>
+              <a:t>[</a:t>
             </a:r>
             <a:r>
               <a:rPr lang="sv-SE" dirty="0" err="1" smtClean="0"/>
-              <a:t>Groovy</a:t>
-            </a:r>
-            <a:endParaRPr lang="sv-SE" dirty="0"/>
-          </a:p>
-        </p:txBody>
-      </p:sp>
-      <p:sp>
-        <p:nvSpPr>
-          <p:cNvPr id="3" name="Platshållare för innehåll 2"/>
-          <p:cNvSpPr>
-            <a:spLocks noGrp="1"/>
-          </p:cNvSpPr>
-          <p:nvPr>
-            <p:ph idx="1"/>
-          </p:nvPr>
-        </p:nvSpPr>
-        <p:spPr/>
-        <p:txBody>
-          <a:bodyPr/>
-          <a:lstStyle/>
-          <a:p>
-            <a:pPr>
-              <a:buNone/>
-            </a:pPr>
-            <a:r>
-              <a:rPr lang="sv-SE" dirty="0" smtClean="0"/>
-              <a:t>[</a:t>
-            </a:r>
-            <a:r>
-              <a:rPr lang="sv-SE" dirty="0" err="1" smtClean="0"/>
-              <a:t>Nullsafe.groovy</a:t>
+              <a:t>Nullsafe.java</a:t>
             </a:r>
             <a:r>
               <a:rPr lang="sv-SE" dirty="0" smtClean="0"/>
@@ -7284,12 +7617,26 @@
         </p:nvSpPr>
         <p:spPr/>
         <p:txBody>
-          <a:bodyPr/>
-          <a:lstStyle/>
-          <a:p>
-            <a:r>
-              <a:rPr lang="sv-SE" dirty="0" smtClean="0"/>
-              <a:t>Getters/setters i Java</a:t>
+          <a:bodyPr>
+            <a:normAutofit/>
+          </a:bodyPr>
+          <a:lstStyle/>
+          <a:p>
+            <a:r>
+              <a:rPr lang="sv-SE" dirty="0" smtClean="0"/>
+              <a:t>Hantera </a:t>
+            </a:r>
+            <a:r>
+              <a:rPr lang="sv-SE" dirty="0" err="1" smtClean="0"/>
+              <a:t>null</a:t>
+            </a:r>
+            <a:r>
+              <a:rPr lang="sv-SE" dirty="0" smtClean="0"/>
+              <a:t> i </a:t>
+            </a:r>
+            <a:r>
+              <a:rPr lang="sv-SE" dirty="0" err="1" smtClean="0"/>
+              <a:t>Groovy</a:t>
             </a:r>
             <a:endParaRPr lang="sv-SE" dirty="0"/>
           </a:p>
@@ -7319,7 +7666,7 @@
             </a:r>
             <a:r>
               <a:rPr lang="sv-SE" dirty="0" err="1" smtClean="0"/>
-              <a:t>ClassWithGettersSetters.java</a:t>
+              <a:t>Nullsafe.groovy</a:t>
             </a:r>
             <a:r>
               <a:rPr lang="sv-SE" dirty="0" smtClean="0"/>
@@ -7371,41 +7718,37 @@
           <a:p>
             <a:r>
               <a:rPr lang="sv-SE" dirty="0" smtClean="0"/>
-              <a:t>Getters/setters i </a:t>
+              <a:t>Getters/setters i Java</a:t>
+            </a:r>
+            <a:endParaRPr lang="sv-SE" dirty="0"/>
+          </a:p>
+        </p:txBody>
+      </p:sp>
+      <p:sp>
+        <p:nvSpPr>
+          <p:cNvPr id="3" name="Platshållare för innehåll 2"/>
+          <p:cNvSpPr>
+            <a:spLocks noGrp="1"/>
+          </p:cNvSpPr>
+          <p:nvPr>
+            <p:ph idx="1"/>
+          </p:nvPr>
+        </p:nvSpPr>
+        <p:spPr/>
+        <p:txBody>
+          <a:bodyPr/>
+          <a:lstStyle/>
+          <a:p>
+            <a:pPr>
+              <a:buNone/>
+            </a:pPr>
+            <a:r>
+              <a:rPr lang="sv-SE" dirty="0" smtClean="0"/>
+              <a:t>[</a:t>
             </a:r>
             <a:r>
               <a:rPr lang="sv-SE" dirty="0" err="1" smtClean="0"/>
-              <a:t>Groovy</a:t>
-            </a:r>
-            <a:endParaRPr lang="sv-SE" dirty="0"/>
-          </a:p>
-        </p:txBody>
-      </p:sp>
-      <p:sp>
-        <p:nvSpPr>
-          <p:cNvPr id="3" name="Platshållare för innehåll 2"/>
-          <p:cNvSpPr>
-            <a:spLocks noGrp="1"/>
-          </p:cNvSpPr>
-          <p:nvPr>
-            <p:ph idx="1"/>
-          </p:nvPr>
-        </p:nvSpPr>
-        <p:spPr/>
-        <p:txBody>
-          <a:bodyPr/>
-          <a:lstStyle/>
-          <a:p>
-            <a:pPr>
-              <a:buNone/>
-            </a:pPr>
-            <a:r>
-              <a:rPr lang="sv-SE" dirty="0" smtClean="0"/>
-              <a:t>[</a:t>
-            </a:r>
-            <a:r>
-              <a:rPr lang="sv-SE" dirty="0" err="1" smtClean="0"/>
-              <a:t>ClassWithGettersSetters.groovy</a:t>
+              <a:t>ClassWithGettersSetters.java</a:t>
             </a:r>
             <a:r>
               <a:rPr lang="sv-SE" dirty="0" smtClean="0"/>
@@ -7457,15 +7800,11 @@
           <a:p>
             <a:r>
               <a:rPr lang="sv-SE" dirty="0" smtClean="0"/>
-              <a:t>Default </a:t>
+              <a:t>Getters/setters i </a:t>
             </a:r>
             <a:r>
               <a:rPr lang="sv-SE" dirty="0" err="1" smtClean="0"/>
-              <a:t>konstruktor</a:t>
-            </a:r>
-            <a:r>
-              <a:rPr lang="sv-SE" dirty="0" smtClean="0"/>
-              <a:t> i Java</a:t>
+              <a:t>Groovy</a:t>
             </a:r>
             <a:endParaRPr lang="sv-SE" dirty="0"/>
           </a:p>
@@ -7495,7 +7834,7 @@
             </a:r>
             <a:r>
               <a:rPr lang="sv-SE" dirty="0" err="1" smtClean="0"/>
-              <a:t>UsingDefaultConstructor.java</a:t>
+              <a:t>ClassWithGettersSetters.groovy</a:t>
             </a:r>
             <a:r>
               <a:rPr lang="sv-SE" dirty="0" smtClean="0"/>
@@ -7555,41 +7894,37 @@
             </a:r>
             <a:r>
               <a:rPr lang="sv-SE" dirty="0" smtClean="0"/>
-              <a:t> i </a:t>
+              <a:t> i Java</a:t>
+            </a:r>
+            <a:endParaRPr lang="sv-SE" dirty="0"/>
+          </a:p>
+        </p:txBody>
+      </p:sp>
+      <p:sp>
+        <p:nvSpPr>
+          <p:cNvPr id="3" name="Platshållare för innehåll 2"/>
+          <p:cNvSpPr>
+            <a:spLocks noGrp="1"/>
+          </p:cNvSpPr>
+          <p:nvPr>
+            <p:ph idx="1"/>
+          </p:nvPr>
+        </p:nvSpPr>
+        <p:spPr/>
+        <p:txBody>
+          <a:bodyPr/>
+          <a:lstStyle/>
+          <a:p>
+            <a:pPr>
+              <a:buNone/>
+            </a:pPr>
+            <a:r>
+              <a:rPr lang="sv-SE" dirty="0" smtClean="0"/>
+              <a:t>[</a:t>
             </a:r>
             <a:r>
               <a:rPr lang="sv-SE" dirty="0" err="1" smtClean="0"/>
-              <a:t>Groovy</a:t>
-            </a:r>
-            <a:endParaRPr lang="sv-SE" dirty="0"/>
-          </a:p>
-        </p:txBody>
-      </p:sp>
-      <p:sp>
-        <p:nvSpPr>
-          <p:cNvPr id="3" name="Platshållare för innehåll 2"/>
-          <p:cNvSpPr>
-            <a:spLocks noGrp="1"/>
-          </p:cNvSpPr>
-          <p:nvPr>
-            <p:ph idx="1"/>
-          </p:nvPr>
-        </p:nvSpPr>
-        <p:spPr/>
-        <p:txBody>
-          <a:bodyPr/>
-          <a:lstStyle/>
-          <a:p>
-            <a:pPr>
-              <a:buNone/>
-            </a:pPr>
-            <a:r>
-              <a:rPr lang="sv-SE" dirty="0" smtClean="0"/>
-              <a:t>[</a:t>
-            </a:r>
-            <a:r>
-              <a:rPr lang="sv-SE" dirty="0" err="1" smtClean="0"/>
-              <a:t>UsingDefaultConstructor.groovy</a:t>
+              <a:t>UsingDefaultConstructor.java</a:t>
             </a:r>
             <a:r>
               <a:rPr lang="sv-SE" dirty="0" smtClean="0"/>
@@ -7640,8 +7975,20 @@
           <a:lstStyle/>
           <a:p>
             <a:r>
+              <a:rPr lang="sv-SE" dirty="0" smtClean="0"/>
+              <a:t>Default </a:t>
+            </a:r>
+            <a:r>
               <a:rPr lang="sv-SE" dirty="0" err="1" smtClean="0"/>
-              <a:t>Bekvämlighetsmetoder:List</a:t>
+              <a:t>konstruktor</a:t>
+            </a:r>
+            <a:r>
+              <a:rPr lang="sv-SE" dirty="0" smtClean="0"/>
+              <a:t> i </a:t>
+            </a:r>
+            <a:r>
+              <a:rPr lang="sv-SE" dirty="0" err="1" smtClean="0"/>
+              <a:t>Groovy</a:t>
             </a:r>
             <a:endParaRPr lang="sv-SE" dirty="0"/>
           </a:p>
@@ -7671,7 +8018,7 @@
             </a:r>
             <a:r>
               <a:rPr lang="sv-SE" dirty="0" err="1" smtClean="0"/>
-              <a:t>ArrayConveniance.groovy</a:t>
+              <a:t>UsingDefaultConstructor.groovy</a:t>
             </a:r>
             <a:r>
               <a:rPr lang="sv-SE" dirty="0" smtClean="0"/>
@@ -7749,7 +8096,15 @@
             </a:pPr>
             <a:r>
               <a:rPr lang="sv-SE" dirty="0" smtClean="0"/>
-              <a:t>[ArrayConveniance2.groovy]</a:t>
+              <a:t>[</a:t>
+            </a:r>
+            <a:r>
+              <a:rPr lang="sv-SE" dirty="0" err="1" smtClean="0"/>
+              <a:t>ArrayConveniance.groovy</a:t>
+            </a:r>
+            <a:r>
+              <a:rPr lang="sv-SE" dirty="0" smtClean="0"/>
+              <a:t>]</a:t>
             </a:r>
             <a:endParaRPr lang="sv-SE" dirty="0"/>
           </a:p>
@@ -7797,7 +8152,7 @@
           <a:p>
             <a:r>
               <a:rPr lang="sv-SE" dirty="0" err="1" smtClean="0"/>
-              <a:t>Bekvämlighetsmetoder:Map</a:t>
+              <a:t>Bekvämlighetsmetoder:List</a:t>
             </a:r>
             <a:endParaRPr lang="sv-SE" dirty="0"/>
           </a:p>
@@ -7813,12 +8168,7 @@
             <p:ph idx="1"/>
           </p:nvPr>
         </p:nvSpPr>
-        <p:spPr>
-          <a:xfrm>
-            <a:off x="428596" y="1214422"/>
-            <a:ext cx="8229600" cy="4525963"/>
-          </a:xfrm>
-        </p:spPr>
+        <p:spPr/>
         <p:txBody>
           <a:bodyPr/>
           <a:lstStyle/>
@@ -7828,15 +8178,7 @@
             </a:pPr>
             <a:r>
               <a:rPr lang="sv-SE" dirty="0" smtClean="0"/>
-              <a:t>[</a:t>
-            </a:r>
-            <a:r>
-              <a:rPr lang="sv-SE" dirty="0" err="1" smtClean="0"/>
-              <a:t>MapConveniance.groovy</a:t>
-            </a:r>
-            <a:r>
-              <a:rPr lang="sv-SE" dirty="0" smtClean="0"/>
-              <a:t>]</a:t>
+              <a:t>[ArrayConveniance2.groovy]</a:t>
             </a:r>
             <a:endParaRPr lang="sv-SE" dirty="0"/>
           </a:p>
@@ -7966,12 +8308,8 @@
           <a:lstStyle/>
           <a:p>
             <a:r>
-              <a:rPr lang="sv-SE" dirty="0" smtClean="0"/>
-              <a:t>Operator </a:t>
-            </a:r>
-            <a:r>
               <a:rPr lang="sv-SE" dirty="0" err="1" smtClean="0"/>
-              <a:t>overloading</a:t>
+              <a:t>Bekvämlighetsmetoder:Map</a:t>
             </a:r>
             <a:endParaRPr lang="sv-SE" dirty="0"/>
           </a:p>
@@ -7979,7 +8317,7 @@
       </p:sp>
       <p:sp>
         <p:nvSpPr>
-          <p:cNvPr id="4" name="Platshållare för innehåll 3"/>
+          <p:cNvPr id="3" name="Platshållare för innehåll 2"/>
           <p:cNvSpPr>
             <a:spLocks noGrp="1"/>
           </p:cNvSpPr>
@@ -7987,7 +8325,12 @@
             <p:ph idx="1"/>
           </p:nvPr>
         </p:nvSpPr>
-        <p:spPr/>
+        <p:spPr>
+          <a:xfrm>
+            <a:off x="428596" y="1214422"/>
+            <a:ext cx="8229600" cy="4525963"/>
+          </a:xfrm>
+        </p:spPr>
         <p:txBody>
           <a:bodyPr/>
           <a:lstStyle/>
@@ -8001,7 +8344,7 @@
             </a:r>
             <a:r>
               <a:rPr lang="sv-SE" dirty="0" err="1" smtClean="0"/>
-              <a:t>operatorOverload.groovy</a:t>
+              <a:t>MapConveniance.groovy</a:t>
             </a:r>
             <a:r>
               <a:rPr lang="sv-SE" dirty="0" smtClean="0"/>
@@ -8016,13 +8359,6 @@
   <p:clrMapOvr>
     <a:masterClrMapping/>
   </p:clrMapOvr>
-  <p:timing>
-    <p:tnLst>
-      <p:par>
-        <p:cTn id="1" dur="indefinite" restart="never" nodeType="tmRoot"/>
-      </p:par>
-    </p:tnLst>
-  </p:timing>
 </p:sld>
 </file>
 
@@ -8090,7 +8426,15 @@
             </a:pPr>
             <a:r>
               <a:rPr lang="sv-SE" dirty="0" smtClean="0"/>
-              <a:t>[operatorOverload2.groovy]</a:t>
+              <a:t>[</a:t>
+            </a:r>
+            <a:r>
+              <a:rPr lang="sv-SE" dirty="0" err="1" smtClean="0"/>
+              <a:t>operatorOverload.groovy</a:t>
+            </a:r>
+            <a:r>
+              <a:rPr lang="sv-SE" dirty="0" smtClean="0"/>
+              <a:t>]</a:t>
             </a:r>
             <a:endParaRPr lang="sv-SE" dirty="0"/>
           </a:p>
@@ -8144,16 +8488,12 @@
           <a:lstStyle/>
           <a:p>
             <a:r>
+              <a:rPr lang="sv-SE" dirty="0" smtClean="0"/>
+              <a:t>Operator </a:t>
+            </a:r>
+            <a:r>
               <a:rPr lang="sv-SE" dirty="0" err="1" smtClean="0"/>
-              <a:t>Groovy</a:t>
-            </a:r>
-            <a:r>
-              <a:rPr lang="sv-SE" dirty="0" smtClean="0"/>
-              <a:t> </a:t>
-            </a:r>
-            <a:r>
-              <a:rPr lang="sv-SE" dirty="0" err="1" smtClean="0"/>
-              <a:t>truth</a:t>
+              <a:t>overloading</a:t>
             </a:r>
             <a:endParaRPr lang="sv-SE" dirty="0"/>
           </a:p>
@@ -8161,7 +8501,7 @@
       </p:sp>
       <p:sp>
         <p:nvSpPr>
-          <p:cNvPr id="3" name="Platshållare för innehåll 2"/>
+          <p:cNvPr id="4" name="Platshållare för innehåll 3"/>
           <p:cNvSpPr>
             <a:spLocks noGrp="1"/>
           </p:cNvSpPr>
@@ -8179,15 +8519,7 @@
             </a:pPr>
             <a:r>
               <a:rPr lang="sv-SE" dirty="0" smtClean="0"/>
-              <a:t>[</a:t>
-            </a:r>
-            <a:r>
-              <a:rPr lang="sv-SE" dirty="0" err="1" smtClean="0"/>
-              <a:t>HelloWorldWithParameters.java</a:t>
-            </a:r>
-            <a:r>
-              <a:rPr lang="sv-SE" dirty="0" smtClean="0"/>
-              <a:t>]</a:t>
+              <a:t>[operatorOverload2.groovy]</a:t>
             </a:r>
             <a:endParaRPr lang="sv-SE" dirty="0"/>
           </a:p>
@@ -8198,6 +8530,13 @@
   <p:clrMapOvr>
     <a:masterClrMapping/>
   </p:clrMapOvr>
+  <p:timing>
+    <p:tnLst>
+      <p:par>
+        <p:cTn id="1" dur="indefinite" restart="never" nodeType="tmRoot"/>
+      </p:par>
+    </p:tnLst>
+  </p:timing>
 </p:sld>
 </file>
 
@@ -8230,22 +8569,20 @@
         </p:nvSpPr>
         <p:spPr/>
         <p:txBody>
-          <a:bodyPr>
-            <a:normAutofit fontScale="90000"/>
-          </a:bodyPr>
-          <a:lstStyle/>
-          <a:p>
-            <a:r>
-              <a:rPr lang="sv-SE" dirty="0" smtClean="0"/>
-              <a:t>Java: </a:t>
-            </a:r>
+          <a:bodyPr/>
+          <a:lstStyle/>
+          <a:p>
             <a:r>
               <a:rPr lang="sv-SE" dirty="0" err="1" smtClean="0"/>
-              <a:t>mainmetod</a:t>
-            </a:r>
-            <a:r>
-              <a:rPr lang="sv-SE" dirty="0" smtClean="0"/>
-              <a:t> med parameter</a:t>
+              <a:t>Groovy</a:t>
+            </a:r>
+            <a:r>
+              <a:rPr lang="sv-SE" dirty="0" smtClean="0"/>
+              <a:t> </a:t>
+            </a:r>
+            <a:r>
+              <a:rPr lang="sv-SE" dirty="0" err="1" smtClean="0"/>
+              <a:t>truth</a:t>
             </a:r>
             <a:endParaRPr lang="sv-SE" dirty="0"/>
           </a:p>
@@ -8275,7 +8612,7 @@
             </a:r>
             <a:r>
               <a:rPr lang="sv-SE" dirty="0" err="1" smtClean="0"/>
-              <a:t>helloWorldWithParameters.groovy</a:t>
+              <a:t>HelloWorldWithParameters.java</a:t>
             </a:r>
             <a:r>
               <a:rPr lang="sv-SE" dirty="0" smtClean="0"/>
@@ -8328,12 +8665,8 @@
           <a:lstStyle/>
           <a:p>
             <a:r>
-              <a:rPr lang="sv-SE" dirty="0" err="1" smtClean="0"/>
-              <a:t>Groovy</a:t>
-            </a:r>
-            <a:r>
-              <a:rPr lang="sv-SE" dirty="0" smtClean="0"/>
-              <a:t>: </a:t>
+              <a:rPr lang="sv-SE" dirty="0" smtClean="0"/>
+              <a:t>Java: </a:t>
             </a:r>
             <a:r>
               <a:rPr lang="sv-SE" dirty="0" err="1" smtClean="0"/>
@@ -8371,7 +8704,7 @@
             </a:r>
             <a:r>
               <a:rPr lang="sv-SE" dirty="0" err="1" smtClean="0"/>
-              <a:t>TestGroovyTruth.groovy</a:t>
+              <a:t>helloWorldWithParameters.groovy</a:t>
             </a:r>
             <a:r>
               <a:rPr lang="sv-SE" dirty="0" smtClean="0"/>
@@ -8418,16 +8751,26 @@
         </p:nvSpPr>
         <p:spPr/>
         <p:txBody>
-          <a:bodyPr/>
+          <a:bodyPr>
+            <a:normAutofit fontScale="90000"/>
+          </a:bodyPr>
           <a:lstStyle/>
           <a:p>
             <a:r>
               <a:rPr lang="sv-SE" dirty="0" err="1" smtClean="0"/>
-              <a:t>Optional</a:t>
-            </a:r>
-            <a:r>
-              <a:rPr lang="sv-SE" dirty="0" smtClean="0"/>
-              <a:t> parameters i Java</a:t>
+              <a:t>Groovy</a:t>
+            </a:r>
+            <a:r>
+              <a:rPr lang="sv-SE" dirty="0" smtClean="0"/>
+              <a:t>: </a:t>
+            </a:r>
+            <a:r>
+              <a:rPr lang="sv-SE" dirty="0" err="1" smtClean="0"/>
+              <a:t>mainmetod</a:t>
+            </a:r>
+            <a:r>
+              <a:rPr lang="sv-SE" dirty="0" smtClean="0"/>
+              <a:t> med parameter</a:t>
             </a:r>
             <a:endParaRPr lang="sv-SE" dirty="0"/>
           </a:p>
@@ -8457,7 +8800,7 @@
             </a:r>
             <a:r>
               <a:rPr lang="sv-SE" dirty="0" err="1" smtClean="0"/>
-              <a:t>optionalParameters.java</a:t>
+              <a:t>TestGroovyTruth.groovy</a:t>
             </a:r>
             <a:r>
               <a:rPr lang="sv-SE" dirty="0" smtClean="0"/>
@@ -8513,41 +8856,37 @@
             </a:r>
             <a:r>
               <a:rPr lang="sv-SE" dirty="0" smtClean="0"/>
-              <a:t> parameters i </a:t>
+              <a:t> parameters i Java</a:t>
+            </a:r>
+            <a:endParaRPr lang="sv-SE" dirty="0"/>
+          </a:p>
+        </p:txBody>
+      </p:sp>
+      <p:sp>
+        <p:nvSpPr>
+          <p:cNvPr id="3" name="Platshållare för innehåll 2"/>
+          <p:cNvSpPr>
+            <a:spLocks noGrp="1"/>
+          </p:cNvSpPr>
+          <p:nvPr>
+            <p:ph idx="1"/>
+          </p:nvPr>
+        </p:nvSpPr>
+        <p:spPr/>
+        <p:txBody>
+          <a:bodyPr/>
+          <a:lstStyle/>
+          <a:p>
+            <a:pPr>
+              <a:buNone/>
+            </a:pPr>
+            <a:r>
+              <a:rPr lang="sv-SE" dirty="0" smtClean="0"/>
+              <a:t>[</a:t>
             </a:r>
             <a:r>
               <a:rPr lang="sv-SE" dirty="0" err="1" smtClean="0"/>
-              <a:t>Groovy</a:t>
-            </a:r>
-            <a:endParaRPr lang="sv-SE" dirty="0"/>
-          </a:p>
-        </p:txBody>
-      </p:sp>
-      <p:sp>
-        <p:nvSpPr>
-          <p:cNvPr id="3" name="Platshållare för innehåll 2"/>
-          <p:cNvSpPr>
-            <a:spLocks noGrp="1"/>
-          </p:cNvSpPr>
-          <p:nvPr>
-            <p:ph idx="1"/>
-          </p:nvPr>
-        </p:nvSpPr>
-        <p:spPr/>
-        <p:txBody>
-          <a:bodyPr/>
-          <a:lstStyle/>
-          <a:p>
-            <a:pPr>
-              <a:buNone/>
-            </a:pPr>
-            <a:r>
-              <a:rPr lang="sv-SE" dirty="0" smtClean="0"/>
-              <a:t>[</a:t>
-            </a:r>
-            <a:r>
-              <a:rPr lang="sv-SE" dirty="0" err="1" smtClean="0"/>
-              <a:t>optionalParameter.groovy</a:t>
+              <a:t>optionalParameters.java</a:t>
             </a:r>
             <a:r>
               <a:rPr lang="sv-SE" dirty="0" smtClean="0"/>
@@ -8566,6 +8905,96 @@
 </file>
 
 <file path=ppt/slides/slide47.xml><?xml version="1.0" encoding="utf-8"?>
+<p:sld xmlns:a="http://schemas.openxmlformats.org/drawingml/2006/main" xmlns:r="http://schemas.openxmlformats.org/officeDocument/2006/relationships" xmlns:p="http://schemas.openxmlformats.org/presentationml/2006/main">
+  <p:cSld>
+    <p:spTree>
+      <p:nvGrpSpPr>
+        <p:cNvPr id="1" name=""/>
+        <p:cNvGrpSpPr/>
+        <p:nvPr/>
+      </p:nvGrpSpPr>
+      <p:grpSpPr>
+        <a:xfrm>
+          <a:off x="0" y="0"/>
+          <a:ext cx="0" cy="0"/>
+          <a:chOff x="0" y="0"/>
+          <a:chExt cx="0" cy="0"/>
+        </a:xfrm>
+      </p:grpSpPr>
+      <p:sp>
+        <p:nvSpPr>
+          <p:cNvPr id="2" name="Rubrik 1"/>
+          <p:cNvSpPr>
+            <a:spLocks noGrp="1"/>
+          </p:cNvSpPr>
+          <p:nvPr>
+            <p:ph type="title"/>
+          </p:nvPr>
+        </p:nvSpPr>
+        <p:spPr/>
+        <p:txBody>
+          <a:bodyPr/>
+          <a:lstStyle/>
+          <a:p>
+            <a:r>
+              <a:rPr lang="sv-SE" dirty="0" err="1" smtClean="0"/>
+              <a:t>Optional</a:t>
+            </a:r>
+            <a:r>
+              <a:rPr lang="sv-SE" dirty="0" smtClean="0"/>
+              <a:t> parameters i </a:t>
+            </a:r>
+            <a:r>
+              <a:rPr lang="sv-SE" dirty="0" err="1" smtClean="0"/>
+              <a:t>Groovy</a:t>
+            </a:r>
+            <a:endParaRPr lang="sv-SE" dirty="0"/>
+          </a:p>
+        </p:txBody>
+      </p:sp>
+      <p:sp>
+        <p:nvSpPr>
+          <p:cNvPr id="3" name="Platshållare för innehåll 2"/>
+          <p:cNvSpPr>
+            <a:spLocks noGrp="1"/>
+          </p:cNvSpPr>
+          <p:nvPr>
+            <p:ph idx="1"/>
+          </p:nvPr>
+        </p:nvSpPr>
+        <p:spPr/>
+        <p:txBody>
+          <a:bodyPr/>
+          <a:lstStyle/>
+          <a:p>
+            <a:pPr>
+              <a:buNone/>
+            </a:pPr>
+            <a:r>
+              <a:rPr lang="sv-SE" dirty="0" smtClean="0"/>
+              <a:t>[</a:t>
+            </a:r>
+            <a:r>
+              <a:rPr lang="sv-SE" dirty="0" err="1" smtClean="0"/>
+              <a:t>optionalParameter.groovy</a:t>
+            </a:r>
+            <a:r>
+              <a:rPr lang="sv-SE" dirty="0" smtClean="0"/>
+              <a:t>]</a:t>
+            </a:r>
+            <a:endParaRPr lang="sv-SE" dirty="0"/>
+          </a:p>
+        </p:txBody>
+      </p:sp>
+    </p:spTree>
+  </p:cSld>
+  <p:clrMapOvr>
+    <a:masterClrMapping/>
+  </p:clrMapOvr>
+</p:sld>
+</file>
+
+<file path=ppt/slides/slide48.xml><?xml version="1.0" encoding="utf-8"?>
 <p:sld xmlns:a="http://schemas.openxmlformats.org/drawingml/2006/main" xmlns:r="http://schemas.openxmlformats.org/officeDocument/2006/relationships" xmlns:p="http://schemas.openxmlformats.org/presentationml/2006/main">
   <p:cSld>
     <p:spTree>
@@ -8692,92 +9121,6 @@
 </p:sld>
 </file>
 
-<file path=ppt/slides/slide48.xml><?xml version="1.0" encoding="utf-8"?>
-<p:sld xmlns:a="http://schemas.openxmlformats.org/drawingml/2006/main" xmlns:r="http://schemas.openxmlformats.org/officeDocument/2006/relationships" xmlns:p="http://schemas.openxmlformats.org/presentationml/2006/main">
-  <p:cSld>
-    <p:spTree>
-      <p:nvGrpSpPr>
-        <p:cNvPr id="1" name=""/>
-        <p:cNvGrpSpPr/>
-        <p:nvPr/>
-      </p:nvGrpSpPr>
-      <p:grpSpPr>
-        <a:xfrm>
-          <a:off x="0" y="0"/>
-          <a:ext cx="0" cy="0"/>
-          <a:chOff x="0" y="0"/>
-          <a:chExt cx="0" cy="0"/>
-        </a:xfrm>
-      </p:grpSpPr>
-      <p:sp>
-        <p:nvSpPr>
-          <p:cNvPr id="2" name="Rubrik 1"/>
-          <p:cNvSpPr>
-            <a:spLocks noGrp="1"/>
-          </p:cNvSpPr>
-          <p:nvPr>
-            <p:ph type="title"/>
-          </p:nvPr>
-        </p:nvSpPr>
-        <p:spPr/>
-        <p:txBody>
-          <a:bodyPr/>
-          <a:lstStyle/>
-          <a:p>
-            <a:r>
-              <a:rPr lang="sv-SE" dirty="0" err="1" smtClean="0"/>
-              <a:t>Regular</a:t>
-            </a:r>
-            <a:r>
-              <a:rPr lang="sv-SE" dirty="0" smtClean="0"/>
-              <a:t> expressions</a:t>
-            </a:r>
-            <a:endParaRPr lang="sv-SE" dirty="0"/>
-          </a:p>
-        </p:txBody>
-      </p:sp>
-      <p:sp>
-        <p:nvSpPr>
-          <p:cNvPr id="3" name="Platshållare för innehåll 2"/>
-          <p:cNvSpPr>
-            <a:spLocks noGrp="1"/>
-          </p:cNvSpPr>
-          <p:nvPr>
-            <p:ph idx="1"/>
-          </p:nvPr>
-        </p:nvSpPr>
-        <p:spPr/>
-        <p:txBody>
-          <a:bodyPr/>
-          <a:lstStyle/>
-          <a:p>
-            <a:pPr>
-              <a:buNone/>
-            </a:pPr>
-            <a:r>
-              <a:rPr lang="sv-SE" dirty="0" smtClean="0"/>
-              <a:t>[</a:t>
-            </a:r>
-            <a:r>
-              <a:rPr lang="sv-SE" dirty="0" err="1" smtClean="0"/>
-              <a:t>TestRegExp.groovy</a:t>
-            </a:r>
-            <a:r>
-              <a:rPr lang="sv-SE" dirty="0" smtClean="0"/>
-              <a:t>]</a:t>
-            </a:r>
-            <a:endParaRPr lang="sv-SE" dirty="0"/>
-          </a:p>
-        </p:txBody>
-      </p:sp>
-    </p:spTree>
-  </p:cSld>
-  <p:clrMapOvr>
-    <a:masterClrMapping/>
-  </p:clrMapOvr>
-</p:sld>
-</file>
-
 <file path=ppt/slides/slide49.xml><?xml version="1.0" encoding="utf-8"?>
 <p:sld xmlns:a="http://schemas.openxmlformats.org/drawingml/2006/main" xmlns:r="http://schemas.openxmlformats.org/officeDocument/2006/relationships" xmlns:p="http://schemas.openxmlformats.org/presentationml/2006/main">
   <p:cSld>
@@ -8811,8 +9154,12 @@
           <a:lstStyle/>
           <a:p>
             <a:r>
-              <a:rPr lang="sv-SE" dirty="0" smtClean="0"/>
-              <a:t>Primitives</a:t>
+              <a:rPr lang="sv-SE" dirty="0" err="1" smtClean="0"/>
+              <a:t>Regular</a:t>
+            </a:r>
+            <a:r>
+              <a:rPr lang="sv-SE" dirty="0" smtClean="0"/>
+              <a:t> expressions</a:t>
             </a:r>
             <a:endParaRPr lang="sv-SE" dirty="0"/>
           </a:p>
@@ -8842,7 +9189,7 @@
             </a:r>
             <a:r>
               <a:rPr lang="sv-SE" dirty="0" err="1" smtClean="0"/>
-              <a:t>Primitives.groovy</a:t>
+              <a:t>TestRegExp.groovy</a:t>
             </a:r>
             <a:r>
               <a:rPr lang="sv-SE" dirty="0" smtClean="0"/>
@@ -9011,99 +9358,48 @@
         </p:nvSpPr>
         <p:spPr/>
         <p:txBody>
-          <a:bodyPr>
-            <a:normAutofit fontScale="90000"/>
-          </a:bodyPr>
-          <a:lstStyle/>
-          <a:p>
+          <a:bodyPr/>
+          <a:lstStyle/>
+          <a:p>
+            <a:r>
+              <a:rPr lang="sv-SE" dirty="0" smtClean="0"/>
+              <a:t>Primitives</a:t>
+            </a:r>
+            <a:endParaRPr lang="sv-SE" dirty="0"/>
+          </a:p>
+        </p:txBody>
+      </p:sp>
+      <p:sp>
+        <p:nvSpPr>
+          <p:cNvPr id="3" name="Platshållare för innehåll 2"/>
+          <p:cNvSpPr>
+            <a:spLocks noGrp="1"/>
+          </p:cNvSpPr>
+          <p:nvPr>
+            <p:ph idx="1"/>
+          </p:nvPr>
+        </p:nvSpPr>
+        <p:spPr/>
+        <p:txBody>
+          <a:bodyPr/>
+          <a:lstStyle/>
+          <a:p>
+            <a:pPr>
+              <a:buNone/>
+            </a:pPr>
+            <a:r>
+              <a:rPr lang="sv-SE" dirty="0" smtClean="0"/>
+              <a:t>[</a:t>
+            </a:r>
             <a:r>
               <a:rPr lang="sv-SE" dirty="0" err="1" smtClean="0"/>
-              <a:t>Groovy</a:t>
-            </a:r>
-            <a:r>
-              <a:rPr lang="sv-SE" dirty="0" smtClean="0"/>
-              <a:t> har stöd för samtliga Java 5-features:</a:t>
-            </a:r>
-          </a:p>
-        </p:txBody>
-      </p:sp>
-      <p:sp>
-        <p:nvSpPr>
-          <p:cNvPr id="3" name="Platshållare för innehåll 2"/>
-          <p:cNvSpPr>
-            <a:spLocks noGrp="1"/>
-          </p:cNvSpPr>
-          <p:nvPr>
-            <p:ph idx="1"/>
-          </p:nvPr>
-        </p:nvSpPr>
-        <p:spPr/>
-        <p:txBody>
-          <a:bodyPr>
-            <a:normAutofit lnSpcReduction="10000"/>
-          </a:bodyPr>
-          <a:lstStyle/>
-          <a:p>
-            <a:r>
-              <a:rPr lang="sv-SE" dirty="0" err="1" smtClean="0"/>
-              <a:t>Generics</a:t>
-            </a:r>
-            <a:endParaRPr lang="sv-SE" dirty="0" smtClean="0"/>
-          </a:p>
-          <a:p>
-            <a:r>
-              <a:rPr lang="sv-SE" dirty="0" err="1" smtClean="0"/>
-              <a:t>For-each</a:t>
-            </a:r>
-            <a:endParaRPr lang="sv-SE" dirty="0" smtClean="0"/>
-          </a:p>
-          <a:p>
-            <a:r>
-              <a:rPr lang="sv-SE" dirty="0" err="1" smtClean="0"/>
-              <a:t>Autoboxing</a:t>
-            </a:r>
-            <a:r>
-              <a:rPr lang="sv-SE" dirty="0" smtClean="0"/>
-              <a:t> (fungerar även om man kör java 1.4)</a:t>
-            </a:r>
-          </a:p>
-          <a:p>
-            <a:r>
-              <a:rPr lang="sv-SE" dirty="0" err="1" smtClean="0"/>
-              <a:t>Enum</a:t>
-            </a:r>
-            <a:endParaRPr lang="sv-SE" dirty="0" smtClean="0"/>
-          </a:p>
-          <a:p>
-            <a:r>
-              <a:rPr lang="sv-SE" dirty="0" smtClean="0"/>
-              <a:t>Annotations (fungerar dock ej att skapa egna i </a:t>
-            </a:r>
-            <a:r>
-              <a:rPr lang="sv-SE" dirty="0" err="1" smtClean="0"/>
-              <a:t>Groovy</a:t>
-            </a:r>
-            <a:r>
-              <a:rPr lang="sv-SE" dirty="0" smtClean="0"/>
-              <a:t>)</a:t>
-            </a:r>
-          </a:p>
-          <a:p>
-            <a:r>
-              <a:rPr lang="sv-SE" dirty="0" err="1" smtClean="0"/>
-              <a:t>Varargs</a:t>
-            </a:r>
-            <a:endParaRPr lang="sv-SE" dirty="0" smtClean="0"/>
-          </a:p>
-          <a:p>
-            <a:r>
-              <a:rPr lang="sv-SE" dirty="0" err="1" smtClean="0"/>
-              <a:t>Static</a:t>
-            </a:r>
-            <a:r>
-              <a:rPr lang="sv-SE" dirty="0" smtClean="0"/>
-              <a:t> import</a:t>
-            </a:r>
+              <a:t>Primitives.groovy</a:t>
+            </a:r>
+            <a:r>
+              <a:rPr lang="sv-SE" dirty="0" smtClean="0"/>
+              <a:t>]</a:t>
+            </a:r>
+            <a:endParaRPr lang="sv-SE" dirty="0"/>
           </a:p>
         </p:txBody>
       </p:sp>
@@ -9144,18 +9440,19 @@
         </p:nvSpPr>
         <p:spPr/>
         <p:txBody>
-          <a:bodyPr/>
-          <a:lstStyle/>
-          <a:p>
-            <a:r>
-              <a:rPr lang="sv-SE" dirty="0" smtClean="0"/>
-              <a:t>Java 5 i </a:t>
-            </a:r>
+          <a:bodyPr>
+            <a:normAutofit fontScale="90000"/>
+          </a:bodyPr>
+          <a:lstStyle/>
+          <a:p>
             <a:r>
               <a:rPr lang="sv-SE" dirty="0" err="1" smtClean="0"/>
               <a:t>Groovy</a:t>
             </a:r>
-            <a:endParaRPr lang="sv-SE" dirty="0"/>
+            <a:r>
+              <a:rPr lang="sv-SE" dirty="0" smtClean="0"/>
+              <a:t> har stöd för samtliga Java 5-features:</a:t>
+            </a:r>
           </a:p>
         </p:txBody>
       </p:sp>
@@ -9171,17 +9468,71 @@
         </p:nvSpPr>
         <p:spPr/>
         <p:txBody>
-          <a:bodyPr/>
-          <a:lstStyle/>
-          <a:p>
-            <a:pPr>
-              <a:buNone/>
-            </a:pPr>
-            <a:r>
-              <a:rPr lang="sv-SE" dirty="0" smtClean="0"/>
-              <a:t>[GroovyWithJava5.groovy]</a:t>
-            </a:r>
-            <a:endParaRPr lang="sv-SE" dirty="0"/>
+          <a:bodyPr>
+            <a:normAutofit lnSpcReduction="10000"/>
+          </a:bodyPr>
+          <a:lstStyle/>
+          <a:p>
+            <a:r>
+              <a:rPr lang="sv-SE" dirty="0" err="1" smtClean="0"/>
+              <a:t>Generics</a:t>
+            </a:r>
+            <a:endParaRPr lang="sv-SE" dirty="0" smtClean="0"/>
+          </a:p>
+          <a:p>
+            <a:r>
+              <a:rPr lang="sv-SE" dirty="0" err="1" smtClean="0"/>
+              <a:t>For-each</a:t>
+            </a:r>
+            <a:endParaRPr lang="sv-SE" dirty="0" smtClean="0"/>
+          </a:p>
+          <a:p>
+            <a:r>
+              <a:rPr lang="sv-SE" dirty="0" err="1" smtClean="0"/>
+              <a:t>Autoboxing</a:t>
+            </a:r>
+            <a:r>
+              <a:rPr lang="sv-SE" dirty="0" smtClean="0"/>
+              <a:t> (fungerar även om man kör java 1.4)</a:t>
+            </a:r>
+          </a:p>
+          <a:p>
+            <a:r>
+              <a:rPr lang="sv-SE" dirty="0" err="1" smtClean="0"/>
+              <a:t>Enum</a:t>
+            </a:r>
+            <a:endParaRPr lang="sv-SE" dirty="0" smtClean="0"/>
+          </a:p>
+          <a:p>
+            <a:r>
+              <a:rPr lang="sv-SE" dirty="0" smtClean="0"/>
+              <a:t>Annotations (fungerar dock ej att skapa egna i </a:t>
+            </a:r>
+            <a:r>
+              <a:rPr lang="sv-SE" dirty="0" err="1" smtClean="0"/>
+              <a:t>Groovy</a:t>
+            </a:r>
+            <a:r>
+              <a:rPr lang="sv-SE" dirty="0" smtClean="0"/>
+              <a:t>)</a:t>
+            </a:r>
+          </a:p>
+          <a:p>
+            <a:r>
+              <a:rPr lang="sv-SE" dirty="0" err="1" smtClean="0"/>
+              <a:t>Varargs</a:t>
+            </a:r>
+            <a:endParaRPr lang="sv-SE" dirty="0" smtClean="0"/>
+          </a:p>
+          <a:p>
+            <a:r>
+              <a:rPr lang="sv-SE" dirty="0" err="1" smtClean="0"/>
+              <a:t>Static</a:t>
+            </a:r>
+            <a:r>
+              <a:rPr lang="sv-SE" dirty="0" smtClean="0"/>
+              <a:t> import</a:t>
+            </a:r>
           </a:p>
         </p:txBody>
       </p:sp>
@@ -9226,12 +9577,12 @@
           <a:lstStyle/>
           <a:p>
             <a:r>
+              <a:rPr lang="sv-SE" dirty="0" smtClean="0"/>
+              <a:t>Java 5 i </a:t>
+            </a:r>
+            <a:r>
               <a:rPr lang="sv-SE" dirty="0" err="1" smtClean="0"/>
-              <a:t>Closures</a:t>
-            </a:r>
-            <a:r>
-              <a:rPr lang="sv-SE" dirty="0" smtClean="0"/>
-              <a:t>: fördjupning</a:t>
+              <a:t>Groovy</a:t>
             </a:r>
             <a:endParaRPr lang="sv-SE" dirty="0"/>
           </a:p>
@@ -9252,9 +9603,12 @@
           <a:bodyPr/>
           <a:lstStyle/>
           <a:p>
-            <a:r>
-              <a:rPr lang="sv-SE" dirty="0" smtClean="0"/>
-              <a:t>Exempel: Summera alla jämna tal från 1 till 10</a:t>
+            <a:pPr>
+              <a:buNone/>
+            </a:pPr>
+            <a:r>
+              <a:rPr lang="sv-SE" dirty="0" smtClean="0"/>
+              <a:t>[GroovyWithJava5.groovy]</a:t>
             </a:r>
             <a:endParaRPr lang="sv-SE" dirty="0"/>
           </a:p>
@@ -9297,14 +9651,16 @@
         </p:nvSpPr>
         <p:spPr/>
         <p:txBody>
-          <a:bodyPr>
-            <a:normAutofit fontScale="90000"/>
-          </a:bodyPr>
-          <a:lstStyle/>
-          <a:p>
-            <a:r>
-              <a:rPr lang="sv-SE" dirty="0" smtClean="0"/>
-              <a:t>Summera alla jämna tal från 1 till 10</a:t>
+          <a:bodyPr/>
+          <a:lstStyle/>
+          <a:p>
+            <a:r>
+              <a:rPr lang="sv-SE" dirty="0" err="1" smtClean="0"/>
+              <a:t>Closures</a:t>
+            </a:r>
+            <a:r>
+              <a:rPr lang="sv-SE" dirty="0" smtClean="0"/>
+              <a:t>: fördjupning</a:t>
             </a:r>
             <a:endParaRPr lang="sv-SE" dirty="0"/>
           </a:p>
@@ -9325,20 +9681,9 @@
           <a:bodyPr/>
           <a:lstStyle/>
           <a:p>
-            <a:pPr>
-              <a:buNone/>
-            </a:pPr>
-            <a:r>
-              <a:rPr lang="sv-SE" dirty="0" smtClean="0"/>
-              <a:t>[</a:t>
-            </a:r>
-            <a:r>
-              <a:rPr lang="sv-SE" dirty="0" err="1" smtClean="0"/>
-              <a:t>sumEvenNumbers.java</a:t>
-            </a:r>
-            <a:r>
-              <a:rPr lang="sv-SE" dirty="0" smtClean="0"/>
-              <a:t>]</a:t>
+            <a:r>
+              <a:rPr lang="sv-SE" dirty="0" smtClean="0"/>
+              <a:t>Exempel: Summera alla jämna tal från 1 till 10</a:t>
             </a:r>
             <a:endParaRPr lang="sv-SE" dirty="0"/>
           </a:p>
@@ -9382,13 +9727,13 @@
         <p:spPr/>
         <p:txBody>
           <a:bodyPr>
-            <a:normAutofit/>
+            <a:normAutofit fontScale="90000"/>
           </a:bodyPr>
           <a:lstStyle/>
           <a:p>
             <a:r>
               <a:rPr lang="sv-SE" dirty="0" smtClean="0"/>
-              <a:t>Multiplicera jämna tal 1 till 10</a:t>
+              <a:t>Summera alla jämna tal från 1 till 10</a:t>
             </a:r>
             <a:endParaRPr lang="sv-SE" dirty="0"/>
           </a:p>
@@ -9418,7 +9763,7 @@
             </a:r>
             <a:r>
               <a:rPr lang="sv-SE" dirty="0" err="1" smtClean="0"/>
-              <a:t>MultiplyEvenNumbers.java</a:t>
+              <a:t>sumEvenNumbers.java</a:t>
             </a:r>
             <a:r>
               <a:rPr lang="sv-SE" dirty="0" smtClean="0"/>
@@ -9466,13 +9811,13 @@
         <p:spPr/>
         <p:txBody>
           <a:bodyPr>
-            <a:normAutofit fontScale="90000"/>
+            <a:normAutofit/>
           </a:bodyPr>
           <a:lstStyle/>
           <a:p>
             <a:r>
               <a:rPr lang="sv-SE" dirty="0" smtClean="0"/>
-              <a:t>Skapa en lista med kvadraten av alla jämna tal 1 till 10</a:t>
+              <a:t>Multiplicera jämna tal 1 till 10</a:t>
             </a:r>
             <a:endParaRPr lang="sv-SE" dirty="0"/>
           </a:p>
@@ -9502,7 +9847,7 @@
             </a:r>
             <a:r>
               <a:rPr lang="sv-SE" dirty="0" err="1" smtClean="0"/>
-              <a:t>squareEvenNumbers.java</a:t>
+              <a:t>MultiplyEvenNumbers.java</a:t>
             </a:r>
             <a:r>
               <a:rPr lang="sv-SE" dirty="0" smtClean="0"/>
@@ -9549,69 +9894,48 @@
         </p:nvSpPr>
         <p:spPr/>
         <p:txBody>
-          <a:bodyPr/>
-          <a:lstStyle/>
-          <a:p>
-            <a:r>
-              <a:rPr lang="sv-SE" dirty="0" smtClean="0"/>
-              <a:t>DRY </a:t>
+          <a:bodyPr>
+            <a:normAutofit fontScale="90000"/>
+          </a:bodyPr>
+          <a:lstStyle/>
+          <a:p>
+            <a:r>
+              <a:rPr lang="sv-SE" dirty="0" smtClean="0"/>
+              <a:t>Skapa en lista med kvadraten av alla jämna tal 1 till 10</a:t>
+            </a:r>
+            <a:endParaRPr lang="sv-SE" dirty="0"/>
+          </a:p>
+        </p:txBody>
+      </p:sp>
+      <p:sp>
+        <p:nvSpPr>
+          <p:cNvPr id="3" name="Platshållare för innehåll 2"/>
+          <p:cNvSpPr>
+            <a:spLocks noGrp="1"/>
+          </p:cNvSpPr>
+          <p:nvPr>
+            <p:ph idx="1"/>
+          </p:nvPr>
+        </p:nvSpPr>
+        <p:spPr/>
+        <p:txBody>
+          <a:bodyPr/>
+          <a:lstStyle/>
+          <a:p>
+            <a:pPr>
+              <a:buNone/>
+            </a:pPr>
+            <a:r>
+              <a:rPr lang="sv-SE" dirty="0" smtClean="0"/>
+              <a:t>[</a:t>
             </a:r>
             <a:r>
               <a:rPr lang="sv-SE" dirty="0" err="1" smtClean="0"/>
-              <a:t>principle</a:t>
-            </a:r>
-            <a:r>
-              <a:rPr lang="sv-SE" dirty="0" smtClean="0"/>
-              <a:t>:</a:t>
-            </a:r>
-            <a:endParaRPr lang="sv-SE" dirty="0"/>
-          </a:p>
-        </p:txBody>
-      </p:sp>
-      <p:sp>
-        <p:nvSpPr>
-          <p:cNvPr id="3" name="Platshållare för innehåll 2"/>
-          <p:cNvSpPr>
-            <a:spLocks noGrp="1"/>
-          </p:cNvSpPr>
-          <p:nvPr>
-            <p:ph idx="1"/>
-          </p:nvPr>
-        </p:nvSpPr>
-        <p:spPr/>
-        <p:txBody>
-          <a:bodyPr/>
-          <a:lstStyle/>
-          <a:p>
-            <a:r>
-              <a:rPr lang="sv-SE" dirty="0" err="1" smtClean="0"/>
-              <a:t>Don't</a:t>
-            </a:r>
-            <a:r>
-              <a:rPr lang="sv-SE" dirty="0" smtClean="0"/>
-              <a:t> </a:t>
-            </a:r>
-            <a:r>
-              <a:rPr lang="sv-SE" dirty="0" err="1" smtClean="0"/>
-              <a:t>repeat</a:t>
-            </a:r>
-            <a:r>
-              <a:rPr lang="sv-SE" dirty="0" smtClean="0"/>
-              <a:t> </a:t>
-            </a:r>
-            <a:r>
-              <a:rPr lang="sv-SE" dirty="0" err="1" smtClean="0"/>
-              <a:t>yourself</a:t>
-            </a:r>
-            <a:endParaRPr lang="sv-SE" dirty="0" smtClean="0"/>
-          </a:p>
-          <a:p>
-            <a:pPr>
-              <a:buNone/>
-            </a:pPr>
-            <a:r>
-              <a:rPr lang="sv-SE" dirty="0" smtClean="0"/>
-              <a:t>[bild på hängande tvätt?]</a:t>
+              <a:t>squareEvenNumbers.java</a:t>
+            </a:r>
+            <a:r>
+              <a:rPr lang="sv-SE" dirty="0" smtClean="0"/>
+              <a:t>]</a:t>
             </a:r>
             <a:endParaRPr lang="sv-SE" dirty="0"/>
           </a:p>
@@ -9659,7 +9983,15 @@
           <a:p>
             <a:r>
               <a:rPr lang="sv-SE" dirty="0" smtClean="0"/>
-              <a:t>Kan man återanvända loopen?</a:t>
+              <a:t>DRY </a:t>
+            </a:r>
+            <a:r>
+              <a:rPr lang="sv-SE" dirty="0" err="1" smtClean="0"/>
+              <a:t>principle</a:t>
+            </a:r>
+            <a:r>
+              <a:rPr lang="sv-SE" dirty="0" smtClean="0"/>
+              <a:t>:</a:t>
             </a:r>
             <a:endParaRPr lang="sv-SE" dirty="0"/>
           </a:p>
@@ -9680,20 +10012,35 @@
           <a:bodyPr/>
           <a:lstStyle/>
           <a:p>
+            <a:r>
+              <a:rPr lang="sv-SE" dirty="0" err="1" smtClean="0"/>
+              <a:t>Don't</a:t>
+            </a:r>
+            <a:r>
+              <a:rPr lang="sv-SE" dirty="0" smtClean="0"/>
+              <a:t> </a:t>
+            </a:r>
+            <a:r>
+              <a:rPr lang="sv-SE" dirty="0" err="1" smtClean="0"/>
+              <a:t>repeat</a:t>
+            </a:r>
+            <a:r>
+              <a:rPr lang="sv-SE" dirty="0" smtClean="0"/>
+              <a:t> </a:t>
+            </a:r>
+            <a:r>
+              <a:rPr lang="sv-SE" dirty="0" err="1" smtClean="0"/>
+              <a:t>yourself</a:t>
+            </a:r>
+            <a:endParaRPr lang="sv-SE" dirty="0" smtClean="0"/>
+          </a:p>
+          <a:p>
             <a:pPr>
               <a:buNone/>
             </a:pPr>
             <a:r>
               <a:rPr lang="sv-SE" dirty="0" smtClean="0"/>
-              <a:t>[</a:t>
-            </a:r>
-            <a:r>
-              <a:rPr lang="sv-SE" dirty="0" err="1" smtClean="0"/>
-              <a:t>LoopEvenNumbers.groovy</a:t>
-            </a:r>
-            <a:r>
-              <a:rPr lang="sv-SE" dirty="0" smtClean="0"/>
-              <a:t>]</a:t>
+              <a:t>[bild på hängande tvätt?]</a:t>
             </a:r>
             <a:endParaRPr lang="sv-SE" dirty="0"/>
           </a:p>
@@ -9741,7 +10088,7 @@
           <a:p>
             <a:r>
               <a:rPr lang="sv-SE" dirty="0" smtClean="0"/>
-              <a:t>Anonyma inre klasser i Java</a:t>
+              <a:t>Kan man återanvända loopen?</a:t>
             </a:r>
             <a:endParaRPr lang="sv-SE" dirty="0"/>
           </a:p>
@@ -9771,7 +10118,7 @@
             </a:r>
             <a:r>
               <a:rPr lang="sv-SE" dirty="0" err="1" smtClean="0"/>
-              <a:t>ClosureInJava.java</a:t>
+              <a:t>LoopEvenNumbers.groovy</a:t>
             </a:r>
             <a:r>
               <a:rPr lang="sv-SE" dirty="0" smtClean="0"/>
@@ -9822,51 +10169,38 @@
           <a:lstStyle/>
           <a:p>
             <a:r>
+              <a:rPr lang="sv-SE" dirty="0" smtClean="0"/>
+              <a:t>Anonyma inre klasser i Java</a:t>
+            </a:r>
+            <a:endParaRPr lang="sv-SE" dirty="0"/>
+          </a:p>
+        </p:txBody>
+      </p:sp>
+      <p:sp>
+        <p:nvSpPr>
+          <p:cNvPr id="3" name="Platshållare för innehåll 2"/>
+          <p:cNvSpPr>
+            <a:spLocks noGrp="1"/>
+          </p:cNvSpPr>
+          <p:nvPr>
+            <p:ph idx="1"/>
+          </p:nvPr>
+        </p:nvSpPr>
+        <p:spPr/>
+        <p:txBody>
+          <a:bodyPr/>
+          <a:lstStyle/>
+          <a:p>
+            <a:pPr>
+              <a:buNone/>
+            </a:pPr>
+            <a:r>
+              <a:rPr lang="sv-SE" dirty="0" smtClean="0"/>
+              <a:t>[</a:t>
+            </a:r>
+            <a:r>
               <a:rPr lang="sv-SE" dirty="0" err="1" smtClean="0"/>
-              <a:t>Closures</a:t>
-            </a:r>
-            <a:r>
-              <a:rPr lang="sv-SE" dirty="0" smtClean="0"/>
-              <a:t> i </a:t>
-            </a:r>
-            <a:r>
-              <a:rPr lang="sv-SE" dirty="0" err="1" smtClean="0"/>
-              <a:t>Groovy</a:t>
-            </a:r>
-            <a:endParaRPr lang="sv-SE" dirty="0"/>
-          </a:p>
-        </p:txBody>
-      </p:sp>
-      <p:sp>
-        <p:nvSpPr>
-          <p:cNvPr id="3" name="Platshållare för innehåll 2"/>
-          <p:cNvSpPr>
-            <a:spLocks noGrp="1"/>
-          </p:cNvSpPr>
-          <p:nvPr>
-            <p:ph idx="1"/>
-          </p:nvPr>
-        </p:nvSpPr>
-        <p:spPr>
-          <a:xfrm>
-            <a:off x="428596" y="1214422"/>
-            <a:ext cx="8229600" cy="4525963"/>
-          </a:xfrm>
-        </p:spPr>
-        <p:txBody>
-          <a:bodyPr/>
-          <a:lstStyle/>
-          <a:p>
-            <a:pPr>
-              <a:buNone/>
-            </a:pPr>
-            <a:r>
-              <a:rPr lang="sv-SE" dirty="0" smtClean="0"/>
-              <a:t>[</a:t>
-            </a:r>
-            <a:r>
-              <a:rPr lang="sv-SE" dirty="0" err="1" smtClean="0"/>
-              <a:t>Closures.groovy</a:t>
+              <a:t>ClosureInJava.java</a:t>
             </a:r>
             <a:r>
               <a:rPr lang="sv-SE" dirty="0" smtClean="0"/>
@@ -9881,13 +10215,6 @@
   <p:clrMapOvr>
     <a:masterClrMapping/>
   </p:clrMapOvr>
-  <p:timing>
-    <p:tnLst>
-      <p:par>
-        <p:cTn id="1" dur="indefinite" restart="never" nodeType="tmRoot"/>
-      </p:par>
-    </p:tnLst>
-  </p:timing>
 </p:sld>
 </file>
 
@@ -10005,6 +10332,108 @@
   <p:clrMapOvr>
     <a:masterClrMapping/>
   </p:clrMapOvr>
+</p:sld>
+</file>
+
+<file path=ppt/slides/slide60.xml><?xml version="1.0" encoding="utf-8"?>
+<p:sld xmlns:a="http://schemas.openxmlformats.org/drawingml/2006/main" xmlns:r="http://schemas.openxmlformats.org/officeDocument/2006/relationships" xmlns:p="http://schemas.openxmlformats.org/presentationml/2006/main">
+  <p:cSld>
+    <p:spTree>
+      <p:nvGrpSpPr>
+        <p:cNvPr id="1" name=""/>
+        <p:cNvGrpSpPr/>
+        <p:nvPr/>
+      </p:nvGrpSpPr>
+      <p:grpSpPr>
+        <a:xfrm>
+          <a:off x="0" y="0"/>
+          <a:ext cx="0" cy="0"/>
+          <a:chOff x="0" y="0"/>
+          <a:chExt cx="0" cy="0"/>
+        </a:xfrm>
+      </p:grpSpPr>
+      <p:sp>
+        <p:nvSpPr>
+          <p:cNvPr id="2" name="Rubrik 1"/>
+          <p:cNvSpPr>
+            <a:spLocks noGrp="1"/>
+          </p:cNvSpPr>
+          <p:nvPr>
+            <p:ph type="title"/>
+          </p:nvPr>
+        </p:nvSpPr>
+        <p:spPr/>
+        <p:txBody>
+          <a:bodyPr/>
+          <a:lstStyle/>
+          <a:p>
+            <a:r>
+              <a:rPr lang="sv-SE" dirty="0" err="1" smtClean="0"/>
+              <a:t>Closures</a:t>
+            </a:r>
+            <a:r>
+              <a:rPr lang="sv-SE" dirty="0" smtClean="0"/>
+              <a:t> i </a:t>
+            </a:r>
+            <a:r>
+              <a:rPr lang="sv-SE" dirty="0" err="1" smtClean="0"/>
+              <a:t>Groovy</a:t>
+            </a:r>
+            <a:endParaRPr lang="sv-SE" dirty="0"/>
+          </a:p>
+        </p:txBody>
+      </p:sp>
+      <p:sp>
+        <p:nvSpPr>
+          <p:cNvPr id="3" name="Platshållare för innehåll 2"/>
+          <p:cNvSpPr>
+            <a:spLocks noGrp="1"/>
+          </p:cNvSpPr>
+          <p:nvPr>
+            <p:ph idx="1"/>
+          </p:nvPr>
+        </p:nvSpPr>
+        <p:spPr>
+          <a:xfrm>
+            <a:off x="428596" y="1214422"/>
+            <a:ext cx="8229600" cy="4525963"/>
+          </a:xfrm>
+        </p:spPr>
+        <p:txBody>
+          <a:bodyPr/>
+          <a:lstStyle/>
+          <a:p>
+            <a:pPr>
+              <a:buNone/>
+            </a:pPr>
+            <a:r>
+              <a:rPr lang="sv-SE" dirty="0" smtClean="0"/>
+              <a:t>[</a:t>
+            </a:r>
+            <a:r>
+              <a:rPr lang="sv-SE" dirty="0" err="1" smtClean="0"/>
+              <a:t>Closures.groovy</a:t>
+            </a:r>
+            <a:r>
+              <a:rPr lang="sv-SE" dirty="0" smtClean="0"/>
+              <a:t>]</a:t>
+            </a:r>
+            <a:endParaRPr lang="sv-SE" dirty="0"/>
+          </a:p>
+        </p:txBody>
+      </p:sp>
+    </p:spTree>
+  </p:cSld>
+  <p:clrMapOvr>
+    <a:masterClrMapping/>
+  </p:clrMapOvr>
+  <p:timing>
+    <p:tnLst>
+      <p:par>
+        <p:cTn id="1" dur="indefinite" restart="never" nodeType="tmRoot"/>
+      </p:par>
+    </p:tnLst>
+  </p:timing>
 </p:sld>
 </file>
 
@@ -10243,39 +10672,6 @@
           </a:p>
         </p:txBody>
       </p:sp>
-      <p:pic>
-        <p:nvPicPr>
-          <p:cNvPr id="1026" name="Picture 2"/>
-          <p:cNvPicPr>
-            <a:picLocks noChangeAspect="1" noChangeArrowheads="1"/>
-          </p:cNvPicPr>
-          <p:nvPr/>
-        </p:nvPicPr>
-        <p:blipFill>
-          <a:blip r:embed="rId2"/>
-          <a:srcRect/>
-          <a:stretch>
-            <a:fillRect/>
-          </a:stretch>
-        </p:blipFill>
-        <p:spPr bwMode="auto">
-          <a:xfrm>
-            <a:off x="7658100" y="4387488"/>
-            <a:ext cx="1485900" cy="1714500"/>
-          </a:xfrm>
-          <a:prstGeom prst="rect">
-            <a:avLst/>
-          </a:prstGeom>
-          <a:noFill/>
-          <a:ln w="9525">
-            <a:noFill/>
-            <a:miter lim="800000"/>
-            <a:headEnd/>
-            <a:tailEnd/>
-          </a:ln>
-          <a:effectLst/>
-        </p:spPr>
-      </p:pic>
     </p:spTree>
   </p:cSld>
   <p:clrMapOvr>
@@ -10352,6 +10748,19 @@
           <a:lstStyle/>
           <a:p>
             <a:r>
+              <a:rPr lang="sv-SE" dirty="0" smtClean="0"/>
+              <a:t>Mindre kod att skriva</a:t>
+            </a:r>
+          </a:p>
+          <a:p>
+            <a:r>
+              <a:rPr lang="sv-SE" dirty="0" smtClean="0"/>
+              <a:t>Mindre kod att läsa</a:t>
+            </a:r>
+            <a:endParaRPr lang="sv-SE" dirty="0" smtClean="0"/>
+          </a:p>
+          <a:p>
+            <a:r>
               <a:rPr lang="sv-SE" dirty="0" err="1" smtClean="0"/>
               <a:t>Closures</a:t>
             </a:r>
@@ -10359,12 +10768,19 @@
               <a:rPr lang="sv-SE" dirty="0" smtClean="0"/>
               <a:t> </a:t>
             </a:r>
+            <a:endParaRPr lang="sv-SE" dirty="0" smtClean="0"/>
           </a:p>
           <a:p>
             <a:r>
               <a:rPr lang="sv-SE" dirty="0" smtClean="0"/>
               <a:t>Metaprogrammering</a:t>
             </a:r>
+          </a:p>
+          <a:p>
+            <a:pPr>
+              <a:buNone/>
+            </a:pPr>
+            <a:endParaRPr lang="sv-SE" dirty="0" smtClean="0"/>
           </a:p>
           <a:p>
             <a:pPr>

</xml_diff>

<commit_message>
lagt till en sammanfattning
</commit_message>
<xml_diff>
--- a/groovyseminarie/dokument/groovyseminarium_source_w_logo.pptx
+++ b/groovyseminarie/dokument/groovyseminarium_source_w_logo.pptx
@@ -5,10 +5,10 @@
     <p:sldMasterId id="2147483683" r:id="rId1"/>
   </p:sldMasterIdLst>
   <p:notesMasterIdLst>
-    <p:notesMasterId r:id="rId60"/>
+    <p:notesMasterId r:id="rId61"/>
   </p:notesMasterIdLst>
   <p:handoutMasterIdLst>
-    <p:handoutMasterId r:id="rId61"/>
+    <p:handoutMasterId r:id="rId62"/>
   </p:handoutMasterIdLst>
   <p:sldIdLst>
     <p:sldId id="268" r:id="rId2"/>
@@ -61,14 +61,15 @@
     <p:sldId id="316" r:id="rId49"/>
     <p:sldId id="317" r:id="rId50"/>
     <p:sldId id="318" r:id="rId51"/>
-    <p:sldId id="320" r:id="rId52"/>
-    <p:sldId id="321" r:id="rId53"/>
-    <p:sldId id="322" r:id="rId54"/>
-    <p:sldId id="323" r:id="rId55"/>
-    <p:sldId id="324" r:id="rId56"/>
-    <p:sldId id="325" r:id="rId57"/>
-    <p:sldId id="326" r:id="rId58"/>
-    <p:sldId id="327" r:id="rId59"/>
+    <p:sldId id="336" r:id="rId52"/>
+    <p:sldId id="320" r:id="rId53"/>
+    <p:sldId id="321" r:id="rId54"/>
+    <p:sldId id="322" r:id="rId55"/>
+    <p:sldId id="323" r:id="rId56"/>
+    <p:sldId id="324" r:id="rId57"/>
+    <p:sldId id="325" r:id="rId58"/>
+    <p:sldId id="326" r:id="rId59"/>
+    <p:sldId id="327" r:id="rId60"/>
   </p:sldIdLst>
   <p:sldSz cx="9144000" cy="6858000" type="screen4x3"/>
   <p:notesSz cx="6711950" cy="9844088"/>
@@ -9943,12 +9944,8 @@
           <a:lstStyle/>
           <a:p>
             <a:r>
-              <a:rPr lang="sv-SE" dirty="0" err="1" smtClean="0"/>
-              <a:t>Closures</a:t>
-            </a:r>
-            <a:r>
-              <a:rPr lang="sv-SE" dirty="0" smtClean="0"/>
-              <a:t>: fördjupning</a:t>
+              <a:rPr lang="sv-SE" dirty="0" smtClean="0"/>
+              <a:t>Sammanfattning</a:t>
             </a:r>
             <a:endParaRPr lang="sv-SE" dirty="0"/>
           </a:p>
@@ -9971,7 +9968,17 @@
           <a:p>
             <a:r>
               <a:rPr lang="sv-SE" dirty="0" smtClean="0"/>
-              <a:t>Exempel: Summera alla jämna tal från 1 till 10</a:t>
+              <a:t>Helt kompatibelt med Java</a:t>
+            </a:r>
+          </a:p>
+          <a:p>
+            <a:r>
+              <a:rPr lang="sv-SE" dirty="0" smtClean="0"/>
+              <a:t>Underlättar Javautveckling på ett </a:t>
+            </a:r>
+            <a:r>
+              <a:rPr lang="sv-SE" smtClean="0"/>
+              <a:t>antal sätt</a:t>
             </a:r>
             <a:endParaRPr lang="sv-SE" dirty="0"/>
           </a:p>
@@ -10014,14 +10021,16 @@
         </p:nvSpPr>
         <p:spPr/>
         <p:txBody>
-          <a:bodyPr>
-            <a:normAutofit fontScale="90000"/>
-          </a:bodyPr>
-          <a:lstStyle/>
-          <a:p>
-            <a:r>
-              <a:rPr lang="sv-SE" dirty="0" smtClean="0"/>
-              <a:t>Summera alla jämna tal från 1 till 10</a:t>
+          <a:bodyPr/>
+          <a:lstStyle/>
+          <a:p>
+            <a:r>
+              <a:rPr lang="sv-SE" dirty="0" err="1" smtClean="0"/>
+              <a:t>Closures</a:t>
+            </a:r>
+            <a:r>
+              <a:rPr lang="sv-SE" dirty="0" smtClean="0"/>
+              <a:t>: fördjupning</a:t>
             </a:r>
             <a:endParaRPr lang="sv-SE" dirty="0"/>
           </a:p>
@@ -10042,20 +10051,9 @@
           <a:bodyPr/>
           <a:lstStyle/>
           <a:p>
-            <a:pPr>
-              <a:buNone/>
-            </a:pPr>
-            <a:r>
-              <a:rPr lang="sv-SE" dirty="0" smtClean="0"/>
-              <a:t>[</a:t>
-            </a:r>
-            <a:r>
-              <a:rPr lang="sv-SE" dirty="0" err="1" smtClean="0"/>
-              <a:t>sumEvenNumbers.java</a:t>
-            </a:r>
-            <a:r>
-              <a:rPr lang="sv-SE" dirty="0" smtClean="0"/>
-              <a:t>]</a:t>
+            <a:r>
+              <a:rPr lang="sv-SE" dirty="0" smtClean="0"/>
+              <a:t>Exempel: Summera alla jämna tal från 1 till 10</a:t>
             </a:r>
             <a:endParaRPr lang="sv-SE" dirty="0"/>
           </a:p>
@@ -10099,13 +10097,13 @@
         <p:spPr/>
         <p:txBody>
           <a:bodyPr>
-            <a:normAutofit/>
+            <a:normAutofit fontScale="90000"/>
           </a:bodyPr>
           <a:lstStyle/>
           <a:p>
             <a:r>
               <a:rPr lang="sv-SE" dirty="0" smtClean="0"/>
-              <a:t>Multiplicera jämna tal 1 till 10</a:t>
+              <a:t>Summera alla jämna tal från 1 till 10</a:t>
             </a:r>
             <a:endParaRPr lang="sv-SE" dirty="0"/>
           </a:p>
@@ -10135,7 +10133,7 @@
             </a:r>
             <a:r>
               <a:rPr lang="sv-SE" dirty="0" err="1" smtClean="0"/>
-              <a:t>MultiplyEvenNumbers.java</a:t>
+              <a:t>sumEvenNumbers.java</a:t>
             </a:r>
             <a:r>
               <a:rPr lang="sv-SE" dirty="0" smtClean="0"/>
@@ -10154,6 +10152,90 @@
 </file>
 
 <file path=ppt/slides/slide54.xml><?xml version="1.0" encoding="utf-8"?>
+<p:sld xmlns:a="http://schemas.openxmlformats.org/drawingml/2006/main" xmlns:r="http://schemas.openxmlformats.org/officeDocument/2006/relationships" xmlns:p="http://schemas.openxmlformats.org/presentationml/2006/main">
+  <p:cSld>
+    <p:spTree>
+      <p:nvGrpSpPr>
+        <p:cNvPr id="1" name=""/>
+        <p:cNvGrpSpPr/>
+        <p:nvPr/>
+      </p:nvGrpSpPr>
+      <p:grpSpPr>
+        <a:xfrm>
+          <a:off x="0" y="0"/>
+          <a:ext cx="0" cy="0"/>
+          <a:chOff x="0" y="0"/>
+          <a:chExt cx="0" cy="0"/>
+        </a:xfrm>
+      </p:grpSpPr>
+      <p:sp>
+        <p:nvSpPr>
+          <p:cNvPr id="2" name="Rubrik 1"/>
+          <p:cNvSpPr>
+            <a:spLocks noGrp="1"/>
+          </p:cNvSpPr>
+          <p:nvPr>
+            <p:ph type="title"/>
+          </p:nvPr>
+        </p:nvSpPr>
+        <p:spPr/>
+        <p:txBody>
+          <a:bodyPr>
+            <a:normAutofit/>
+          </a:bodyPr>
+          <a:lstStyle/>
+          <a:p>
+            <a:r>
+              <a:rPr lang="sv-SE" dirty="0" smtClean="0"/>
+              <a:t>Multiplicera jämna tal 1 till 10</a:t>
+            </a:r>
+            <a:endParaRPr lang="sv-SE" dirty="0"/>
+          </a:p>
+        </p:txBody>
+      </p:sp>
+      <p:sp>
+        <p:nvSpPr>
+          <p:cNvPr id="3" name="Platshållare för innehåll 2"/>
+          <p:cNvSpPr>
+            <a:spLocks noGrp="1"/>
+          </p:cNvSpPr>
+          <p:nvPr>
+            <p:ph idx="1"/>
+          </p:nvPr>
+        </p:nvSpPr>
+        <p:spPr/>
+        <p:txBody>
+          <a:bodyPr/>
+          <a:lstStyle/>
+          <a:p>
+            <a:pPr>
+              <a:buNone/>
+            </a:pPr>
+            <a:r>
+              <a:rPr lang="sv-SE" dirty="0" smtClean="0"/>
+              <a:t>[</a:t>
+            </a:r>
+            <a:r>
+              <a:rPr lang="sv-SE" dirty="0" err="1" smtClean="0"/>
+              <a:t>MultiplyEvenNumbers.java</a:t>
+            </a:r>
+            <a:r>
+              <a:rPr lang="sv-SE" dirty="0" smtClean="0"/>
+              <a:t>]</a:t>
+            </a:r>
+            <a:endParaRPr lang="sv-SE" dirty="0"/>
+          </a:p>
+        </p:txBody>
+      </p:sp>
+    </p:spTree>
+  </p:cSld>
+  <p:clrMapOvr>
+    <a:masterClrMapping/>
+  </p:clrMapOvr>
+</p:sld>
+</file>
+
+<file path=ppt/slides/slide55.xml><?xml version="1.0" encoding="utf-8"?>
 <p:sld xmlns:a="http://schemas.openxmlformats.org/drawingml/2006/main" xmlns:r="http://schemas.openxmlformats.org/officeDocument/2006/relationships" xmlns:p="http://schemas.openxmlformats.org/presentationml/2006/main">
   <p:cSld>
     <p:spTree>
@@ -10270,7 +10352,7 @@
 </p:sld>
 </file>
 
-<file path=ppt/slides/slide55.xml><?xml version="1.0" encoding="utf-8"?>
+<file path=ppt/slides/slide56.xml><?xml version="1.0" encoding="utf-8"?>
 <p:sld xmlns:a="http://schemas.openxmlformats.org/drawingml/2006/main" xmlns:r="http://schemas.openxmlformats.org/officeDocument/2006/relationships" xmlns:p="http://schemas.openxmlformats.org/presentationml/2006/main">
   <p:cSld>
     <p:spTree>
@@ -10411,7 +10493,7 @@
 </p:sld>
 </file>
 
-<file path=ppt/slides/slide56.xml><?xml version="1.0" encoding="utf-8"?>
+<file path=ppt/slides/slide57.xml><?xml version="1.0" encoding="utf-8"?>
 <p:sld xmlns:a="http://schemas.openxmlformats.org/drawingml/2006/main" xmlns:r="http://schemas.openxmlformats.org/officeDocument/2006/relationships" xmlns:p="http://schemas.openxmlformats.org/presentationml/2006/main">
   <p:cSld>
     <p:spTree>
@@ -10533,7 +10615,7 @@
 </p:sld>
 </file>
 
-<file path=ppt/slides/slide57.xml><?xml version="1.0" encoding="utf-8"?>
+<file path=ppt/slides/slide58.xml><?xml version="1.0" encoding="utf-8"?>
 <p:sld xmlns:a="http://schemas.openxmlformats.org/drawingml/2006/main" xmlns:r="http://schemas.openxmlformats.org/officeDocument/2006/relationships" xmlns:p="http://schemas.openxmlformats.org/presentationml/2006/main">
   <p:cSld>
     <p:spTree>
@@ -10622,7 +10704,7 @@
 </p:sld>
 </file>
 
-<file path=ppt/slides/slide58.xml><?xml version="1.0" encoding="utf-8"?>
+<file path=ppt/slides/slide59.xml><?xml version="1.0" encoding="utf-8"?>
 <p:sld xmlns:a="http://schemas.openxmlformats.org/drawingml/2006/main" xmlns:r="http://schemas.openxmlformats.org/officeDocument/2006/relationships" xmlns:p="http://schemas.openxmlformats.org/presentationml/2006/main">
   <p:cSld>
     <p:spTree>

</xml_diff>

<commit_message>
tagit bort getters/setters från dokument
</commit_message>
<xml_diff>
--- a/groovyseminarie/dokument/groovyseminarium_source_w_logo.pptx
+++ b/groovyseminarie/dokument/groovyseminarium_source_w_logo.pptx
@@ -5,10 +5,10 @@
     <p:sldMasterId id="2147483683" r:id="rId1"/>
   </p:sldMasterIdLst>
   <p:notesMasterIdLst>
-    <p:notesMasterId r:id="rId61"/>
+    <p:notesMasterId r:id="rId59"/>
   </p:notesMasterIdLst>
   <p:handoutMasterIdLst>
-    <p:handoutMasterId r:id="rId62"/>
+    <p:handoutMasterId r:id="rId60"/>
   </p:handoutMasterIdLst>
   <p:sldIdLst>
     <p:sldId id="268" r:id="rId2"/>
@@ -47,29 +47,27 @@
     <p:sldId id="299" r:id="rId35"/>
     <p:sldId id="334" r:id="rId36"/>
     <p:sldId id="335" r:id="rId37"/>
-    <p:sldId id="300" r:id="rId38"/>
-    <p:sldId id="301" r:id="rId39"/>
-    <p:sldId id="302" r:id="rId40"/>
-    <p:sldId id="303" r:id="rId41"/>
-    <p:sldId id="304" r:id="rId42"/>
-    <p:sldId id="306" r:id="rId43"/>
-    <p:sldId id="307" r:id="rId44"/>
-    <p:sldId id="308" r:id="rId45"/>
-    <p:sldId id="312" r:id="rId46"/>
-    <p:sldId id="313" r:id="rId47"/>
-    <p:sldId id="315" r:id="rId48"/>
-    <p:sldId id="316" r:id="rId49"/>
-    <p:sldId id="317" r:id="rId50"/>
-    <p:sldId id="318" r:id="rId51"/>
-    <p:sldId id="336" r:id="rId52"/>
-    <p:sldId id="320" r:id="rId53"/>
-    <p:sldId id="321" r:id="rId54"/>
-    <p:sldId id="322" r:id="rId55"/>
-    <p:sldId id="323" r:id="rId56"/>
-    <p:sldId id="324" r:id="rId57"/>
-    <p:sldId id="325" r:id="rId58"/>
-    <p:sldId id="326" r:id="rId59"/>
-    <p:sldId id="327" r:id="rId60"/>
+    <p:sldId id="302" r:id="rId38"/>
+    <p:sldId id="303" r:id="rId39"/>
+    <p:sldId id="304" r:id="rId40"/>
+    <p:sldId id="306" r:id="rId41"/>
+    <p:sldId id="307" r:id="rId42"/>
+    <p:sldId id="308" r:id="rId43"/>
+    <p:sldId id="312" r:id="rId44"/>
+    <p:sldId id="313" r:id="rId45"/>
+    <p:sldId id="315" r:id="rId46"/>
+    <p:sldId id="316" r:id="rId47"/>
+    <p:sldId id="317" r:id="rId48"/>
+    <p:sldId id="318" r:id="rId49"/>
+    <p:sldId id="336" r:id="rId50"/>
+    <p:sldId id="320" r:id="rId51"/>
+    <p:sldId id="321" r:id="rId52"/>
+    <p:sldId id="322" r:id="rId53"/>
+    <p:sldId id="323" r:id="rId54"/>
+    <p:sldId id="324" r:id="rId55"/>
+    <p:sldId id="325" r:id="rId56"/>
+    <p:sldId id="326" r:id="rId57"/>
+    <p:sldId id="327" r:id="rId58"/>
   </p:sldIdLst>
   <p:sldSz cx="9144000" cy="6858000" type="screen4x3"/>
   <p:notesSz cx="6711950" cy="9844088"/>
@@ -7356,13 +7354,11 @@
           <a:p>
             <a:r>
               <a:rPr lang="sv-SE" sz="2000" dirty="0" smtClean="0"/>
-              <a:t>Slippa generera getters/setter</a:t>
-            </a:r>
-          </a:p>
-          <a:p>
+              <a:t>Enklare </a:t>
+            </a:r>
             <a:r>
               <a:rPr lang="sv-SE" sz="2000" dirty="0" smtClean="0"/>
-              <a:t>Enklare att skapa objekt med default </a:t>
+              <a:t>att skapa objekt med default </a:t>
             </a:r>
             <a:r>
               <a:rPr lang="sv-SE" sz="2000" dirty="0" err="1" smtClean="0"/>
@@ -8432,7 +8428,15 @@
           <a:p>
             <a:r>
               <a:rPr lang="sv-SE" dirty="0" smtClean="0"/>
-              <a:t>Getters/setters i Java</a:t>
+              <a:t>Default </a:t>
+            </a:r>
+            <a:r>
+              <a:rPr lang="sv-SE" dirty="0" err="1" smtClean="0"/>
+              <a:t>konstruktor</a:t>
+            </a:r>
+            <a:r>
+              <a:rPr lang="sv-SE" dirty="0" smtClean="0"/>
+              <a:t> i Java</a:t>
             </a:r>
             <a:endParaRPr lang="sv-SE" dirty="0"/>
           </a:p>
@@ -8462,7 +8466,7 @@
             </a:r>
             <a:r>
               <a:rPr lang="sv-SE" dirty="0" err="1" smtClean="0"/>
-              <a:t>ClassWithGettersSetters.java</a:t>
+              <a:t>UsingDefaultConstructor.java</a:t>
             </a:r>
             <a:r>
               <a:rPr lang="sv-SE" dirty="0" smtClean="0"/>
@@ -8514,7 +8518,15 @@
           <a:p>
             <a:r>
               <a:rPr lang="sv-SE" dirty="0" smtClean="0"/>
-              <a:t>Getters/setters i </a:t>
+              <a:t>Default </a:t>
+            </a:r>
+            <a:r>
+              <a:rPr lang="sv-SE" dirty="0" err="1" smtClean="0"/>
+              <a:t>konstruktor</a:t>
+            </a:r>
+            <a:r>
+              <a:rPr lang="sv-SE" dirty="0" smtClean="0"/>
+              <a:t> i </a:t>
             </a:r>
             <a:r>
               <a:rPr lang="sv-SE" dirty="0" err="1" smtClean="0"/>
@@ -8548,7 +8560,7 @@
             </a:r>
             <a:r>
               <a:rPr lang="sv-SE" dirty="0" err="1" smtClean="0"/>
-              <a:t>ClassWithGettersSetters.groovy</a:t>
+              <a:t>UsingDefaultConstructor.groovy</a:t>
             </a:r>
             <a:r>
               <a:rPr lang="sv-SE" dirty="0" smtClean="0"/>
@@ -8599,16 +8611,8 @@
           <a:lstStyle/>
           <a:p>
             <a:r>
-              <a:rPr lang="sv-SE" dirty="0" smtClean="0"/>
-              <a:t>Default </a:t>
-            </a:r>
-            <a:r>
               <a:rPr lang="sv-SE" dirty="0" err="1" smtClean="0"/>
-              <a:t>konstruktor</a:t>
-            </a:r>
-            <a:r>
-              <a:rPr lang="sv-SE" dirty="0" smtClean="0"/>
-              <a:t> i Java</a:t>
+              <a:t>Bekvämlighetsmetoder:List</a:t>
             </a:r>
             <a:endParaRPr lang="sv-SE" dirty="0"/>
           </a:p>
@@ -8624,7 +8628,12 @@
             <p:ph idx="1"/>
           </p:nvPr>
         </p:nvSpPr>
-        <p:spPr/>
+        <p:spPr>
+          <a:xfrm>
+            <a:off x="469900" y="1171435"/>
+            <a:ext cx="8229600" cy="4443412"/>
+          </a:xfrm>
+        </p:spPr>
         <p:txBody>
           <a:bodyPr/>
           <a:lstStyle/>
@@ -8638,7 +8647,7 @@
             </a:r>
             <a:r>
               <a:rPr lang="sv-SE" dirty="0" err="1" smtClean="0"/>
-              <a:t>UsingDefaultConstructor.java</a:t>
+              <a:t>ArrayConveniance.groovy</a:t>
             </a:r>
             <a:r>
               <a:rPr lang="sv-SE" dirty="0" smtClean="0"/>
@@ -8772,20 +8781,8 @@
           <a:lstStyle/>
           <a:p>
             <a:r>
-              <a:rPr lang="sv-SE" dirty="0" smtClean="0"/>
-              <a:t>Default </a:t>
-            </a:r>
-            <a:r>
               <a:rPr lang="sv-SE" dirty="0" err="1" smtClean="0"/>
-              <a:t>konstruktor</a:t>
-            </a:r>
-            <a:r>
-              <a:rPr lang="sv-SE" dirty="0" smtClean="0"/>
-              <a:t> i </a:t>
-            </a:r>
-            <a:r>
-              <a:rPr lang="sv-SE" dirty="0" err="1" smtClean="0"/>
-              <a:t>Groovy</a:t>
+              <a:t>Bekvämlighetsmetoder:Map</a:t>
             </a:r>
             <a:endParaRPr lang="sv-SE" dirty="0"/>
           </a:p>
@@ -8801,7 +8798,12 @@
             <p:ph idx="1"/>
           </p:nvPr>
         </p:nvSpPr>
-        <p:spPr/>
+        <p:spPr>
+          <a:xfrm>
+            <a:off x="428596" y="1214422"/>
+            <a:ext cx="8229600" cy="4525963"/>
+          </a:xfrm>
+        </p:spPr>
         <p:txBody>
           <a:bodyPr/>
           <a:lstStyle/>
@@ -8815,7 +8817,7 @@
             </a:r>
             <a:r>
               <a:rPr lang="sv-SE" dirty="0" err="1" smtClean="0"/>
-              <a:t>UsingDefaultConstructor.groovy</a:t>
+              <a:t>MapConveniance.groovy</a:t>
             </a:r>
             <a:r>
               <a:rPr lang="sv-SE" dirty="0" smtClean="0"/>
@@ -8866,8 +8868,12 @@
           <a:lstStyle/>
           <a:p>
             <a:r>
+              <a:rPr lang="sv-SE" dirty="0" smtClean="0"/>
+              <a:t>Operator </a:t>
+            </a:r>
+            <a:r>
               <a:rPr lang="sv-SE" dirty="0" err="1" smtClean="0"/>
-              <a:t>Bekvämlighetsmetoder:List</a:t>
+              <a:t>overloading</a:t>
             </a:r>
             <a:endParaRPr lang="sv-SE" dirty="0"/>
           </a:p>
@@ -8875,7 +8881,7 @@
       </p:sp>
       <p:sp>
         <p:nvSpPr>
-          <p:cNvPr id="3" name="Platshållare för innehåll 2"/>
+          <p:cNvPr id="4" name="Platshållare för innehåll 3"/>
           <p:cNvSpPr>
             <a:spLocks noGrp="1"/>
           </p:cNvSpPr>
@@ -8883,12 +8889,7 @@
             <p:ph idx="1"/>
           </p:nvPr>
         </p:nvSpPr>
-        <p:spPr>
-          <a:xfrm>
-            <a:off x="469900" y="1171435"/>
-            <a:ext cx="8229600" cy="4443412"/>
-          </a:xfrm>
-        </p:spPr>
+        <p:spPr/>
         <p:txBody>
           <a:bodyPr/>
           <a:lstStyle/>
@@ -8902,7 +8903,7 @@
             </a:r>
             <a:r>
               <a:rPr lang="sv-SE" dirty="0" err="1" smtClean="0"/>
-              <a:t>ArrayConveniance.groovy</a:t>
+              <a:t>operatorOverload.groovy</a:t>
             </a:r>
             <a:r>
               <a:rPr lang="sv-SE" dirty="0" smtClean="0"/>
@@ -8917,6 +8918,13 @@
   <p:clrMapOvr>
     <a:masterClrMapping/>
   </p:clrMapOvr>
+  <p:timing>
+    <p:tnLst>
+      <p:par>
+        <p:cTn id="1" dur="indefinite" restart="never" nodeType="tmRoot"/>
+      </p:par>
+    </p:tnLst>
+  </p:timing>
 </p:sld>
 </file>
 
@@ -8953,8 +8961,12 @@
           <a:lstStyle/>
           <a:p>
             <a:r>
+              <a:rPr lang="sv-SE" dirty="0" smtClean="0"/>
+              <a:t>Operator </a:t>
+            </a:r>
+            <a:r>
               <a:rPr lang="sv-SE" dirty="0" err="1" smtClean="0"/>
-              <a:t>Bekvämlighetsmetoder:Map</a:t>
+              <a:t>overloading</a:t>
             </a:r>
             <a:endParaRPr lang="sv-SE" dirty="0"/>
           </a:p>
@@ -8962,7 +8974,7 @@
       </p:sp>
       <p:sp>
         <p:nvSpPr>
-          <p:cNvPr id="3" name="Platshållare för innehåll 2"/>
+          <p:cNvPr id="4" name="Platshållare för innehåll 3"/>
           <p:cNvSpPr>
             <a:spLocks noGrp="1"/>
           </p:cNvSpPr>
@@ -8970,12 +8982,7 @@
             <p:ph idx="1"/>
           </p:nvPr>
         </p:nvSpPr>
-        <p:spPr>
-          <a:xfrm>
-            <a:off x="428596" y="1214422"/>
-            <a:ext cx="8229600" cy="4525963"/>
-          </a:xfrm>
-        </p:spPr>
+        <p:spPr/>
         <p:txBody>
           <a:bodyPr/>
           <a:lstStyle/>
@@ -8985,15 +8992,7 @@
             </a:pPr>
             <a:r>
               <a:rPr lang="sv-SE" dirty="0" smtClean="0"/>
-              <a:t>[</a:t>
-            </a:r>
-            <a:r>
-              <a:rPr lang="sv-SE" dirty="0" err="1" smtClean="0"/>
-              <a:t>MapConveniance.groovy</a:t>
-            </a:r>
-            <a:r>
-              <a:rPr lang="sv-SE" dirty="0" smtClean="0"/>
-              <a:t>]</a:t>
+              <a:t>[operatorOverload2.groovy]</a:t>
             </a:r>
             <a:endParaRPr lang="sv-SE" dirty="0"/>
           </a:p>
@@ -9004,6 +9003,13 @@
   <p:clrMapOvr>
     <a:masterClrMapping/>
   </p:clrMapOvr>
+  <p:timing>
+    <p:tnLst>
+      <p:par>
+        <p:cTn id="1" dur="indefinite" restart="never" nodeType="tmRoot"/>
+      </p:par>
+    </p:tnLst>
+  </p:timing>
 </p:sld>
 </file>
 
@@ -9040,12 +9046,12 @@
           <a:lstStyle/>
           <a:p>
             <a:r>
-              <a:rPr lang="sv-SE" dirty="0" smtClean="0"/>
-              <a:t>Operator </a:t>
-            </a:r>
-            <a:r>
               <a:rPr lang="sv-SE" dirty="0" err="1" smtClean="0"/>
-              <a:t>overloading</a:t>
+              <a:t>Optional</a:t>
+            </a:r>
+            <a:r>
+              <a:rPr lang="sv-SE" dirty="0" smtClean="0"/>
+              <a:t> parameters i Java</a:t>
             </a:r>
             <a:endParaRPr lang="sv-SE" dirty="0"/>
           </a:p>
@@ -9053,7 +9059,7 @@
       </p:sp>
       <p:sp>
         <p:nvSpPr>
-          <p:cNvPr id="4" name="Platshållare för innehåll 3"/>
+          <p:cNvPr id="3" name="Platshållare för innehåll 2"/>
           <p:cNvSpPr>
             <a:spLocks noGrp="1"/>
           </p:cNvSpPr>
@@ -9075,7 +9081,7 @@
             </a:r>
             <a:r>
               <a:rPr lang="sv-SE" dirty="0" err="1" smtClean="0"/>
-              <a:t>operatorOverload.groovy</a:t>
+              <a:t>optionalParameters.java</a:t>
             </a:r>
             <a:r>
               <a:rPr lang="sv-SE" dirty="0" smtClean="0"/>
@@ -9090,13 +9096,6 @@
   <p:clrMapOvr>
     <a:masterClrMapping/>
   </p:clrMapOvr>
-  <p:timing>
-    <p:tnLst>
-      <p:par>
-        <p:cTn id="1" dur="indefinite" restart="never" nodeType="tmRoot"/>
-      </p:par>
-    </p:tnLst>
-  </p:timing>
 </p:sld>
 </file>
 
@@ -9133,12 +9132,16 @@
           <a:lstStyle/>
           <a:p>
             <a:r>
-              <a:rPr lang="sv-SE" dirty="0" smtClean="0"/>
-              <a:t>Operator </a:t>
-            </a:r>
-            <a:r>
               <a:rPr lang="sv-SE" dirty="0" err="1" smtClean="0"/>
-              <a:t>overloading</a:t>
+              <a:t>Optional</a:t>
+            </a:r>
+            <a:r>
+              <a:rPr lang="sv-SE" dirty="0" smtClean="0"/>
+              <a:t> parameters i </a:t>
+            </a:r>
+            <a:r>
+              <a:rPr lang="sv-SE" dirty="0" err="1" smtClean="0"/>
+              <a:t>Groovy</a:t>
             </a:r>
             <a:endParaRPr lang="sv-SE" dirty="0"/>
           </a:p>
@@ -9146,7 +9149,7 @@
       </p:sp>
       <p:sp>
         <p:nvSpPr>
-          <p:cNvPr id="4" name="Platshållare för innehåll 3"/>
+          <p:cNvPr id="3" name="Platshållare för innehåll 2"/>
           <p:cNvSpPr>
             <a:spLocks noGrp="1"/>
           </p:cNvSpPr>
@@ -9164,96 +9167,11 @@
             </a:pPr>
             <a:r>
               <a:rPr lang="sv-SE" dirty="0" smtClean="0"/>
-              <a:t>[operatorOverload2.groovy]</a:t>
-            </a:r>
-            <a:endParaRPr lang="sv-SE" dirty="0"/>
-          </a:p>
-        </p:txBody>
-      </p:sp>
-    </p:spTree>
-  </p:cSld>
-  <p:clrMapOvr>
-    <a:masterClrMapping/>
-  </p:clrMapOvr>
-  <p:timing>
-    <p:tnLst>
-      <p:par>
-        <p:cTn id="1" dur="indefinite" restart="never" nodeType="tmRoot"/>
-      </p:par>
-    </p:tnLst>
-  </p:timing>
-</p:sld>
-</file>
-
-<file path=ppt/slides/slide45.xml><?xml version="1.0" encoding="utf-8"?>
-<p:sld xmlns:a="http://schemas.openxmlformats.org/drawingml/2006/main" xmlns:r="http://schemas.openxmlformats.org/officeDocument/2006/relationships" xmlns:p="http://schemas.openxmlformats.org/presentationml/2006/main">
-  <p:cSld>
-    <p:spTree>
-      <p:nvGrpSpPr>
-        <p:cNvPr id="1" name=""/>
-        <p:cNvGrpSpPr/>
-        <p:nvPr/>
-      </p:nvGrpSpPr>
-      <p:grpSpPr>
-        <a:xfrm>
-          <a:off x="0" y="0"/>
-          <a:ext cx="0" cy="0"/>
-          <a:chOff x="0" y="0"/>
-          <a:chExt cx="0" cy="0"/>
-        </a:xfrm>
-      </p:grpSpPr>
-      <p:sp>
-        <p:nvSpPr>
-          <p:cNvPr id="2" name="Rubrik 1"/>
-          <p:cNvSpPr>
-            <a:spLocks noGrp="1"/>
-          </p:cNvSpPr>
-          <p:nvPr>
-            <p:ph type="title"/>
-          </p:nvPr>
-        </p:nvSpPr>
-        <p:spPr/>
-        <p:txBody>
-          <a:bodyPr/>
-          <a:lstStyle/>
-          <a:p>
+              <a:t>[</a:t>
+            </a:r>
             <a:r>
               <a:rPr lang="sv-SE" dirty="0" err="1" smtClean="0"/>
-              <a:t>Optional</a:t>
-            </a:r>
-            <a:r>
-              <a:rPr lang="sv-SE" dirty="0" smtClean="0"/>
-              <a:t> parameters i Java</a:t>
-            </a:r>
-            <a:endParaRPr lang="sv-SE" dirty="0"/>
-          </a:p>
-        </p:txBody>
-      </p:sp>
-      <p:sp>
-        <p:nvSpPr>
-          <p:cNvPr id="3" name="Platshållare för innehåll 2"/>
-          <p:cNvSpPr>
-            <a:spLocks noGrp="1"/>
-          </p:cNvSpPr>
-          <p:nvPr>
-            <p:ph idx="1"/>
-          </p:nvPr>
-        </p:nvSpPr>
-        <p:spPr/>
-        <p:txBody>
-          <a:bodyPr/>
-          <a:lstStyle/>
-          <a:p>
-            <a:pPr>
-              <a:buNone/>
-            </a:pPr>
-            <a:r>
-              <a:rPr lang="sv-SE" dirty="0" smtClean="0"/>
-              <a:t>[</a:t>
-            </a:r>
-            <a:r>
-              <a:rPr lang="sv-SE" dirty="0" err="1" smtClean="0"/>
-              <a:t>optionalParameters.java</a:t>
+              <a:t>optionalParameter.groovy</a:t>
             </a:r>
             <a:r>
               <a:rPr lang="sv-SE" dirty="0" smtClean="0"/>
@@ -9271,97 +9189,7 @@
 </p:sld>
 </file>
 
-<file path=ppt/slides/slide46.xml><?xml version="1.0" encoding="utf-8"?>
-<p:sld xmlns:a="http://schemas.openxmlformats.org/drawingml/2006/main" xmlns:r="http://schemas.openxmlformats.org/officeDocument/2006/relationships" xmlns:p="http://schemas.openxmlformats.org/presentationml/2006/main">
-  <p:cSld>
-    <p:spTree>
-      <p:nvGrpSpPr>
-        <p:cNvPr id="1" name=""/>
-        <p:cNvGrpSpPr/>
-        <p:nvPr/>
-      </p:nvGrpSpPr>
-      <p:grpSpPr>
-        <a:xfrm>
-          <a:off x="0" y="0"/>
-          <a:ext cx="0" cy="0"/>
-          <a:chOff x="0" y="0"/>
-          <a:chExt cx="0" cy="0"/>
-        </a:xfrm>
-      </p:grpSpPr>
-      <p:sp>
-        <p:nvSpPr>
-          <p:cNvPr id="2" name="Rubrik 1"/>
-          <p:cNvSpPr>
-            <a:spLocks noGrp="1"/>
-          </p:cNvSpPr>
-          <p:nvPr>
-            <p:ph type="title"/>
-          </p:nvPr>
-        </p:nvSpPr>
-        <p:spPr/>
-        <p:txBody>
-          <a:bodyPr/>
-          <a:lstStyle/>
-          <a:p>
-            <a:r>
-              <a:rPr lang="sv-SE" dirty="0" err="1" smtClean="0"/>
-              <a:t>Optional</a:t>
-            </a:r>
-            <a:r>
-              <a:rPr lang="sv-SE" dirty="0" smtClean="0"/>
-              <a:t> parameters i </a:t>
-            </a:r>
-            <a:r>
-              <a:rPr lang="sv-SE" dirty="0" err="1" smtClean="0"/>
-              <a:t>Groovy</a:t>
-            </a:r>
-            <a:endParaRPr lang="sv-SE" dirty="0"/>
-          </a:p>
-        </p:txBody>
-      </p:sp>
-      <p:sp>
-        <p:nvSpPr>
-          <p:cNvPr id="3" name="Platshållare för innehåll 2"/>
-          <p:cNvSpPr>
-            <a:spLocks noGrp="1"/>
-          </p:cNvSpPr>
-          <p:nvPr>
-            <p:ph idx="1"/>
-          </p:nvPr>
-        </p:nvSpPr>
-        <p:spPr/>
-        <p:txBody>
-          <a:bodyPr/>
-          <a:lstStyle/>
-          <a:p>
-            <a:pPr>
-              <a:buNone/>
-            </a:pPr>
-            <a:r>
-              <a:rPr lang="sv-SE" dirty="0" smtClean="0"/>
-              <a:t>[</a:t>
-            </a:r>
-            <a:r>
-              <a:rPr lang="sv-SE" dirty="0" err="1" smtClean="0"/>
-              <a:t>optionalParameter.groovy</a:t>
-            </a:r>
-            <a:r>
-              <a:rPr lang="sv-SE" dirty="0" smtClean="0"/>
-              <a:t>]</a:t>
-            </a:r>
-            <a:endParaRPr lang="sv-SE" dirty="0"/>
-          </a:p>
-        </p:txBody>
-      </p:sp>
-    </p:spTree>
-  </p:cSld>
-  <p:clrMapOvr>
-    <a:masterClrMapping/>
-  </p:clrMapOvr>
-</p:sld>
-</file>
-
-<file path=ppt/slides/slide47.xml><?xml version="1.0" encoding="utf-8"?>
+<file path=ppt/slides/slide45.xml><?xml version="1.0" encoding="utf-8"?>
 <p:sld xmlns:a="http://schemas.openxmlformats.org/drawingml/2006/main" xmlns:r="http://schemas.openxmlformats.org/officeDocument/2006/relationships" xmlns:p="http://schemas.openxmlformats.org/presentationml/2006/main">
   <p:cSld>
     <p:spTree>
@@ -9488,6 +9316,174 @@
 </p:sld>
 </file>
 
+<file path=ppt/slides/slide46.xml><?xml version="1.0" encoding="utf-8"?>
+<p:sld xmlns:a="http://schemas.openxmlformats.org/drawingml/2006/main" xmlns:r="http://schemas.openxmlformats.org/officeDocument/2006/relationships" xmlns:p="http://schemas.openxmlformats.org/presentationml/2006/main">
+  <p:cSld>
+    <p:spTree>
+      <p:nvGrpSpPr>
+        <p:cNvPr id="1" name=""/>
+        <p:cNvGrpSpPr/>
+        <p:nvPr/>
+      </p:nvGrpSpPr>
+      <p:grpSpPr>
+        <a:xfrm>
+          <a:off x="0" y="0"/>
+          <a:ext cx="0" cy="0"/>
+          <a:chOff x="0" y="0"/>
+          <a:chExt cx="0" cy="0"/>
+        </a:xfrm>
+      </p:grpSpPr>
+      <p:sp>
+        <p:nvSpPr>
+          <p:cNvPr id="2" name="Rubrik 1"/>
+          <p:cNvSpPr>
+            <a:spLocks noGrp="1"/>
+          </p:cNvSpPr>
+          <p:nvPr>
+            <p:ph type="title"/>
+          </p:nvPr>
+        </p:nvSpPr>
+        <p:spPr/>
+        <p:txBody>
+          <a:bodyPr/>
+          <a:lstStyle/>
+          <a:p>
+            <a:r>
+              <a:rPr lang="sv-SE" dirty="0" err="1" smtClean="0"/>
+              <a:t>Regular</a:t>
+            </a:r>
+            <a:r>
+              <a:rPr lang="sv-SE" dirty="0" smtClean="0"/>
+              <a:t> expressions</a:t>
+            </a:r>
+            <a:endParaRPr lang="sv-SE" dirty="0"/>
+          </a:p>
+        </p:txBody>
+      </p:sp>
+      <p:sp>
+        <p:nvSpPr>
+          <p:cNvPr id="3" name="Platshållare för innehåll 2"/>
+          <p:cNvSpPr>
+            <a:spLocks noGrp="1"/>
+          </p:cNvSpPr>
+          <p:nvPr>
+            <p:ph idx="1"/>
+          </p:nvPr>
+        </p:nvSpPr>
+        <p:spPr/>
+        <p:txBody>
+          <a:bodyPr/>
+          <a:lstStyle/>
+          <a:p>
+            <a:pPr>
+              <a:buNone/>
+            </a:pPr>
+            <a:r>
+              <a:rPr lang="sv-SE" dirty="0" smtClean="0"/>
+              <a:t>[</a:t>
+            </a:r>
+            <a:r>
+              <a:rPr lang="sv-SE" dirty="0" err="1" smtClean="0"/>
+              <a:t>TestRegExp.groovy</a:t>
+            </a:r>
+            <a:r>
+              <a:rPr lang="sv-SE" dirty="0" smtClean="0"/>
+              <a:t>]</a:t>
+            </a:r>
+            <a:endParaRPr lang="sv-SE" dirty="0"/>
+          </a:p>
+        </p:txBody>
+      </p:sp>
+    </p:spTree>
+  </p:cSld>
+  <p:clrMapOvr>
+    <a:masterClrMapping/>
+  </p:clrMapOvr>
+</p:sld>
+</file>
+
+<file path=ppt/slides/slide47.xml><?xml version="1.0" encoding="utf-8"?>
+<p:sld xmlns:a="http://schemas.openxmlformats.org/drawingml/2006/main" xmlns:r="http://schemas.openxmlformats.org/officeDocument/2006/relationships" xmlns:p="http://schemas.openxmlformats.org/presentationml/2006/main">
+  <p:cSld>
+    <p:spTree>
+      <p:nvGrpSpPr>
+        <p:cNvPr id="1" name=""/>
+        <p:cNvGrpSpPr/>
+        <p:nvPr/>
+      </p:nvGrpSpPr>
+      <p:grpSpPr>
+        <a:xfrm>
+          <a:off x="0" y="0"/>
+          <a:ext cx="0" cy="0"/>
+          <a:chOff x="0" y="0"/>
+          <a:chExt cx="0" cy="0"/>
+        </a:xfrm>
+      </p:grpSpPr>
+      <p:sp>
+        <p:nvSpPr>
+          <p:cNvPr id="2" name="Rubrik 1"/>
+          <p:cNvSpPr>
+            <a:spLocks noGrp="1"/>
+          </p:cNvSpPr>
+          <p:nvPr>
+            <p:ph type="title"/>
+          </p:nvPr>
+        </p:nvSpPr>
+        <p:spPr/>
+        <p:txBody>
+          <a:bodyPr/>
+          <a:lstStyle/>
+          <a:p>
+            <a:r>
+              <a:rPr lang="sv-SE" dirty="0" smtClean="0"/>
+              <a:t>Primitives</a:t>
+            </a:r>
+            <a:endParaRPr lang="sv-SE" dirty="0"/>
+          </a:p>
+        </p:txBody>
+      </p:sp>
+      <p:sp>
+        <p:nvSpPr>
+          <p:cNvPr id="3" name="Platshållare för innehåll 2"/>
+          <p:cNvSpPr>
+            <a:spLocks noGrp="1"/>
+          </p:cNvSpPr>
+          <p:nvPr>
+            <p:ph idx="1"/>
+          </p:nvPr>
+        </p:nvSpPr>
+        <p:spPr/>
+        <p:txBody>
+          <a:bodyPr/>
+          <a:lstStyle/>
+          <a:p>
+            <a:pPr>
+              <a:buNone/>
+            </a:pPr>
+            <a:r>
+              <a:rPr lang="sv-SE" dirty="0" smtClean="0"/>
+              <a:t>[</a:t>
+            </a:r>
+            <a:r>
+              <a:rPr lang="sv-SE" dirty="0" err="1" smtClean="0"/>
+              <a:t>Primitives.groovy</a:t>
+            </a:r>
+            <a:r>
+              <a:rPr lang="sv-SE" dirty="0" smtClean="0"/>
+              <a:t>]</a:t>
+            </a:r>
+            <a:endParaRPr lang="sv-SE" dirty="0"/>
+          </a:p>
+        </p:txBody>
+      </p:sp>
+    </p:spTree>
+  </p:cSld>
+  <p:clrMapOvr>
+    <a:masterClrMapping/>
+  </p:clrMapOvr>
+</p:sld>
+</file>
+
 <file path=ppt/slides/slide48.xml><?xml version="1.0" encoding="utf-8"?>
 <p:sld xmlns:a="http://schemas.openxmlformats.org/drawingml/2006/main" xmlns:r="http://schemas.openxmlformats.org/officeDocument/2006/relationships" xmlns:p="http://schemas.openxmlformats.org/presentationml/2006/main">
   <p:cSld>
@@ -9517,18 +9513,19 @@
         </p:nvSpPr>
         <p:spPr/>
         <p:txBody>
-          <a:bodyPr/>
+          <a:bodyPr>
+            <a:normAutofit fontScale="90000"/>
+          </a:bodyPr>
           <a:lstStyle/>
           <a:p>
             <a:r>
               <a:rPr lang="sv-SE" dirty="0" err="1" smtClean="0"/>
-              <a:t>Regular</a:t>
-            </a:r>
-            <a:r>
-              <a:rPr lang="sv-SE" dirty="0" smtClean="0"/>
-              <a:t> expressions</a:t>
-            </a:r>
-            <a:endParaRPr lang="sv-SE" dirty="0"/>
+              <a:t>Groovy</a:t>
+            </a:r>
+            <a:r>
+              <a:rPr lang="sv-SE" dirty="0" smtClean="0"/>
+              <a:t> har stöd för samtliga Java 5-features:</a:t>
+            </a:r>
           </a:p>
         </p:txBody>
       </p:sp>
@@ -9544,25 +9541,71 @@
         </p:nvSpPr>
         <p:spPr/>
         <p:txBody>
-          <a:bodyPr/>
-          <a:lstStyle/>
-          <a:p>
-            <a:pPr>
-              <a:buNone/>
-            </a:pPr>
-            <a:r>
-              <a:rPr lang="sv-SE" dirty="0" smtClean="0"/>
-              <a:t>[</a:t>
-            </a:r>
+          <a:bodyPr>
+            <a:normAutofit lnSpcReduction="10000"/>
+          </a:bodyPr>
+          <a:lstStyle/>
+          <a:p>
             <a:r>
               <a:rPr lang="sv-SE" dirty="0" err="1" smtClean="0"/>
-              <a:t>TestRegExp.groovy</a:t>
-            </a:r>
-            <a:r>
-              <a:rPr lang="sv-SE" dirty="0" smtClean="0"/>
-              <a:t>]</a:t>
-            </a:r>
-            <a:endParaRPr lang="sv-SE" dirty="0"/>
+              <a:t>Generics</a:t>
+            </a:r>
+            <a:endParaRPr lang="sv-SE" dirty="0" smtClean="0"/>
+          </a:p>
+          <a:p>
+            <a:r>
+              <a:rPr lang="sv-SE" dirty="0" err="1" smtClean="0"/>
+              <a:t>For-each</a:t>
+            </a:r>
+            <a:endParaRPr lang="sv-SE" dirty="0" smtClean="0"/>
+          </a:p>
+          <a:p>
+            <a:r>
+              <a:rPr lang="sv-SE" dirty="0" err="1" smtClean="0"/>
+              <a:t>Autoboxing</a:t>
+            </a:r>
+            <a:r>
+              <a:rPr lang="sv-SE" dirty="0" smtClean="0"/>
+              <a:t> (fungerar även om man kör java 1.4)</a:t>
+            </a:r>
+          </a:p>
+          <a:p>
+            <a:r>
+              <a:rPr lang="sv-SE" dirty="0" err="1" smtClean="0"/>
+              <a:t>Enum</a:t>
+            </a:r>
+            <a:endParaRPr lang="sv-SE" dirty="0" smtClean="0"/>
+          </a:p>
+          <a:p>
+            <a:r>
+              <a:rPr lang="sv-SE" dirty="0" smtClean="0"/>
+              <a:t>Annotations (fungerar dock ej att skapa egna i </a:t>
+            </a:r>
+            <a:r>
+              <a:rPr lang="sv-SE" dirty="0" err="1" smtClean="0"/>
+              <a:t>Groovy</a:t>
+            </a:r>
+            <a:r>
+              <a:rPr lang="sv-SE" dirty="0" smtClean="0"/>
+              <a:t>)</a:t>
+            </a:r>
+          </a:p>
+          <a:p>
+            <a:r>
+              <a:rPr lang="sv-SE" dirty="0" err="1" smtClean="0"/>
+              <a:t>Varargs</a:t>
+            </a:r>
+            <a:endParaRPr lang="sv-SE" dirty="0" smtClean="0"/>
+          </a:p>
+          <a:p>
+            <a:r>
+              <a:rPr lang="sv-SE" dirty="0" err="1" smtClean="0"/>
+              <a:t>Static</a:t>
+            </a:r>
+            <a:r>
+              <a:rPr lang="sv-SE" dirty="0" smtClean="0"/>
+              <a:t> import</a:t>
+            </a:r>
           </a:p>
         </p:txBody>
       </p:sp>
@@ -9608,7 +9651,7 @@
           <a:p>
             <a:r>
               <a:rPr lang="sv-SE" dirty="0" smtClean="0"/>
-              <a:t>Primitives</a:t>
+              <a:t>Sammanfattning</a:t>
             </a:r>
             <a:endParaRPr lang="sv-SE" dirty="0"/>
           </a:p>
@@ -9629,20 +9672,19 @@
           <a:bodyPr/>
           <a:lstStyle/>
           <a:p>
-            <a:pPr>
-              <a:buNone/>
-            </a:pPr>
-            <a:r>
-              <a:rPr lang="sv-SE" dirty="0" smtClean="0"/>
-              <a:t>[</a:t>
-            </a:r>
-            <a:r>
-              <a:rPr lang="sv-SE" dirty="0" err="1" smtClean="0"/>
-              <a:t>Primitives.groovy</a:t>
-            </a:r>
-            <a:r>
-              <a:rPr lang="sv-SE" dirty="0" smtClean="0"/>
-              <a:t>]</a:t>
+            <a:r>
+              <a:rPr lang="sv-SE" dirty="0" smtClean="0"/>
+              <a:t>Helt kompatibelt med Java</a:t>
+            </a:r>
+          </a:p>
+          <a:p>
+            <a:r>
+              <a:rPr lang="sv-SE" dirty="0" smtClean="0"/>
+              <a:t>Underlättar Javautveckling på ett </a:t>
+            </a:r>
+            <a:r>
+              <a:rPr lang="sv-SE" smtClean="0"/>
+              <a:t>antal sätt</a:t>
             </a:r>
             <a:endParaRPr lang="sv-SE" dirty="0"/>
           </a:p>
@@ -9807,19 +9849,18 @@
         </p:nvSpPr>
         <p:spPr/>
         <p:txBody>
-          <a:bodyPr>
-            <a:normAutofit fontScale="90000"/>
-          </a:bodyPr>
+          <a:bodyPr/>
           <a:lstStyle/>
           <a:p>
             <a:r>
               <a:rPr lang="sv-SE" dirty="0" err="1" smtClean="0"/>
-              <a:t>Groovy</a:t>
-            </a:r>
-            <a:r>
-              <a:rPr lang="sv-SE" dirty="0" smtClean="0"/>
-              <a:t> har stöd för samtliga Java 5-features:</a:t>
-            </a:r>
+              <a:t>Closures</a:t>
+            </a:r>
+            <a:r>
+              <a:rPr lang="sv-SE" dirty="0" smtClean="0"/>
+              <a:t>: fördjupning</a:t>
+            </a:r>
+            <a:endParaRPr lang="sv-SE" dirty="0"/>
           </a:p>
         </p:txBody>
       </p:sp>
@@ -9835,71 +9876,14 @@
         </p:nvSpPr>
         <p:spPr/>
         <p:txBody>
-          <a:bodyPr>
-            <a:normAutofit lnSpcReduction="10000"/>
-          </a:bodyPr>
-          <a:lstStyle/>
-          <a:p>
-            <a:r>
-              <a:rPr lang="sv-SE" dirty="0" err="1" smtClean="0"/>
-              <a:t>Generics</a:t>
-            </a:r>
-            <a:endParaRPr lang="sv-SE" dirty="0" smtClean="0"/>
-          </a:p>
-          <a:p>
-            <a:r>
-              <a:rPr lang="sv-SE" dirty="0" err="1" smtClean="0"/>
-              <a:t>For-each</a:t>
-            </a:r>
-            <a:endParaRPr lang="sv-SE" dirty="0" smtClean="0"/>
-          </a:p>
-          <a:p>
-            <a:r>
-              <a:rPr lang="sv-SE" dirty="0" err="1" smtClean="0"/>
-              <a:t>Autoboxing</a:t>
-            </a:r>
-            <a:r>
-              <a:rPr lang="sv-SE" dirty="0" smtClean="0"/>
-              <a:t> (fungerar även om man kör java 1.4)</a:t>
-            </a:r>
-          </a:p>
-          <a:p>
-            <a:r>
-              <a:rPr lang="sv-SE" dirty="0" err="1" smtClean="0"/>
-              <a:t>Enum</a:t>
-            </a:r>
-            <a:endParaRPr lang="sv-SE" dirty="0" smtClean="0"/>
-          </a:p>
-          <a:p>
-            <a:r>
-              <a:rPr lang="sv-SE" dirty="0" smtClean="0"/>
-              <a:t>Annotations (fungerar dock ej att skapa egna i </a:t>
-            </a:r>
-            <a:r>
-              <a:rPr lang="sv-SE" dirty="0" err="1" smtClean="0"/>
-              <a:t>Groovy</a:t>
-            </a:r>
-            <a:r>
-              <a:rPr lang="sv-SE" dirty="0" smtClean="0"/>
-              <a:t>)</a:t>
-            </a:r>
-          </a:p>
-          <a:p>
-            <a:r>
-              <a:rPr lang="sv-SE" dirty="0" err="1" smtClean="0"/>
-              <a:t>Varargs</a:t>
-            </a:r>
-            <a:endParaRPr lang="sv-SE" dirty="0" smtClean="0"/>
-          </a:p>
-          <a:p>
-            <a:r>
-              <a:rPr lang="sv-SE" dirty="0" err="1" smtClean="0"/>
-              <a:t>Static</a:t>
-            </a:r>
-            <a:r>
-              <a:rPr lang="sv-SE" dirty="0" smtClean="0"/>
-              <a:t> import</a:t>
-            </a:r>
+          <a:bodyPr/>
+          <a:lstStyle/>
+          <a:p>
+            <a:r>
+              <a:rPr lang="sv-SE" dirty="0" smtClean="0"/>
+              <a:t>Exempel: Summera alla jämna tal från 1 till 10</a:t>
+            </a:r>
+            <a:endParaRPr lang="sv-SE" dirty="0"/>
           </a:p>
         </p:txBody>
       </p:sp>
@@ -9940,12 +9924,14 @@
         </p:nvSpPr>
         <p:spPr/>
         <p:txBody>
-          <a:bodyPr/>
-          <a:lstStyle/>
-          <a:p>
-            <a:r>
-              <a:rPr lang="sv-SE" dirty="0" smtClean="0"/>
-              <a:t>Sammanfattning</a:t>
+          <a:bodyPr>
+            <a:normAutofit fontScale="90000"/>
+          </a:bodyPr>
+          <a:lstStyle/>
+          <a:p>
+            <a:r>
+              <a:rPr lang="sv-SE" dirty="0" smtClean="0"/>
+              <a:t>Summera alla jämna tal från 1 till 10</a:t>
             </a:r>
             <a:endParaRPr lang="sv-SE" dirty="0"/>
           </a:p>
@@ -9966,19 +9952,20 @@
           <a:bodyPr/>
           <a:lstStyle/>
           <a:p>
-            <a:r>
-              <a:rPr lang="sv-SE" dirty="0" smtClean="0"/>
-              <a:t>Helt kompatibelt med Java</a:t>
-            </a:r>
-          </a:p>
-          <a:p>
-            <a:r>
-              <a:rPr lang="sv-SE" dirty="0" smtClean="0"/>
-              <a:t>Underlättar Javautveckling på ett </a:t>
-            </a:r>
-            <a:r>
-              <a:rPr lang="sv-SE" smtClean="0"/>
-              <a:t>antal sätt</a:t>
+            <a:pPr>
+              <a:buNone/>
+            </a:pPr>
+            <a:r>
+              <a:rPr lang="sv-SE" dirty="0" smtClean="0"/>
+              <a:t>[</a:t>
+            </a:r>
+            <a:r>
+              <a:rPr lang="sv-SE" dirty="0" err="1" smtClean="0"/>
+              <a:t>sumEvenNumbers.java</a:t>
+            </a:r>
+            <a:r>
+              <a:rPr lang="sv-SE" dirty="0" smtClean="0"/>
+              <a:t>]</a:t>
             </a:r>
             <a:endParaRPr lang="sv-SE" dirty="0"/>
           </a:p>
@@ -10021,39 +10008,48 @@
         </p:nvSpPr>
         <p:spPr/>
         <p:txBody>
-          <a:bodyPr/>
-          <a:lstStyle/>
-          <a:p>
+          <a:bodyPr>
+            <a:normAutofit/>
+          </a:bodyPr>
+          <a:lstStyle/>
+          <a:p>
+            <a:r>
+              <a:rPr lang="sv-SE" dirty="0" smtClean="0"/>
+              <a:t>Multiplicera jämna tal 1 till 10</a:t>
+            </a:r>
+            <a:endParaRPr lang="sv-SE" dirty="0"/>
+          </a:p>
+        </p:txBody>
+      </p:sp>
+      <p:sp>
+        <p:nvSpPr>
+          <p:cNvPr id="3" name="Platshållare för innehåll 2"/>
+          <p:cNvSpPr>
+            <a:spLocks noGrp="1"/>
+          </p:cNvSpPr>
+          <p:nvPr>
+            <p:ph idx="1"/>
+          </p:nvPr>
+        </p:nvSpPr>
+        <p:spPr/>
+        <p:txBody>
+          <a:bodyPr/>
+          <a:lstStyle/>
+          <a:p>
+            <a:pPr>
+              <a:buNone/>
+            </a:pPr>
+            <a:r>
+              <a:rPr lang="sv-SE" dirty="0" smtClean="0"/>
+              <a:t>[</a:t>
+            </a:r>
             <a:r>
               <a:rPr lang="sv-SE" dirty="0" err="1" smtClean="0"/>
-              <a:t>Closures</a:t>
-            </a:r>
-            <a:r>
-              <a:rPr lang="sv-SE" dirty="0" smtClean="0"/>
-              <a:t>: fördjupning</a:t>
-            </a:r>
-            <a:endParaRPr lang="sv-SE" dirty="0"/>
-          </a:p>
-        </p:txBody>
-      </p:sp>
-      <p:sp>
-        <p:nvSpPr>
-          <p:cNvPr id="3" name="Platshållare för innehåll 2"/>
-          <p:cNvSpPr>
-            <a:spLocks noGrp="1"/>
-          </p:cNvSpPr>
-          <p:nvPr>
-            <p:ph idx="1"/>
-          </p:nvPr>
-        </p:nvSpPr>
-        <p:spPr/>
-        <p:txBody>
-          <a:bodyPr/>
-          <a:lstStyle/>
-          <a:p>
-            <a:r>
-              <a:rPr lang="sv-SE" dirty="0" smtClean="0"/>
-              <a:t>Exempel: Summera alla jämna tal från 1 till 10</a:t>
+              <a:t>MultiplyEvenNumbers.java</a:t>
+            </a:r>
+            <a:r>
+              <a:rPr lang="sv-SE" dirty="0" smtClean="0"/>
+              <a:t>]</a:t>
             </a:r>
             <a:endParaRPr lang="sv-SE" dirty="0"/>
           </a:p>
@@ -10068,174 +10064,6 @@
 </file>
 
 <file path=ppt/slides/slide53.xml><?xml version="1.0" encoding="utf-8"?>
-<p:sld xmlns:a="http://schemas.openxmlformats.org/drawingml/2006/main" xmlns:r="http://schemas.openxmlformats.org/officeDocument/2006/relationships" xmlns:p="http://schemas.openxmlformats.org/presentationml/2006/main">
-  <p:cSld>
-    <p:spTree>
-      <p:nvGrpSpPr>
-        <p:cNvPr id="1" name=""/>
-        <p:cNvGrpSpPr/>
-        <p:nvPr/>
-      </p:nvGrpSpPr>
-      <p:grpSpPr>
-        <a:xfrm>
-          <a:off x="0" y="0"/>
-          <a:ext cx="0" cy="0"/>
-          <a:chOff x="0" y="0"/>
-          <a:chExt cx="0" cy="0"/>
-        </a:xfrm>
-      </p:grpSpPr>
-      <p:sp>
-        <p:nvSpPr>
-          <p:cNvPr id="2" name="Rubrik 1"/>
-          <p:cNvSpPr>
-            <a:spLocks noGrp="1"/>
-          </p:cNvSpPr>
-          <p:nvPr>
-            <p:ph type="title"/>
-          </p:nvPr>
-        </p:nvSpPr>
-        <p:spPr/>
-        <p:txBody>
-          <a:bodyPr>
-            <a:normAutofit fontScale="90000"/>
-          </a:bodyPr>
-          <a:lstStyle/>
-          <a:p>
-            <a:r>
-              <a:rPr lang="sv-SE" dirty="0" smtClean="0"/>
-              <a:t>Summera alla jämna tal från 1 till 10</a:t>
-            </a:r>
-            <a:endParaRPr lang="sv-SE" dirty="0"/>
-          </a:p>
-        </p:txBody>
-      </p:sp>
-      <p:sp>
-        <p:nvSpPr>
-          <p:cNvPr id="3" name="Platshållare för innehåll 2"/>
-          <p:cNvSpPr>
-            <a:spLocks noGrp="1"/>
-          </p:cNvSpPr>
-          <p:nvPr>
-            <p:ph idx="1"/>
-          </p:nvPr>
-        </p:nvSpPr>
-        <p:spPr/>
-        <p:txBody>
-          <a:bodyPr/>
-          <a:lstStyle/>
-          <a:p>
-            <a:pPr>
-              <a:buNone/>
-            </a:pPr>
-            <a:r>
-              <a:rPr lang="sv-SE" dirty="0" smtClean="0"/>
-              <a:t>[</a:t>
-            </a:r>
-            <a:r>
-              <a:rPr lang="sv-SE" dirty="0" err="1" smtClean="0"/>
-              <a:t>sumEvenNumbers.java</a:t>
-            </a:r>
-            <a:r>
-              <a:rPr lang="sv-SE" dirty="0" smtClean="0"/>
-              <a:t>]</a:t>
-            </a:r>
-            <a:endParaRPr lang="sv-SE" dirty="0"/>
-          </a:p>
-        </p:txBody>
-      </p:sp>
-    </p:spTree>
-  </p:cSld>
-  <p:clrMapOvr>
-    <a:masterClrMapping/>
-  </p:clrMapOvr>
-</p:sld>
-</file>
-
-<file path=ppt/slides/slide54.xml><?xml version="1.0" encoding="utf-8"?>
-<p:sld xmlns:a="http://schemas.openxmlformats.org/drawingml/2006/main" xmlns:r="http://schemas.openxmlformats.org/officeDocument/2006/relationships" xmlns:p="http://schemas.openxmlformats.org/presentationml/2006/main">
-  <p:cSld>
-    <p:spTree>
-      <p:nvGrpSpPr>
-        <p:cNvPr id="1" name=""/>
-        <p:cNvGrpSpPr/>
-        <p:nvPr/>
-      </p:nvGrpSpPr>
-      <p:grpSpPr>
-        <a:xfrm>
-          <a:off x="0" y="0"/>
-          <a:ext cx="0" cy="0"/>
-          <a:chOff x="0" y="0"/>
-          <a:chExt cx="0" cy="0"/>
-        </a:xfrm>
-      </p:grpSpPr>
-      <p:sp>
-        <p:nvSpPr>
-          <p:cNvPr id="2" name="Rubrik 1"/>
-          <p:cNvSpPr>
-            <a:spLocks noGrp="1"/>
-          </p:cNvSpPr>
-          <p:nvPr>
-            <p:ph type="title"/>
-          </p:nvPr>
-        </p:nvSpPr>
-        <p:spPr/>
-        <p:txBody>
-          <a:bodyPr>
-            <a:normAutofit/>
-          </a:bodyPr>
-          <a:lstStyle/>
-          <a:p>
-            <a:r>
-              <a:rPr lang="sv-SE" dirty="0" smtClean="0"/>
-              <a:t>Multiplicera jämna tal 1 till 10</a:t>
-            </a:r>
-            <a:endParaRPr lang="sv-SE" dirty="0"/>
-          </a:p>
-        </p:txBody>
-      </p:sp>
-      <p:sp>
-        <p:nvSpPr>
-          <p:cNvPr id="3" name="Platshållare för innehåll 2"/>
-          <p:cNvSpPr>
-            <a:spLocks noGrp="1"/>
-          </p:cNvSpPr>
-          <p:nvPr>
-            <p:ph idx="1"/>
-          </p:nvPr>
-        </p:nvSpPr>
-        <p:spPr/>
-        <p:txBody>
-          <a:bodyPr/>
-          <a:lstStyle/>
-          <a:p>
-            <a:pPr>
-              <a:buNone/>
-            </a:pPr>
-            <a:r>
-              <a:rPr lang="sv-SE" dirty="0" smtClean="0"/>
-              <a:t>[</a:t>
-            </a:r>
-            <a:r>
-              <a:rPr lang="sv-SE" dirty="0" err="1" smtClean="0"/>
-              <a:t>MultiplyEvenNumbers.java</a:t>
-            </a:r>
-            <a:r>
-              <a:rPr lang="sv-SE" dirty="0" smtClean="0"/>
-              <a:t>]</a:t>
-            </a:r>
-            <a:endParaRPr lang="sv-SE" dirty="0"/>
-          </a:p>
-        </p:txBody>
-      </p:sp>
-    </p:spTree>
-  </p:cSld>
-  <p:clrMapOvr>
-    <a:masterClrMapping/>
-  </p:clrMapOvr>
-</p:sld>
-</file>
-
-<file path=ppt/slides/slide55.xml><?xml version="1.0" encoding="utf-8"?>
 <p:sld xmlns:a="http://schemas.openxmlformats.org/drawingml/2006/main" xmlns:r="http://schemas.openxmlformats.org/officeDocument/2006/relationships" xmlns:p="http://schemas.openxmlformats.org/presentationml/2006/main">
   <p:cSld>
     <p:spTree>
@@ -10352,7 +10180,7 @@
 </p:sld>
 </file>
 
-<file path=ppt/slides/slide56.xml><?xml version="1.0" encoding="utf-8"?>
+<file path=ppt/slides/slide54.xml><?xml version="1.0" encoding="utf-8"?>
 <p:sld xmlns:a="http://schemas.openxmlformats.org/drawingml/2006/main" xmlns:r="http://schemas.openxmlformats.org/officeDocument/2006/relationships" xmlns:p="http://schemas.openxmlformats.org/presentationml/2006/main">
   <p:cSld>
     <p:spTree>
@@ -10493,7 +10321,7 @@
 </p:sld>
 </file>
 
-<file path=ppt/slides/slide57.xml><?xml version="1.0" encoding="utf-8"?>
+<file path=ppt/slides/slide55.xml><?xml version="1.0" encoding="utf-8"?>
 <p:sld xmlns:a="http://schemas.openxmlformats.org/drawingml/2006/main" xmlns:r="http://schemas.openxmlformats.org/officeDocument/2006/relationships" xmlns:p="http://schemas.openxmlformats.org/presentationml/2006/main">
   <p:cSld>
     <p:spTree>
@@ -10615,7 +10443,7 @@
 </p:sld>
 </file>
 
-<file path=ppt/slides/slide58.xml><?xml version="1.0" encoding="utf-8"?>
+<file path=ppt/slides/slide56.xml><?xml version="1.0" encoding="utf-8"?>
 <p:sld xmlns:a="http://schemas.openxmlformats.org/drawingml/2006/main" xmlns:r="http://schemas.openxmlformats.org/officeDocument/2006/relationships" xmlns:p="http://schemas.openxmlformats.org/presentationml/2006/main">
   <p:cSld>
     <p:spTree>
@@ -10704,7 +10532,7 @@
 </p:sld>
 </file>
 
-<file path=ppt/slides/slide59.xml><?xml version="1.0" encoding="utf-8"?>
+<file path=ppt/slides/slide57.xml><?xml version="1.0" encoding="utf-8"?>
 <p:sld xmlns:a="http://schemas.openxmlformats.org/drawingml/2006/main" xmlns:r="http://schemas.openxmlformats.org/officeDocument/2006/relationships" xmlns:p="http://schemas.openxmlformats.org/presentationml/2006/main">
   <p:cSld>
     <p:spTree>

</xml_diff>

<commit_message>
lagt till bild på våg
</commit_message>
<xml_diff>
--- a/groovyseminarie/dokument/groovyseminarium_source_w_logo.pptx
+++ b/groovyseminarie/dokument/groovyseminarium_source_w_logo.pptx
@@ -5,10 +5,10 @@
     <p:sldMasterId id="2147483683" r:id="rId1"/>
   </p:sldMasterIdLst>
   <p:notesMasterIdLst>
-    <p:notesMasterId r:id="rId59"/>
+    <p:notesMasterId r:id="rId60"/>
   </p:notesMasterIdLst>
   <p:handoutMasterIdLst>
-    <p:handoutMasterId r:id="rId60"/>
+    <p:handoutMasterId r:id="rId61"/>
   </p:handoutMasterIdLst>
   <p:sldIdLst>
     <p:sldId id="268" r:id="rId2"/>
@@ -19,55 +19,56 @@
     <p:sldId id="273" r:id="rId7"/>
     <p:sldId id="274" r:id="rId8"/>
     <p:sldId id="275" r:id="rId9"/>
-    <p:sldId id="276" r:id="rId10"/>
-    <p:sldId id="277" r:id="rId11"/>
-    <p:sldId id="278" r:id="rId12"/>
-    <p:sldId id="279" r:id="rId13"/>
-    <p:sldId id="328" r:id="rId14"/>
-    <p:sldId id="280" r:id="rId15"/>
-    <p:sldId id="281" r:id="rId16"/>
-    <p:sldId id="282" r:id="rId17"/>
-    <p:sldId id="283" r:id="rId18"/>
-    <p:sldId id="285" r:id="rId19"/>
-    <p:sldId id="286" r:id="rId20"/>
-    <p:sldId id="287" r:id="rId21"/>
-    <p:sldId id="288" r:id="rId22"/>
-    <p:sldId id="289" r:id="rId23"/>
-    <p:sldId id="329" r:id="rId24"/>
-    <p:sldId id="330" r:id="rId25"/>
-    <p:sldId id="331" r:id="rId26"/>
-    <p:sldId id="291" r:id="rId27"/>
-    <p:sldId id="292" r:id="rId28"/>
-    <p:sldId id="332" r:id="rId29"/>
-    <p:sldId id="293" r:id="rId30"/>
-    <p:sldId id="333" r:id="rId31"/>
-    <p:sldId id="296" r:id="rId32"/>
-    <p:sldId id="297" r:id="rId33"/>
-    <p:sldId id="298" r:id="rId34"/>
-    <p:sldId id="299" r:id="rId35"/>
-    <p:sldId id="334" r:id="rId36"/>
-    <p:sldId id="335" r:id="rId37"/>
-    <p:sldId id="302" r:id="rId38"/>
-    <p:sldId id="303" r:id="rId39"/>
-    <p:sldId id="304" r:id="rId40"/>
-    <p:sldId id="306" r:id="rId41"/>
-    <p:sldId id="307" r:id="rId42"/>
-    <p:sldId id="308" r:id="rId43"/>
-    <p:sldId id="312" r:id="rId44"/>
-    <p:sldId id="313" r:id="rId45"/>
-    <p:sldId id="315" r:id="rId46"/>
-    <p:sldId id="316" r:id="rId47"/>
-    <p:sldId id="317" r:id="rId48"/>
-    <p:sldId id="318" r:id="rId49"/>
-    <p:sldId id="336" r:id="rId50"/>
-    <p:sldId id="320" r:id="rId51"/>
-    <p:sldId id="321" r:id="rId52"/>
-    <p:sldId id="322" r:id="rId53"/>
-    <p:sldId id="323" r:id="rId54"/>
-    <p:sldId id="324" r:id="rId55"/>
-    <p:sldId id="325" r:id="rId56"/>
-    <p:sldId id="326" r:id="rId57"/>
-    <p:sldId id="327" r:id="rId58"/>
+    <p:sldId id="337" r:id="rId10"/>
+    <p:sldId id="276" r:id="rId11"/>
+    <p:sldId id="277" r:id="rId12"/>
+    <p:sldId id="278" r:id="rId13"/>
+    <p:sldId id="279" r:id="rId14"/>
+    <p:sldId id="328" r:id="rId15"/>
+    <p:sldId id="280" r:id="rId16"/>
+    <p:sldId id="281" r:id="rId17"/>
+    <p:sldId id="282" r:id="rId18"/>
+    <p:sldId id="283" r:id="rId19"/>
+    <p:sldId id="285" r:id="rId20"/>
+    <p:sldId id="286" r:id="rId21"/>
+    <p:sldId id="287" r:id="rId22"/>
+    <p:sldId id="288" r:id="rId23"/>
+    <p:sldId id="289" r:id="rId24"/>
+    <p:sldId id="329" r:id="rId25"/>
+    <p:sldId id="330" r:id="rId26"/>
+    <p:sldId id="331" r:id="rId27"/>
+    <p:sldId id="291" r:id="rId28"/>
+    <p:sldId id="292" r:id="rId29"/>
+    <p:sldId id="332" r:id="rId30"/>
+    <p:sldId id="293" r:id="rId31"/>
+    <p:sldId id="333" r:id="rId32"/>
+    <p:sldId id="296" r:id="rId33"/>
+    <p:sldId id="297" r:id="rId34"/>
+    <p:sldId id="298" r:id="rId35"/>
+    <p:sldId id="299" r:id="rId36"/>
+    <p:sldId id="334" r:id="rId37"/>
+    <p:sldId id="335" r:id="rId38"/>
+    <p:sldId id="302" r:id="rId39"/>
+    <p:sldId id="303" r:id="rId40"/>
+    <p:sldId id="304" r:id="rId41"/>
+    <p:sldId id="306" r:id="rId42"/>
+    <p:sldId id="307" r:id="rId43"/>
+    <p:sldId id="308" r:id="rId44"/>
+    <p:sldId id="312" r:id="rId45"/>
+    <p:sldId id="313" r:id="rId46"/>
+    <p:sldId id="315" r:id="rId47"/>
+    <p:sldId id="316" r:id="rId48"/>
+    <p:sldId id="317" r:id="rId49"/>
+    <p:sldId id="318" r:id="rId50"/>
+    <p:sldId id="336" r:id="rId51"/>
+    <p:sldId id="320" r:id="rId52"/>
+    <p:sldId id="321" r:id="rId53"/>
+    <p:sldId id="322" r:id="rId54"/>
+    <p:sldId id="323" r:id="rId55"/>
+    <p:sldId id="324" r:id="rId56"/>
+    <p:sldId id="325" r:id="rId57"/>
+    <p:sldId id="326" r:id="rId58"/>
+    <p:sldId id="327" r:id="rId59"/>
   </p:sldIdLst>
   <p:sldSz cx="9144000" cy="6858000" type="screen4x3"/>
   <p:notesSz cx="6711950" cy="9844088"/>
@@ -4494,59 +4495,65 @@
           <a:lstStyle/>
           <a:p>
             <a:r>
+              <a:rPr lang="sv-SE" dirty="0" smtClean="0"/>
+              <a:t>Fördelar med dynamiska språk</a:t>
+            </a:r>
+            <a:endParaRPr lang="sv-SE" dirty="0"/>
+          </a:p>
+        </p:txBody>
+      </p:sp>
+      <p:sp>
+        <p:nvSpPr>
+          <p:cNvPr id="3" name="Platshållare för innehåll 2"/>
+          <p:cNvSpPr>
+            <a:spLocks noGrp="1"/>
+          </p:cNvSpPr>
+          <p:nvPr>
+            <p:ph idx="1"/>
+          </p:nvPr>
+        </p:nvSpPr>
+        <p:spPr>
+          <a:xfrm>
+            <a:off x="469900" y="1576388"/>
+            <a:ext cx="8229600" cy="2326872"/>
+          </a:xfrm>
+        </p:spPr>
+        <p:txBody>
+          <a:bodyPr/>
+          <a:lstStyle/>
+          <a:p>
+            <a:r>
+              <a:rPr lang="sv-SE" dirty="0" smtClean="0"/>
+              <a:t>Mindre kod att skriva</a:t>
+            </a:r>
+          </a:p>
+          <a:p>
+            <a:r>
+              <a:rPr lang="sv-SE" dirty="0" smtClean="0"/>
+              <a:t>Mindre kod att läsa</a:t>
+            </a:r>
+          </a:p>
+          <a:p>
+            <a:r>
               <a:rPr lang="sv-SE" dirty="0" err="1" smtClean="0"/>
               <a:t>Closures</a:t>
             </a:r>
-            <a:endParaRPr lang="sv-SE" dirty="0"/>
-          </a:p>
-        </p:txBody>
-      </p:sp>
-      <p:sp>
-        <p:nvSpPr>
-          <p:cNvPr id="3" name="Platshållare för innehåll 2"/>
-          <p:cNvSpPr>
-            <a:spLocks noGrp="1"/>
-          </p:cNvSpPr>
-          <p:nvPr>
-            <p:ph idx="1"/>
-          </p:nvPr>
-        </p:nvSpPr>
-        <p:spPr/>
-        <p:txBody>
-          <a:bodyPr>
-            <a:normAutofit/>
-          </a:bodyPr>
-          <a:lstStyle/>
-          <a:p>
-            <a:r>
-              <a:rPr lang="sv-SE" dirty="0" smtClean="0"/>
-              <a:t>Kommer finnas i Java 1.7, finns redan i </a:t>
-            </a:r>
-            <a:r>
-              <a:rPr lang="sv-SE" dirty="0" err="1" smtClean="0"/>
-              <a:t>Groovy</a:t>
-            </a:r>
+            <a:r>
+              <a:rPr lang="sv-SE" dirty="0" smtClean="0"/>
+              <a:t> </a:t>
+            </a:r>
+          </a:p>
+          <a:p>
+            <a:r>
+              <a:rPr lang="sv-SE" dirty="0" smtClean="0"/>
+              <a:t>Metaprogrammering</a:t>
+            </a:r>
+          </a:p>
+          <a:p>
+            <a:pPr>
+              <a:buNone/>
+            </a:pPr>
             <a:endParaRPr lang="sv-SE" dirty="0" smtClean="0"/>
-          </a:p>
-          <a:p>
-            <a:r>
-              <a:rPr lang="sv-SE" dirty="0" smtClean="0"/>
-              <a:t>Kodblock som kan skickas runt precis som en variabel</a:t>
-            </a:r>
-          </a:p>
-          <a:p>
-            <a:r>
-              <a:rPr lang="sv-SE" dirty="0" smtClean="0"/>
-              <a:t>Det kan referera till variabler skapade i </a:t>
-            </a:r>
-            <a:r>
-              <a:rPr lang="sv-SE" dirty="0" err="1" smtClean="0"/>
-              <a:t>contextet</a:t>
-            </a:r>
-            <a:r>
-              <a:rPr lang="sv-SE" dirty="0" smtClean="0"/>
-              <a:t> där kodblocket skapades</a:t>
-            </a:r>
           </a:p>
           <a:p>
             <a:pPr>
@@ -4556,6 +4563,39 @@
           </a:p>
         </p:txBody>
       </p:sp>
+      <p:pic>
+        <p:nvPicPr>
+          <p:cNvPr id="1030" name="Picture 6"/>
+          <p:cNvPicPr>
+            <a:picLocks noChangeAspect="1" noChangeArrowheads="1"/>
+          </p:cNvPicPr>
+          <p:nvPr/>
+        </p:nvPicPr>
+        <p:blipFill>
+          <a:blip r:embed="rId2"/>
+          <a:srcRect/>
+          <a:stretch>
+            <a:fillRect/>
+          </a:stretch>
+        </p:blipFill>
+        <p:spPr bwMode="auto">
+          <a:xfrm>
+            <a:off x="4902531" y="1221405"/>
+            <a:ext cx="2914650" cy="4524375"/>
+          </a:xfrm>
+          <a:prstGeom prst="rect">
+            <a:avLst/>
+          </a:prstGeom>
+          <a:noFill/>
+          <a:ln w="9525">
+            <a:noFill/>
+            <a:miter lim="800000"/>
+            <a:headEnd/>
+            <a:tailEnd/>
+          </a:ln>
+          <a:effectLst/>
+        </p:spPr>
+      </p:pic>
     </p:spTree>
   </p:cSld>
   <p:clrMapOvr>
@@ -4604,12 +4644,8 @@
           <a:lstStyle/>
           <a:p>
             <a:r>
-              <a:rPr lang="sv-SE" dirty="0" smtClean="0"/>
-              <a:t>Exempel på </a:t>
-            </a:r>
-            <a:r>
               <a:rPr lang="sv-SE" dirty="0" err="1" smtClean="0"/>
-              <a:t>closures</a:t>
+              <a:t>Closures</a:t>
             </a:r>
             <a:endParaRPr lang="sv-SE" dirty="0"/>
           </a:p>
@@ -4627,24 +4663,45 @@
         </p:nvSpPr>
         <p:spPr/>
         <p:txBody>
-          <a:bodyPr/>
-          <a:lstStyle/>
+          <a:bodyPr>
+            <a:normAutofit/>
+          </a:bodyPr>
+          <a:lstStyle/>
+          <a:p>
+            <a:r>
+              <a:rPr lang="sv-SE" dirty="0" smtClean="0"/>
+              <a:t>Kommer finnas i Java 1.7, finns redan i </a:t>
+            </a:r>
+            <a:r>
+              <a:rPr lang="sv-SE" dirty="0" err="1" smtClean="0"/>
+              <a:t>Groovy</a:t>
+            </a:r>
+            <a:endParaRPr lang="sv-SE" dirty="0" smtClean="0"/>
+          </a:p>
+          <a:p>
+            <a:r>
+              <a:rPr lang="sv-SE" dirty="0" smtClean="0"/>
+              <a:t>Kodblock som kan skickas runt precis som en variabel</a:t>
+            </a:r>
+          </a:p>
+          <a:p>
+            <a:r>
+              <a:rPr lang="sv-SE" dirty="0" smtClean="0"/>
+              <a:t>Det kan referera till variabler skapade i </a:t>
+            </a:r>
+            <a:r>
+              <a:rPr lang="sv-SE" dirty="0" err="1" smtClean="0"/>
+              <a:t>contextet</a:t>
+            </a:r>
+            <a:r>
+              <a:rPr lang="sv-SE" dirty="0" smtClean="0"/>
+              <a:t> där kodblocket skapades</a:t>
+            </a:r>
+          </a:p>
           <a:p>
             <a:pPr>
               <a:buNone/>
             </a:pPr>
-            <a:r>
-              <a:rPr lang="sv-SE" dirty="0" smtClean="0"/>
-              <a:t>[</a:t>
-            </a:r>
-            <a:r>
-              <a:rPr lang="sv-SE" dirty="0" err="1" smtClean="0"/>
-              <a:t>closureExamples.groovy</a:t>
-            </a:r>
-            <a:r>
-              <a:rPr lang="sv-SE" dirty="0" smtClean="0"/>
-              <a:t>]</a:t>
-            </a:r>
             <a:endParaRPr lang="sv-SE" dirty="0"/>
           </a:p>
         </p:txBody>
@@ -4665,6 +4722,99 @@
 </file>
 
 <file path=ppt/slides/slide12.xml><?xml version="1.0" encoding="utf-8"?>
+<p:sld xmlns:a="http://schemas.openxmlformats.org/drawingml/2006/main" xmlns:r="http://schemas.openxmlformats.org/officeDocument/2006/relationships" xmlns:p="http://schemas.openxmlformats.org/presentationml/2006/main">
+  <p:cSld>
+    <p:spTree>
+      <p:nvGrpSpPr>
+        <p:cNvPr id="1" name=""/>
+        <p:cNvGrpSpPr/>
+        <p:nvPr/>
+      </p:nvGrpSpPr>
+      <p:grpSpPr>
+        <a:xfrm>
+          <a:off x="0" y="0"/>
+          <a:ext cx="0" cy="0"/>
+          <a:chOff x="0" y="0"/>
+          <a:chExt cx="0" cy="0"/>
+        </a:xfrm>
+      </p:grpSpPr>
+      <p:sp>
+        <p:nvSpPr>
+          <p:cNvPr id="2" name="Rubrik 1"/>
+          <p:cNvSpPr>
+            <a:spLocks noGrp="1"/>
+          </p:cNvSpPr>
+          <p:nvPr>
+            <p:ph type="title"/>
+          </p:nvPr>
+        </p:nvSpPr>
+        <p:spPr/>
+        <p:txBody>
+          <a:bodyPr/>
+          <a:lstStyle/>
+          <a:p>
+            <a:r>
+              <a:rPr lang="sv-SE" dirty="0" smtClean="0"/>
+              <a:t>Exempel på </a:t>
+            </a:r>
+            <a:r>
+              <a:rPr lang="sv-SE" dirty="0" err="1" smtClean="0"/>
+              <a:t>closures</a:t>
+            </a:r>
+            <a:endParaRPr lang="sv-SE" dirty="0"/>
+          </a:p>
+        </p:txBody>
+      </p:sp>
+      <p:sp>
+        <p:nvSpPr>
+          <p:cNvPr id="3" name="Platshållare för innehåll 2"/>
+          <p:cNvSpPr>
+            <a:spLocks noGrp="1"/>
+          </p:cNvSpPr>
+          <p:nvPr>
+            <p:ph idx="1"/>
+          </p:nvPr>
+        </p:nvSpPr>
+        <p:spPr/>
+        <p:txBody>
+          <a:bodyPr/>
+          <a:lstStyle/>
+          <a:p>
+            <a:pPr>
+              <a:buNone/>
+            </a:pPr>
+            <a:r>
+              <a:rPr lang="sv-SE" dirty="0" smtClean="0"/>
+              <a:t>[</a:t>
+            </a:r>
+            <a:r>
+              <a:rPr lang="sv-SE" dirty="0" err="1" smtClean="0"/>
+              <a:t>closureExamples.groovy</a:t>
+            </a:r>
+            <a:r>
+              <a:rPr lang="sv-SE" dirty="0" smtClean="0"/>
+              <a:t>]</a:t>
+            </a:r>
+            <a:endParaRPr lang="sv-SE" dirty="0"/>
+          </a:p>
+        </p:txBody>
+      </p:sp>
+    </p:spTree>
+  </p:cSld>
+  <p:clrMapOvr>
+    <a:masterClrMapping/>
+  </p:clrMapOvr>
+  <p:timing>
+    <p:tnLst>
+      <p:par>
+        <p:cTn id="1" dur="indefinite" restart="never" nodeType="tmRoot"/>
+      </p:par>
+    </p:tnLst>
+  </p:timing>
+</p:sld>
+</file>
+
+<file path=ppt/slides/slide13.xml><?xml version="1.0" encoding="utf-8"?>
 <p:sld xmlns:a="http://schemas.openxmlformats.org/drawingml/2006/main" xmlns:r="http://schemas.openxmlformats.org/officeDocument/2006/relationships" xmlns:p="http://schemas.openxmlformats.org/presentationml/2006/main">
   <p:cSld>
     <p:spTree>
@@ -4824,7 +4974,7 @@
 </p:sld>
 </file>
 
-<file path=ppt/slides/slide13.xml><?xml version="1.0" encoding="utf-8"?>
+<file path=ppt/slides/slide14.xml><?xml version="1.0" encoding="utf-8"?>
 <p:sld xmlns:a="http://schemas.openxmlformats.org/drawingml/2006/main" xmlns:r="http://schemas.openxmlformats.org/officeDocument/2006/relationships" xmlns:p="http://schemas.openxmlformats.org/presentationml/2006/main">
   <p:cSld>
     <p:spTree>
@@ -4951,132 +5101,6 @@
 </p:sld>
 </file>
 
-<file path=ppt/slides/slide14.xml><?xml version="1.0" encoding="utf-8"?>
-<p:sld xmlns:a="http://schemas.openxmlformats.org/drawingml/2006/main" xmlns:r="http://schemas.openxmlformats.org/officeDocument/2006/relationships" xmlns:p="http://schemas.openxmlformats.org/presentationml/2006/main">
-  <p:cSld>
-    <p:spTree>
-      <p:nvGrpSpPr>
-        <p:cNvPr id="1" name=""/>
-        <p:cNvGrpSpPr/>
-        <p:nvPr/>
-      </p:nvGrpSpPr>
-      <p:grpSpPr>
-        <a:xfrm>
-          <a:off x="0" y="0"/>
-          <a:ext cx="0" cy="0"/>
-          <a:chOff x="0" y="0"/>
-          <a:chExt cx="0" cy="0"/>
-        </a:xfrm>
-      </p:grpSpPr>
-      <p:sp>
-        <p:nvSpPr>
-          <p:cNvPr id="2" name="Rubrik 1"/>
-          <p:cNvSpPr>
-            <a:spLocks noGrp="1"/>
-          </p:cNvSpPr>
-          <p:nvPr>
-            <p:ph type="title"/>
-          </p:nvPr>
-        </p:nvSpPr>
-        <p:spPr>
-          <a:xfrm>
-            <a:off x="481013" y="349250"/>
-            <a:ext cx="7543800" cy="1375047"/>
-          </a:xfrm>
-        </p:spPr>
-        <p:txBody>
-          <a:bodyPr>
-            <a:normAutofit/>
-          </a:bodyPr>
-          <a:lstStyle/>
-          <a:p>
-            <a:r>
-              <a:rPr lang="sv-SE" dirty="0" smtClean="0"/>
-              <a:t>DSL vs GPL(General </a:t>
-            </a:r>
-            <a:r>
-              <a:rPr lang="sv-SE" dirty="0" err="1" smtClean="0"/>
-              <a:t>Purpose</a:t>
-            </a:r>
-            <a:r>
-              <a:rPr lang="sv-SE" dirty="0" smtClean="0"/>
-              <a:t> Languages)</a:t>
-            </a:r>
-            <a:endParaRPr lang="sv-SE" dirty="0"/>
-          </a:p>
-        </p:txBody>
-      </p:sp>
-      <p:sp>
-        <p:nvSpPr>
-          <p:cNvPr id="3" name="Platshållare för innehåll 2"/>
-          <p:cNvSpPr>
-            <a:spLocks noGrp="1"/>
-          </p:cNvSpPr>
-          <p:nvPr>
-            <p:ph idx="1"/>
-          </p:nvPr>
-        </p:nvSpPr>
-        <p:spPr>
-          <a:xfrm>
-            <a:off x="469900" y="2020530"/>
-            <a:ext cx="8229600" cy="4443412"/>
-          </a:xfrm>
-        </p:spPr>
-        <p:txBody>
-          <a:bodyPr/>
-          <a:lstStyle/>
-          <a:p>
-            <a:r>
-              <a:rPr lang="sv-SE" dirty="0" smtClean="0"/>
-              <a:t>Java, C, Ruby, </a:t>
-            </a:r>
-            <a:r>
-              <a:rPr lang="sv-SE" dirty="0" err="1" smtClean="0"/>
-              <a:t>Groovy</a:t>
-            </a:r>
-            <a:r>
-              <a:rPr lang="sv-SE" dirty="0" smtClean="0"/>
-              <a:t> och liknande språk kallas GPL, General </a:t>
-            </a:r>
-            <a:r>
-              <a:rPr lang="sv-SE" dirty="0" err="1" smtClean="0"/>
-              <a:t>Purpose</a:t>
-            </a:r>
-            <a:r>
-              <a:rPr lang="sv-SE" dirty="0" smtClean="0"/>
-              <a:t> Languages. </a:t>
-            </a:r>
-          </a:p>
-          <a:p>
-            <a:r>
-              <a:rPr lang="sv-SE" dirty="0" smtClean="0"/>
-              <a:t>Har en generell syntax, oberoende av område.</a:t>
-            </a:r>
-          </a:p>
-          <a:p>
-            <a:r>
-              <a:rPr lang="sv-SE" dirty="0" smtClean="0"/>
-              <a:t>Allt går att göra, men det är sällan det enklaste eller snabbaste sättet</a:t>
-            </a:r>
-            <a:endParaRPr lang="sv-SE" dirty="0"/>
-          </a:p>
-        </p:txBody>
-      </p:sp>
-    </p:spTree>
-  </p:cSld>
-  <p:clrMapOvr>
-    <a:masterClrMapping/>
-  </p:clrMapOvr>
-  <p:timing>
-    <p:tnLst>
-      <p:par>
-        <p:cTn id="1" dur="indefinite" restart="never" nodeType="tmRoot"/>
-      </p:par>
-    </p:tnLst>
-  </p:timing>
-</p:sld>
-</file>
-
 <file path=ppt/slides/slide15.xml><?xml version="1.0" encoding="utf-8"?>
 <p:sld xmlns:a="http://schemas.openxmlformats.org/drawingml/2006/main" xmlns:r="http://schemas.openxmlformats.org/officeDocument/2006/relationships" xmlns:p="http://schemas.openxmlformats.org/presentationml/2006/main">
   <p:cSld>
@@ -5104,97 +5128,87 @@
             <p:ph type="title"/>
           </p:nvPr>
         </p:nvSpPr>
-        <p:spPr/>
-        <p:txBody>
-          <a:bodyPr>
-            <a:normAutofit fontScale="90000"/>
-          </a:bodyPr>
-          <a:lstStyle/>
-          <a:p>
-            <a:r>
-              <a:rPr lang="sv-SE" dirty="0" smtClean="0"/>
-              <a:t>DSL (</a:t>
-            </a:r>
-            <a:r>
-              <a:rPr lang="sv-SE" dirty="0" err="1" smtClean="0"/>
-              <a:t>Domain</a:t>
-            </a:r>
-            <a:r>
-              <a:rPr lang="sv-SE" dirty="0" smtClean="0"/>
-              <a:t> </a:t>
-            </a:r>
-            <a:r>
-              <a:rPr lang="sv-SE" dirty="0" err="1" smtClean="0"/>
-              <a:t>Specific</a:t>
-            </a:r>
-            <a:r>
-              <a:rPr lang="sv-SE" dirty="0" smtClean="0"/>
-              <a:t> Languages)</a:t>
-            </a:r>
-            <a:endParaRPr lang="sv-SE" dirty="0"/>
-          </a:p>
-        </p:txBody>
-      </p:sp>
-      <p:sp>
-        <p:nvSpPr>
-          <p:cNvPr id="3" name="Platshållare för innehåll 2"/>
-          <p:cNvSpPr>
-            <a:spLocks noGrp="1"/>
-          </p:cNvSpPr>
-          <p:nvPr>
-            <p:ph idx="1"/>
-          </p:nvPr>
-        </p:nvSpPr>
         <p:spPr>
           <a:xfrm>
-            <a:off x="469900" y="1589451"/>
+            <a:off x="481013" y="349250"/>
+            <a:ext cx="7543800" cy="1375047"/>
+          </a:xfrm>
+        </p:spPr>
+        <p:txBody>
+          <a:bodyPr>
+            <a:normAutofit/>
+          </a:bodyPr>
+          <a:lstStyle/>
+          <a:p>
+            <a:r>
+              <a:rPr lang="sv-SE" dirty="0" smtClean="0"/>
+              <a:t>DSL vs GPL(General </a:t>
+            </a:r>
+            <a:r>
+              <a:rPr lang="sv-SE" dirty="0" err="1" smtClean="0"/>
+              <a:t>Purpose</a:t>
+            </a:r>
+            <a:r>
+              <a:rPr lang="sv-SE" dirty="0" smtClean="0"/>
+              <a:t> Languages)</a:t>
+            </a:r>
+            <a:endParaRPr lang="sv-SE" dirty="0"/>
+          </a:p>
+        </p:txBody>
+      </p:sp>
+      <p:sp>
+        <p:nvSpPr>
+          <p:cNvPr id="3" name="Platshållare för innehåll 2"/>
+          <p:cNvSpPr>
+            <a:spLocks noGrp="1"/>
+          </p:cNvSpPr>
+          <p:nvPr>
+            <p:ph idx="1"/>
+          </p:nvPr>
+        </p:nvSpPr>
+        <p:spPr>
+          <a:xfrm>
+            <a:off x="469900" y="2020530"/>
             <a:ext cx="8229600" cy="4443412"/>
           </a:xfrm>
         </p:spPr>
         <p:txBody>
-          <a:bodyPr>
-            <a:normAutofit/>
-          </a:bodyPr>
-          <a:lstStyle/>
-          <a:p>
-            <a:r>
-              <a:rPr lang="sv-SE" dirty="0" smtClean="0"/>
-              <a:t>Språket är designat utifrån domänen det används i.</a:t>
-            </a:r>
-          </a:p>
-          <a:p>
-            <a:r>
-              <a:rPr lang="sv-SE" dirty="0" smtClean="0"/>
-              <a:t>Går snabbare att utveckla i ett språk som ligger nära problemdomänen</a:t>
-            </a:r>
-          </a:p>
-          <a:p>
-            <a:r>
-              <a:rPr lang="sv-SE" dirty="0" smtClean="0"/>
-              <a:t>Ett väl designat DSL kan användas i kommunikation med icke-programmerare, </a:t>
+          <a:bodyPr/>
+          <a:lstStyle/>
+          <a:p>
+            <a:r>
+              <a:rPr lang="sv-SE" dirty="0" smtClean="0"/>
+              <a:t>Java, C, Ruby, </a:t>
             </a:r>
             <a:r>
               <a:rPr lang="sv-SE" dirty="0" err="1" smtClean="0"/>
-              <a:t>tex</a:t>
-            </a:r>
-            <a:r>
-              <a:rPr lang="sv-SE" dirty="0" smtClean="0"/>
-              <a:t> beställare och användare</a:t>
-            </a:r>
-          </a:p>
-          <a:p>
-            <a:r>
-              <a:rPr lang="sv-SE" dirty="0" smtClean="0"/>
-              <a:t>Exempel på DSL: SQL, HTML, CSS, </a:t>
+              <a:t>Groovy</a:t>
+            </a:r>
+            <a:r>
+              <a:rPr lang="sv-SE" dirty="0" smtClean="0"/>
+              <a:t> och liknande språk kallas GPL, General </a:t>
             </a:r>
             <a:r>
               <a:rPr lang="sv-SE" dirty="0" err="1" smtClean="0"/>
-              <a:t>Ant</a:t>
-            </a:r>
-            <a:endParaRPr lang="sv-SE" dirty="0" smtClean="0"/>
-          </a:p>
-          <a:p>
-            <a:endParaRPr lang="sv-SE" dirty="0" smtClean="0"/>
+              <a:t>Purpose</a:t>
+            </a:r>
+            <a:r>
+              <a:rPr lang="sv-SE" dirty="0" smtClean="0"/>
+              <a:t> Languages. </a:t>
+            </a:r>
+          </a:p>
+          <a:p>
+            <a:r>
+              <a:rPr lang="sv-SE" dirty="0" smtClean="0"/>
+              <a:t>Har en generell syntax, oberoende av område.</a:t>
+            </a:r>
+          </a:p>
+          <a:p>
+            <a:r>
+              <a:rPr lang="sv-SE" dirty="0" smtClean="0"/>
+              <a:t>Allt går att göra, men det är sällan det enklaste eller snabbaste sättet</a:t>
+            </a:r>
+            <a:endParaRPr lang="sv-SE" dirty="0"/>
           </a:p>
         </p:txBody>
       </p:sp>
@@ -5242,16 +5256,30 @@
         </p:nvSpPr>
         <p:spPr/>
         <p:txBody>
-          <a:bodyPr/>
-          <a:lstStyle/>
-          <a:p>
-            <a:r>
-              <a:rPr lang="sv-SE" dirty="0" smtClean="0"/>
-              <a:t>DSL i </a:t>
+          <a:bodyPr>
+            <a:normAutofit fontScale="90000"/>
+          </a:bodyPr>
+          <a:lstStyle/>
+          <a:p>
+            <a:r>
+              <a:rPr lang="sv-SE" dirty="0" smtClean="0"/>
+              <a:t>DSL (</a:t>
             </a:r>
             <a:r>
               <a:rPr lang="sv-SE" dirty="0" err="1" smtClean="0"/>
-              <a:t>Groovy</a:t>
+              <a:t>Domain</a:t>
+            </a:r>
+            <a:r>
+              <a:rPr lang="sv-SE" dirty="0" smtClean="0"/>
+              <a:t> </a:t>
+            </a:r>
+            <a:r>
+              <a:rPr lang="sv-SE" dirty="0" err="1" smtClean="0"/>
+              <a:t>Specific</a:t>
+            </a:r>
+            <a:r>
+              <a:rPr lang="sv-SE" dirty="0" smtClean="0"/>
+              <a:t> Languages)</a:t>
             </a:r>
             <a:endParaRPr lang="sv-SE" dirty="0"/>
           </a:p>
@@ -5267,59 +5295,59 @@
             <p:ph idx="1"/>
           </p:nvPr>
         </p:nvSpPr>
-        <p:spPr/>
+        <p:spPr>
+          <a:xfrm>
+            <a:off x="469900" y="1589451"/>
+            <a:ext cx="8229600" cy="4443412"/>
+          </a:xfrm>
+        </p:spPr>
         <p:txBody>
           <a:bodyPr>
             <a:normAutofit/>
           </a:bodyPr>
           <a:lstStyle/>
           <a:p>
-            <a:pPr lvl="1">
-              <a:buNone/>
-            </a:pPr>
-            <a:r>
-              <a:rPr lang="sv-SE" dirty="0" smtClean="0">
-                <a:latin typeface="Courier New" pitchFamily="49" charset="0"/>
-                <a:cs typeface="Courier New" pitchFamily="49" charset="0"/>
-              </a:rPr>
-              <a:t>4.days.ago</a:t>
-            </a:r>
-          </a:p>
-        </p:txBody>
-      </p:sp>
-      <p:pic>
-        <p:nvPicPr>
-          <p:cNvPr id="5" name="Picture 2"/>
-          <p:cNvPicPr>
-            <a:picLocks noChangeAspect="1" noChangeArrowheads="1"/>
-          </p:cNvPicPr>
-          <p:nvPr/>
-        </p:nvPicPr>
-        <p:blipFill>
-          <a:blip r:embed="rId2"/>
-          <a:srcRect/>
-          <a:stretch>
-            <a:fillRect/>
-          </a:stretch>
-        </p:blipFill>
-        <p:spPr bwMode="auto">
-          <a:xfrm>
-            <a:off x="7663815" y="4551726"/>
-            <a:ext cx="1314450" cy="1438275"/>
-          </a:xfrm>
-          <a:prstGeom prst="rect">
-            <a:avLst/>
-          </a:prstGeom>
-          <a:noFill/>
-          <a:ln w="9525">
-            <a:noFill/>
-            <a:miter lim="800000"/>
-            <a:headEnd/>
-            <a:tailEnd/>
-          </a:ln>
-          <a:effectLst/>
-        </p:spPr>
-      </p:pic>
+            <a:r>
+              <a:rPr lang="sv-SE" dirty="0" smtClean="0"/>
+              <a:t>Språket är designat utifrån domänen det används i.</a:t>
+            </a:r>
+          </a:p>
+          <a:p>
+            <a:r>
+              <a:rPr lang="sv-SE" dirty="0" smtClean="0"/>
+              <a:t>Går snabbare att utveckla i ett språk som ligger nära problemdomänen</a:t>
+            </a:r>
+          </a:p>
+          <a:p>
+            <a:r>
+              <a:rPr lang="sv-SE" dirty="0" smtClean="0"/>
+              <a:t>Ett väl designat DSL kan användas i kommunikation med icke-programmerare, </a:t>
+            </a:r>
+            <a:r>
+              <a:rPr lang="sv-SE" dirty="0" err="1" smtClean="0"/>
+              <a:t>tex</a:t>
+            </a:r>
+            <a:r>
+              <a:rPr lang="sv-SE" dirty="0" smtClean="0"/>
+              <a:t> beställare och användare</a:t>
+            </a:r>
+          </a:p>
+          <a:p>
+            <a:r>
+              <a:rPr lang="sv-SE" dirty="0" smtClean="0"/>
+              <a:t>Exempel på DSL: SQL, HTML, CSS, </a:t>
+            </a:r>
+            <a:r>
+              <a:rPr lang="sv-SE" dirty="0" err="1" smtClean="0"/>
+              <a:t>Ant</a:t>
+            </a:r>
+            <a:endParaRPr lang="sv-SE" dirty="0" smtClean="0"/>
+          </a:p>
+          <a:p>
+            <a:endParaRPr lang="sv-SE" dirty="0" smtClean="0"/>
+          </a:p>
+        </p:txBody>
+      </p:sp>
     </p:spTree>
   </p:cSld>
   <p:clrMapOvr>
@@ -5404,28 +5432,14 @@
                 <a:latin typeface="Courier New" pitchFamily="49" charset="0"/>
                 <a:cs typeface="Courier New" pitchFamily="49" charset="0"/>
               </a:rPr>
-              <a:t>[</a:t>
-            </a:r>
-            <a:r>
-              <a:rPr lang="sv-SE" dirty="0" err="1" smtClean="0">
-                <a:latin typeface="Courier New" pitchFamily="49" charset="0"/>
-                <a:cs typeface="Courier New" pitchFamily="49" charset="0"/>
-              </a:rPr>
-              <a:t>DaysAgo.groovy</a:t>
-            </a:r>
-            <a:r>
-              <a:rPr lang="sv-SE" dirty="0" smtClean="0">
-                <a:latin typeface="Courier New" pitchFamily="49" charset="0"/>
-                <a:cs typeface="Courier New" pitchFamily="49" charset="0"/>
-              </a:rPr>
-              <a:t>]</a:t>
+              <a:t>4.days.ago</a:t>
             </a:r>
           </a:p>
         </p:txBody>
       </p:sp>
       <p:pic>
         <p:nvPicPr>
-          <p:cNvPr id="20482" name="Picture 2"/>
+          <p:cNvPr id="5" name="Picture 2"/>
           <p:cNvPicPr>
             <a:picLocks noChangeAspect="1" noChangeArrowheads="1"/>
           </p:cNvPicPr>
@@ -5500,134 +5514,68 @@
         </p:nvSpPr>
         <p:spPr/>
         <p:txBody>
+          <a:bodyPr/>
+          <a:lstStyle/>
+          <a:p>
+            <a:r>
+              <a:rPr lang="sv-SE" dirty="0" smtClean="0"/>
+              <a:t>DSL i </a:t>
+            </a:r>
+            <a:r>
+              <a:rPr lang="sv-SE" dirty="0" err="1" smtClean="0"/>
+              <a:t>Groovy</a:t>
+            </a:r>
+            <a:endParaRPr lang="sv-SE" dirty="0"/>
+          </a:p>
+        </p:txBody>
+      </p:sp>
+      <p:sp>
+        <p:nvSpPr>
+          <p:cNvPr id="3" name="Platshållare för innehåll 2"/>
+          <p:cNvSpPr>
+            <a:spLocks noGrp="1"/>
+          </p:cNvSpPr>
+          <p:nvPr>
+            <p:ph idx="1"/>
+          </p:nvPr>
+        </p:nvSpPr>
+        <p:spPr/>
+        <p:txBody>
           <a:bodyPr>
             <a:normAutofit/>
           </a:bodyPr>
           <a:lstStyle/>
           <a:p>
-            <a:r>
-              <a:rPr lang="sv-SE" dirty="0" smtClean="0"/>
-              <a:t>Varför </a:t>
-            </a:r>
-            <a:r>
-              <a:rPr lang="sv-SE" dirty="0" err="1" smtClean="0"/>
-              <a:t>Groovy</a:t>
-            </a:r>
-            <a:r>
-              <a:rPr lang="sv-SE" dirty="0" smtClean="0"/>
-              <a:t>?</a:t>
-            </a:r>
-            <a:endParaRPr lang="sv-SE" dirty="0"/>
-          </a:p>
-        </p:txBody>
-      </p:sp>
-      <p:sp>
-        <p:nvSpPr>
-          <p:cNvPr id="3" name="Platshållare för innehåll 2"/>
-          <p:cNvSpPr>
-            <a:spLocks noGrp="1"/>
-          </p:cNvSpPr>
-          <p:nvPr>
-            <p:ph idx="1"/>
-          </p:nvPr>
-        </p:nvSpPr>
-        <p:spPr/>
-        <p:txBody>
-          <a:bodyPr>
-            <a:normAutofit fontScale="92500" lnSpcReduction="10000"/>
-          </a:bodyPr>
-          <a:lstStyle/>
-          <a:p>
-            <a:r>
-              <a:rPr lang="sv-SE" dirty="0" smtClean="0"/>
-              <a:t>Det finns andra dynamiska språk som kan köras på Java-plattformen, med stöd för metaprogrammering och </a:t>
-            </a:r>
-            <a:r>
-              <a:rPr lang="sv-SE" dirty="0" err="1" smtClean="0"/>
-              <a:t>closures</a:t>
-            </a:r>
-            <a:endParaRPr lang="sv-SE" dirty="0" smtClean="0"/>
-          </a:p>
-          <a:p>
-            <a:r>
-              <a:rPr lang="sv-SE" dirty="0" smtClean="0"/>
-              <a:t>Sammanlagt över 150 språk kan köras på Java-plattformen</a:t>
-            </a:r>
-          </a:p>
-          <a:p>
-            <a:pPr lvl="1"/>
-            <a:r>
-              <a:rPr lang="sv-SE" dirty="0" smtClean="0"/>
-              <a:t>Java</a:t>
-            </a:r>
-          </a:p>
-          <a:p>
-            <a:pPr lvl="1"/>
-            <a:r>
-              <a:rPr lang="sv-SE" dirty="0" smtClean="0"/>
-              <a:t>Ruby (</a:t>
-            </a:r>
-            <a:r>
-              <a:rPr lang="sv-SE" dirty="0" err="1" smtClean="0"/>
-              <a:t>JRuby</a:t>
-            </a:r>
-            <a:r>
-              <a:rPr lang="sv-SE" dirty="0" smtClean="0"/>
-              <a:t>)</a:t>
-            </a:r>
-          </a:p>
-          <a:p>
-            <a:pPr lvl="1"/>
-            <a:r>
-              <a:rPr lang="sv-SE" dirty="0" err="1" smtClean="0"/>
-              <a:t>Python</a:t>
-            </a:r>
-            <a:r>
-              <a:rPr lang="sv-SE" dirty="0" smtClean="0"/>
-              <a:t> (</a:t>
-            </a:r>
-            <a:r>
-              <a:rPr lang="sv-SE" dirty="0" err="1" smtClean="0"/>
-              <a:t>Jython</a:t>
-            </a:r>
-            <a:r>
-              <a:rPr lang="sv-SE" dirty="0" smtClean="0"/>
-              <a:t>)</a:t>
-            </a:r>
-          </a:p>
-          <a:p>
-            <a:pPr lvl="1"/>
-            <a:r>
-              <a:rPr lang="sv-SE" dirty="0" err="1" smtClean="0"/>
-              <a:t>BeanShell</a:t>
-            </a:r>
-            <a:endParaRPr lang="sv-SE" dirty="0" smtClean="0"/>
-          </a:p>
-          <a:p>
-            <a:r>
-              <a:rPr lang="sv-SE" dirty="0" smtClean="0"/>
-              <a:t>Varför </a:t>
-            </a:r>
-            <a:r>
-              <a:rPr lang="sv-SE" dirty="0" err="1" smtClean="0"/>
-              <a:t>Groovy</a:t>
-            </a:r>
-            <a:r>
-              <a:rPr lang="sv-SE" dirty="0" smtClean="0"/>
-              <a:t>?</a:t>
-            </a:r>
-          </a:p>
-          <a:p>
             <a:pPr lvl="1">
               <a:buNone/>
             </a:pPr>
-            <a:endParaRPr lang="sv-SE" dirty="0" smtClean="0"/>
+            <a:r>
+              <a:rPr lang="sv-SE" dirty="0" smtClean="0">
+                <a:latin typeface="Courier New" pitchFamily="49" charset="0"/>
+                <a:cs typeface="Courier New" pitchFamily="49" charset="0"/>
+              </a:rPr>
+              <a:t>[</a:t>
+            </a:r>
+            <a:r>
+              <a:rPr lang="sv-SE" dirty="0" err="1" smtClean="0">
+                <a:latin typeface="Courier New" pitchFamily="49" charset="0"/>
+                <a:cs typeface="Courier New" pitchFamily="49" charset="0"/>
+              </a:rPr>
+              <a:t>DaysAgo.groovy</a:t>
+            </a:r>
+            <a:r>
+              <a:rPr lang="sv-SE" dirty="0" smtClean="0">
+                <a:latin typeface="Courier New" pitchFamily="49" charset="0"/>
+                <a:cs typeface="Courier New" pitchFamily="49" charset="0"/>
+              </a:rPr>
+              <a:t>]</a:t>
+            </a:r>
           </a:p>
         </p:txBody>
       </p:sp>
       <p:pic>
         <p:nvPicPr>
-          <p:cNvPr id="6146" name="Picture 2"/>
+          <p:cNvPr id="20482" name="Picture 2"/>
           <p:cNvPicPr>
             <a:picLocks noChangeAspect="1" noChangeArrowheads="1"/>
           </p:cNvPicPr>
@@ -5642,8 +5590,8 @@
         </p:blipFill>
         <p:spPr bwMode="auto">
           <a:xfrm>
-            <a:off x="5175924" y="3603594"/>
-            <a:ext cx="3968075" cy="2499887"/>
+            <a:off x="7663815" y="4551726"/>
+            <a:ext cx="1314450" cy="1438275"/>
           </a:xfrm>
           <a:prstGeom prst="rect">
             <a:avLst/>
@@ -5702,17 +5650,23 @@
         </p:nvSpPr>
         <p:spPr/>
         <p:txBody>
-          <a:bodyPr/>
-          <a:lstStyle/>
-          <a:p>
-            <a:r>
-              <a:rPr lang="sv-SE" dirty="0" smtClean="0"/>
-              <a:t>Fördelar med </a:t>
+          <a:bodyPr>
+            <a:normAutofit/>
+          </a:bodyPr>
+          <a:lstStyle/>
+          <a:p>
+            <a:r>
+              <a:rPr lang="sv-SE" dirty="0" smtClean="0"/>
+              <a:t>Varför </a:t>
             </a:r>
             <a:r>
               <a:rPr lang="sv-SE" dirty="0" err="1" smtClean="0"/>
               <a:t>Groovy</a:t>
             </a:r>
+            <a:r>
+              <a:rPr lang="sv-SE" dirty="0" smtClean="0"/>
+              <a:t>?</a:t>
+            </a:r>
             <a:endParaRPr lang="sv-SE" dirty="0"/>
           </a:p>
         </p:txBody>
@@ -5729,47 +5683,101 @@
         </p:nvSpPr>
         <p:spPr/>
         <p:txBody>
-          <a:bodyPr/>
-          <a:lstStyle/>
-          <a:p>
-            <a:r>
-              <a:rPr lang="sv-SE" dirty="0" smtClean="0"/>
-              <a:t>Enkelt att lära för en Javaprogrammerare</a:t>
-            </a:r>
-          </a:p>
-          <a:p>
-            <a:r>
-              <a:rPr lang="sv-SE" dirty="0" smtClean="0"/>
-              <a:t>Helt kompatibelt med existerande Javaprojekt</a:t>
-            </a:r>
-          </a:p>
-          <a:p>
+          <a:bodyPr>
+            <a:normAutofit fontScale="92500" lnSpcReduction="10000"/>
+          </a:bodyPr>
+          <a:lstStyle/>
+          <a:p>
+            <a:r>
+              <a:rPr lang="sv-SE" dirty="0" smtClean="0"/>
+              <a:t>Det finns andra dynamiska språk som kan köras på Java-plattformen, med stöd för metaprogrammering och </a:t>
+            </a:r>
+            <a:r>
+              <a:rPr lang="sv-SE" dirty="0" err="1" smtClean="0"/>
+              <a:t>closures</a:t>
+            </a:r>
+            <a:endParaRPr lang="sv-SE" dirty="0" smtClean="0"/>
+          </a:p>
+          <a:p>
+            <a:r>
+              <a:rPr lang="sv-SE" dirty="0" smtClean="0"/>
+              <a:t>Sammanlagt över 150 språk kan köras på Java-plattformen</a:t>
+            </a:r>
+          </a:p>
+          <a:p>
+            <a:pPr lvl="1"/>
+            <a:r>
+              <a:rPr lang="sv-SE" dirty="0" smtClean="0"/>
+              <a:t>Java</a:t>
+            </a:r>
+          </a:p>
+          <a:p>
+            <a:pPr lvl="1"/>
+            <a:r>
+              <a:rPr lang="sv-SE" dirty="0" smtClean="0"/>
+              <a:t>Ruby (</a:t>
+            </a:r>
+            <a:r>
+              <a:rPr lang="sv-SE" dirty="0" err="1" smtClean="0"/>
+              <a:t>JRuby</a:t>
+            </a:r>
+            <a:r>
+              <a:rPr lang="sv-SE" dirty="0" smtClean="0"/>
+              <a:t>)</a:t>
+            </a:r>
+          </a:p>
+          <a:p>
+            <a:pPr lvl="1"/>
+            <a:r>
+              <a:rPr lang="sv-SE" dirty="0" err="1" smtClean="0"/>
+              <a:t>Python</a:t>
+            </a:r>
+            <a:r>
+              <a:rPr lang="sv-SE" dirty="0" smtClean="0"/>
+              <a:t> (</a:t>
+            </a:r>
+            <a:r>
+              <a:rPr lang="sv-SE" dirty="0" err="1" smtClean="0"/>
+              <a:t>Jython</a:t>
+            </a:r>
+            <a:r>
+              <a:rPr lang="sv-SE" dirty="0" smtClean="0"/>
+              <a:t>)</a:t>
+            </a:r>
+          </a:p>
+          <a:p>
+            <a:pPr lvl="1"/>
+            <a:r>
+              <a:rPr lang="sv-SE" dirty="0" err="1" smtClean="0"/>
+              <a:t>BeanShell</a:t>
+            </a:r>
+            <a:endParaRPr lang="sv-SE" dirty="0" smtClean="0"/>
+          </a:p>
+          <a:p>
+            <a:r>
+              <a:rPr lang="sv-SE" dirty="0" smtClean="0"/>
+              <a:t>Varför </a:t>
+            </a:r>
             <a:r>
               <a:rPr lang="sv-SE" dirty="0" err="1" smtClean="0"/>
               <a:t>Groovy</a:t>
             </a:r>
             <a:r>
               <a:rPr lang="sv-SE" dirty="0" smtClean="0"/>
-              <a:t> ÄR Java – kompileras till .</a:t>
-            </a:r>
-            <a:r>
-              <a:rPr lang="sv-SE" dirty="0" err="1" smtClean="0"/>
-              <a:t>class-filer</a:t>
-            </a:r>
+              <a:t>?</a:t>
+            </a:r>
+          </a:p>
+          <a:p>
+            <a:pPr lvl="1">
+              <a:buNone/>
+            </a:pPr>
             <a:endParaRPr lang="sv-SE" dirty="0" smtClean="0"/>
-          </a:p>
-          <a:p>
-            <a:r>
-              <a:rPr lang="sv-SE" dirty="0" smtClean="0"/>
-              <a:t>Utökar JDK för att förenkla utveckling</a:t>
-            </a:r>
-            <a:endParaRPr lang="sv-SE" dirty="0"/>
           </a:p>
         </p:txBody>
       </p:sp>
       <p:pic>
         <p:nvPicPr>
-          <p:cNvPr id="17410" name="Picture 2"/>
+          <p:cNvPr id="6146" name="Picture 2"/>
           <p:cNvPicPr>
             <a:picLocks noChangeAspect="1" noChangeArrowheads="1"/>
           </p:cNvPicPr>
@@ -5784,8 +5792,8 @@
         </p:blipFill>
         <p:spPr bwMode="auto">
           <a:xfrm>
-            <a:off x="6006122" y="3799440"/>
-            <a:ext cx="3137877" cy="2301109"/>
+            <a:off x="5175924" y="3603594"/>
+            <a:ext cx="3968075" cy="2499887"/>
           </a:xfrm>
           <a:prstGeom prst="rect">
             <a:avLst/>
@@ -6004,11 +6012,11 @@
           <a:p>
             <a:r>
               <a:rPr lang="sv-SE" dirty="0" smtClean="0"/>
-              <a:t>Enkelt att lära: </a:t>
+              <a:t>Fördelar med </a:t>
             </a:r>
             <a:r>
               <a:rPr lang="sv-SE" dirty="0" err="1" smtClean="0"/>
-              <a:t>HelloWorld.java</a:t>
+              <a:t>Groovy</a:t>
             </a:r>
             <a:endParaRPr lang="sv-SE" dirty="0"/>
           </a:p>
@@ -6029,27 +6037,74 @@
           <a:bodyPr/>
           <a:lstStyle/>
           <a:p>
-            <a:pPr>
-              <a:buNone/>
-            </a:pPr>
-            <a:r>
-              <a:rPr lang="sv-SE" dirty="0" smtClean="0"/>
-              <a:t>[</a:t>
-            </a:r>
+            <a:r>
+              <a:rPr lang="sv-SE" dirty="0" smtClean="0"/>
+              <a:t>Enkelt att lära för en Javaprogrammerare</a:t>
+            </a:r>
+          </a:p>
+          <a:p>
+            <a:r>
+              <a:rPr lang="sv-SE" dirty="0" smtClean="0"/>
+              <a:t>Helt kompatibelt med existerande Javaprojekt</a:t>
+            </a:r>
+          </a:p>
+          <a:p>
             <a:r>
               <a:rPr lang="sv-SE" dirty="0" err="1" smtClean="0"/>
-              <a:t>helloWorld.java</a:t>
-            </a:r>
-            <a:r>
-              <a:rPr lang="sv-SE" dirty="0" smtClean="0"/>
-              <a:t>]</a:t>
-            </a:r>
-          </a:p>
-          <a:p>
+              <a:t>Groovy</a:t>
+            </a:r>
+            <a:r>
+              <a:rPr lang="sv-SE" dirty="0" smtClean="0"/>
+              <a:t> ÄR Java – kompileras till .</a:t>
+            </a:r>
+            <a:r>
+              <a:rPr lang="sv-SE" dirty="0" err="1" smtClean="0"/>
+              <a:t>class-filer</a:t>
+            </a:r>
+            <a:endParaRPr lang="sv-SE" dirty="0" smtClean="0"/>
+          </a:p>
+          <a:p>
+            <a:r>
+              <a:rPr lang="sv-SE" dirty="0" smtClean="0"/>
+              <a:t>Utökar JDK för att förenkla utveckling</a:t>
+            </a:r>
             <a:endParaRPr lang="sv-SE" dirty="0"/>
           </a:p>
         </p:txBody>
       </p:sp>
+      <p:pic>
+        <p:nvPicPr>
+          <p:cNvPr id="17410" name="Picture 2"/>
+          <p:cNvPicPr>
+            <a:picLocks noChangeAspect="1" noChangeArrowheads="1"/>
+          </p:cNvPicPr>
+          <p:nvPr/>
+        </p:nvPicPr>
+        <p:blipFill>
+          <a:blip r:embed="rId2"/>
+          <a:srcRect/>
+          <a:stretch>
+            <a:fillRect/>
+          </a:stretch>
+        </p:blipFill>
+        <p:spPr bwMode="auto">
+          <a:xfrm>
+            <a:off x="6006122" y="3799440"/>
+            <a:ext cx="3137877" cy="2301109"/>
+          </a:xfrm>
+          <a:prstGeom prst="rect">
+            <a:avLst/>
+          </a:prstGeom>
+          <a:noFill/>
+          <a:ln w="9525">
+            <a:noFill/>
+            <a:miter lim="800000"/>
+            <a:headEnd/>
+            <a:tailEnd/>
+          </a:ln>
+          <a:effectLst/>
+        </p:spPr>
+      </p:pic>
     </p:spTree>
   </p:cSld>
   <p:clrMapOvr>
@@ -6098,8 +6153,12 @@
           <a:lstStyle/>
           <a:p>
             <a:r>
+              <a:rPr lang="sv-SE" dirty="0" smtClean="0"/>
+              <a:t>Enkelt att lära: </a:t>
+            </a:r>
+            <a:r>
               <a:rPr lang="sv-SE" dirty="0" err="1" smtClean="0"/>
-              <a:t>HelloWorld.groovy</a:t>
+              <a:t>HelloWorld.java</a:t>
             </a:r>
             <a:endParaRPr lang="sv-SE" dirty="0"/>
           </a:p>
@@ -6129,7 +6188,7 @@
             </a:r>
             <a:r>
               <a:rPr lang="sv-SE" dirty="0" err="1" smtClean="0"/>
-              <a:t>helloWorld.groovy</a:t>
+              <a:t>helloWorld.java</a:t>
             </a:r>
             <a:r>
               <a:rPr lang="sv-SE" dirty="0" smtClean="0"/>
@@ -6183,48 +6242,55 @@
             <p:ph type="title"/>
           </p:nvPr>
         </p:nvSpPr>
-        <p:spPr>
-          <a:xfrm>
-            <a:off x="481013" y="349250"/>
-            <a:ext cx="7543800" cy="1283607"/>
-          </a:xfrm>
-        </p:spPr>
-        <p:txBody>
-          <a:bodyPr>
-            <a:normAutofit/>
-          </a:bodyPr>
-          <a:lstStyle/>
-          <a:p>
-            <a:r>
-              <a:rPr lang="sv-SE" dirty="0" smtClean="0"/>
-              <a:t>Helt kompatibelt med existerande Javaprojekt</a:t>
-            </a:r>
-          </a:p>
-        </p:txBody>
-      </p:sp>
-      <p:pic>
-        <p:nvPicPr>
-          <p:cNvPr id="10" name="Platshållare för innehåll 7" descr="groovyOnJvm.gif"/>
-          <p:cNvPicPr>
-            <a:picLocks noGrp="1" noChangeAspect="1"/>
-          </p:cNvPicPr>
+        <p:spPr/>
+        <p:txBody>
+          <a:bodyPr/>
+          <a:lstStyle/>
+          <a:p>
+            <a:r>
+              <a:rPr lang="sv-SE" dirty="0" err="1" smtClean="0"/>
+              <a:t>HelloWorld.groovy</a:t>
+            </a:r>
+            <a:endParaRPr lang="sv-SE" dirty="0"/>
+          </a:p>
+        </p:txBody>
+      </p:sp>
+      <p:sp>
+        <p:nvSpPr>
+          <p:cNvPr id="3" name="Platshållare för innehåll 2"/>
+          <p:cNvSpPr>
+            <a:spLocks noGrp="1"/>
+          </p:cNvSpPr>
           <p:nvPr>
             <p:ph idx="1"/>
           </p:nvPr>
-        </p:nvPicPr>
-        <p:blipFill>
-          <a:blip r:embed="rId2"/>
-          <a:stretch>
-            <a:fillRect/>
-          </a:stretch>
-        </p:blipFill>
-        <p:spPr>
-          <a:xfrm>
-            <a:off x="1192260" y="1534885"/>
-            <a:ext cx="6759479" cy="4525963"/>
-          </a:xfrm>
-        </p:spPr>
-      </p:pic>
+        </p:nvSpPr>
+        <p:spPr/>
+        <p:txBody>
+          <a:bodyPr/>
+          <a:lstStyle/>
+          <a:p>
+            <a:pPr>
+              <a:buNone/>
+            </a:pPr>
+            <a:r>
+              <a:rPr lang="sv-SE" dirty="0" smtClean="0"/>
+              <a:t>[</a:t>
+            </a:r>
+            <a:r>
+              <a:rPr lang="sv-SE" dirty="0" err="1" smtClean="0"/>
+              <a:t>helloWorld.groovy</a:t>
+            </a:r>
+            <a:r>
+              <a:rPr lang="sv-SE" dirty="0" smtClean="0"/>
+              <a:t>]</a:t>
+            </a:r>
+          </a:p>
+          <a:p>
+            <a:endParaRPr lang="sv-SE" dirty="0"/>
+          </a:p>
+        </p:txBody>
+      </p:sp>
     </p:spTree>
   </p:cSld>
   <p:clrMapOvr>
@@ -6270,6 +6336,90 @@
         <p:spPr>
           <a:xfrm>
             <a:off x="481013" y="349250"/>
+            <a:ext cx="7543800" cy="1283607"/>
+          </a:xfrm>
+        </p:spPr>
+        <p:txBody>
+          <a:bodyPr>
+            <a:normAutofit/>
+          </a:bodyPr>
+          <a:lstStyle/>
+          <a:p>
+            <a:r>
+              <a:rPr lang="sv-SE" dirty="0" smtClean="0"/>
+              <a:t>Helt kompatibelt med existerande Javaprojekt</a:t>
+            </a:r>
+          </a:p>
+        </p:txBody>
+      </p:sp>
+      <p:pic>
+        <p:nvPicPr>
+          <p:cNvPr id="10" name="Platshållare för innehåll 7" descr="groovyOnJvm.gif"/>
+          <p:cNvPicPr>
+            <a:picLocks noGrp="1" noChangeAspect="1"/>
+          </p:cNvPicPr>
+          <p:nvPr>
+            <p:ph idx="1"/>
+          </p:nvPr>
+        </p:nvPicPr>
+        <p:blipFill>
+          <a:blip r:embed="rId2"/>
+          <a:stretch>
+            <a:fillRect/>
+          </a:stretch>
+        </p:blipFill>
+        <p:spPr>
+          <a:xfrm>
+            <a:off x="1192260" y="1534885"/>
+            <a:ext cx="6759479" cy="4525963"/>
+          </a:xfrm>
+        </p:spPr>
+      </p:pic>
+    </p:spTree>
+  </p:cSld>
+  <p:clrMapOvr>
+    <a:masterClrMapping/>
+  </p:clrMapOvr>
+  <p:timing>
+    <p:tnLst>
+      <p:par>
+        <p:cTn id="1" dur="indefinite" restart="never" nodeType="tmRoot"/>
+      </p:par>
+    </p:tnLst>
+  </p:timing>
+</p:sld>
+</file>
+
+<file path=ppt/slides/slide24.xml><?xml version="1.0" encoding="utf-8"?>
+<p:sld xmlns:a="http://schemas.openxmlformats.org/drawingml/2006/main" xmlns:r="http://schemas.openxmlformats.org/officeDocument/2006/relationships" xmlns:p="http://schemas.openxmlformats.org/presentationml/2006/main">
+  <p:cSld>
+    <p:spTree>
+      <p:nvGrpSpPr>
+        <p:cNvPr id="1" name=""/>
+        <p:cNvGrpSpPr/>
+        <p:nvPr/>
+      </p:nvGrpSpPr>
+      <p:grpSpPr>
+        <a:xfrm>
+          <a:off x="0" y="0"/>
+          <a:ext cx="0" cy="0"/>
+          <a:chOff x="0" y="0"/>
+          <a:chExt cx="0" cy="0"/>
+        </a:xfrm>
+      </p:grpSpPr>
+      <p:sp>
+        <p:nvSpPr>
+          <p:cNvPr id="2" name="Rubrik 1"/>
+          <p:cNvSpPr>
+            <a:spLocks noGrp="1"/>
+          </p:cNvSpPr>
+          <p:nvPr>
+            <p:ph type="title"/>
+          </p:nvPr>
+        </p:nvSpPr>
+        <p:spPr>
+          <a:xfrm>
+            <a:off x="481013" y="349250"/>
             <a:ext cx="7543800" cy="1492613"/>
           </a:xfrm>
         </p:spPr>
@@ -6357,7 +6507,7 @@
 </p:sld>
 </file>
 
-<file path=ppt/slides/slide24.xml><?xml version="1.0" encoding="utf-8"?>
+<file path=ppt/slides/slide25.xml><?xml version="1.0" encoding="utf-8"?>
 <p:sld xmlns:a="http://schemas.openxmlformats.org/drawingml/2006/main" xmlns:r="http://schemas.openxmlformats.org/officeDocument/2006/relationships" xmlns:p="http://schemas.openxmlformats.org/presentationml/2006/main">
   <p:cSld>
     <p:spTree>
@@ -6507,7 +6657,7 @@
 </p:sld>
 </file>
 
-<file path=ppt/slides/slide25.xml><?xml version="1.0" encoding="utf-8"?>
+<file path=ppt/slides/slide26.xml><?xml version="1.0" encoding="utf-8"?>
 <p:sld xmlns:a="http://schemas.openxmlformats.org/drawingml/2006/main" xmlns:r="http://schemas.openxmlformats.org/officeDocument/2006/relationships" xmlns:p="http://schemas.openxmlformats.org/presentationml/2006/main">
   <p:cSld>
     <p:spTree>
@@ -6660,7 +6810,7 @@
 </p:sld>
 </file>
 
-<file path=ppt/slides/slide26.xml><?xml version="1.0" encoding="utf-8"?>
+<file path=ppt/slides/slide27.xml><?xml version="1.0" encoding="utf-8"?>
 <p:sld xmlns:a="http://schemas.openxmlformats.org/drawingml/2006/main" xmlns:r="http://schemas.openxmlformats.org/officeDocument/2006/relationships" xmlns:p="http://schemas.openxmlformats.org/presentationml/2006/main">
   <p:cSld>
     <p:spTree>
@@ -6774,7 +6924,7 @@
 </p:sld>
 </file>
 
-<file path=ppt/slides/slide27.xml><?xml version="1.0" encoding="utf-8"?>
+<file path=ppt/slides/slide28.xml><?xml version="1.0" encoding="utf-8"?>
 <p:sld xmlns:a="http://schemas.openxmlformats.org/drawingml/2006/main" xmlns:r="http://schemas.openxmlformats.org/officeDocument/2006/relationships" xmlns:p="http://schemas.openxmlformats.org/presentationml/2006/main">
   <p:cSld>
     <p:spTree>
@@ -6893,7 +7043,7 @@
 </p:sld>
 </file>
 
-<file path=ppt/slides/slide28.xml><?xml version="1.0" encoding="utf-8"?>
+<file path=ppt/slides/slide29.xml><?xml version="1.0" encoding="utf-8"?>
 <p:sld xmlns:a="http://schemas.openxmlformats.org/drawingml/2006/main" xmlns:r="http://schemas.openxmlformats.org/officeDocument/2006/relationships" xmlns:p="http://schemas.openxmlformats.org/presentationml/2006/main">
   <p:cSld>
     <p:spTree>
@@ -6968,99 +7118,6 @@
           <a:effectLst/>
         </p:spPr>
       </p:pic>
-    </p:spTree>
-  </p:cSld>
-  <p:clrMapOvr>
-    <a:masterClrMapping/>
-  </p:clrMapOvr>
-  <p:timing>
-    <p:tnLst>
-      <p:par>
-        <p:cTn id="1" dur="indefinite" restart="never" nodeType="tmRoot"/>
-      </p:par>
-    </p:tnLst>
-  </p:timing>
-</p:sld>
-</file>
-
-<file path=ppt/slides/slide29.xml><?xml version="1.0" encoding="utf-8"?>
-<p:sld xmlns:a="http://schemas.openxmlformats.org/drawingml/2006/main" xmlns:r="http://schemas.openxmlformats.org/officeDocument/2006/relationships" xmlns:p="http://schemas.openxmlformats.org/presentationml/2006/main">
-  <p:cSld>
-    <p:spTree>
-      <p:nvGrpSpPr>
-        <p:cNvPr id="1" name=""/>
-        <p:cNvGrpSpPr/>
-        <p:nvPr/>
-      </p:nvGrpSpPr>
-      <p:grpSpPr>
-        <a:xfrm>
-          <a:off x="0" y="0"/>
-          <a:ext cx="0" cy="0"/>
-          <a:chOff x="0" y="0"/>
-          <a:chExt cx="0" cy="0"/>
-        </a:xfrm>
-      </p:grpSpPr>
-      <p:sp>
-        <p:nvSpPr>
-          <p:cNvPr id="2" name="Rubrik 1"/>
-          <p:cNvSpPr>
-            <a:spLocks noGrp="1"/>
-          </p:cNvSpPr>
-          <p:nvPr>
-            <p:ph type="title"/>
-          </p:nvPr>
-        </p:nvSpPr>
-        <p:spPr/>
-        <p:txBody>
-          <a:bodyPr/>
-          <a:lstStyle/>
-          <a:p>
-            <a:r>
-              <a:rPr lang="sv-SE" dirty="0" smtClean="0"/>
-              <a:t>Läsa fil i </a:t>
-            </a:r>
-            <a:r>
-              <a:rPr lang="sv-SE" dirty="0" err="1" smtClean="0"/>
-              <a:t>Groovy</a:t>
-            </a:r>
-            <a:endParaRPr lang="sv-SE" dirty="0"/>
-          </a:p>
-        </p:txBody>
-      </p:sp>
-      <p:sp>
-        <p:nvSpPr>
-          <p:cNvPr id="3" name="Platshållare för innehåll 2"/>
-          <p:cNvSpPr>
-            <a:spLocks noGrp="1"/>
-          </p:cNvSpPr>
-          <p:nvPr>
-            <p:ph idx="1"/>
-          </p:nvPr>
-        </p:nvSpPr>
-        <p:spPr/>
-        <p:txBody>
-          <a:bodyPr/>
-          <a:lstStyle/>
-          <a:p>
-            <a:pPr>
-              <a:buNone/>
-            </a:pPr>
-            <a:r>
-              <a:rPr lang="sv-SE" dirty="0" smtClean="0"/>
-              <a:t>[</a:t>
-            </a:r>
-            <a:r>
-              <a:rPr lang="sv-SE" dirty="0" err="1" smtClean="0"/>
-              <a:t>ReadFile.groovy</a:t>
-            </a:r>
-            <a:r>
-              <a:rPr lang="sv-SE" dirty="0" smtClean="0"/>
-              <a:t>]</a:t>
-            </a:r>
-            <a:endParaRPr lang="sv-SE" dirty="0"/>
-          </a:p>
-        </p:txBody>
-      </p:sp>
     </p:spTree>
   </p:cSld>
   <p:clrMapOvr>
@@ -7298,6 +7355,99 @@
           <a:p>
             <a:r>
               <a:rPr lang="sv-SE" dirty="0" smtClean="0"/>
+              <a:t>Läsa fil i </a:t>
+            </a:r>
+            <a:r>
+              <a:rPr lang="sv-SE" dirty="0" err="1" smtClean="0"/>
+              <a:t>Groovy</a:t>
+            </a:r>
+            <a:endParaRPr lang="sv-SE" dirty="0"/>
+          </a:p>
+        </p:txBody>
+      </p:sp>
+      <p:sp>
+        <p:nvSpPr>
+          <p:cNvPr id="3" name="Platshållare för innehåll 2"/>
+          <p:cNvSpPr>
+            <a:spLocks noGrp="1"/>
+          </p:cNvSpPr>
+          <p:nvPr>
+            <p:ph idx="1"/>
+          </p:nvPr>
+        </p:nvSpPr>
+        <p:spPr/>
+        <p:txBody>
+          <a:bodyPr/>
+          <a:lstStyle/>
+          <a:p>
+            <a:pPr>
+              <a:buNone/>
+            </a:pPr>
+            <a:r>
+              <a:rPr lang="sv-SE" dirty="0" smtClean="0"/>
+              <a:t>[</a:t>
+            </a:r>
+            <a:r>
+              <a:rPr lang="sv-SE" dirty="0" err="1" smtClean="0"/>
+              <a:t>ReadFile.groovy</a:t>
+            </a:r>
+            <a:r>
+              <a:rPr lang="sv-SE" dirty="0" smtClean="0"/>
+              <a:t>]</a:t>
+            </a:r>
+            <a:endParaRPr lang="sv-SE" dirty="0"/>
+          </a:p>
+        </p:txBody>
+      </p:sp>
+    </p:spTree>
+  </p:cSld>
+  <p:clrMapOvr>
+    <a:masterClrMapping/>
+  </p:clrMapOvr>
+  <p:timing>
+    <p:tnLst>
+      <p:par>
+        <p:cTn id="1" dur="indefinite" restart="never" nodeType="tmRoot"/>
+      </p:par>
+    </p:tnLst>
+  </p:timing>
+</p:sld>
+</file>
+
+<file path=ppt/slides/slide31.xml><?xml version="1.0" encoding="utf-8"?>
+<p:sld xmlns:a="http://schemas.openxmlformats.org/drawingml/2006/main" xmlns:r="http://schemas.openxmlformats.org/officeDocument/2006/relationships" xmlns:p="http://schemas.openxmlformats.org/presentationml/2006/main">
+  <p:cSld>
+    <p:spTree>
+      <p:nvGrpSpPr>
+        <p:cNvPr id="1" name=""/>
+        <p:cNvGrpSpPr/>
+        <p:nvPr/>
+      </p:nvGrpSpPr>
+      <p:grpSpPr>
+        <a:xfrm>
+          <a:off x="0" y="0"/>
+          <a:ext cx="0" cy="0"/>
+          <a:chOff x="0" y="0"/>
+          <a:chExt cx="0" cy="0"/>
+        </a:xfrm>
+      </p:grpSpPr>
+      <p:sp>
+        <p:nvSpPr>
+          <p:cNvPr id="2" name="Rubrik 1"/>
+          <p:cNvSpPr>
+            <a:spLocks noGrp="1"/>
+          </p:cNvSpPr>
+          <p:nvPr>
+            <p:ph type="title"/>
+          </p:nvPr>
+        </p:nvSpPr>
+        <p:spPr/>
+        <p:txBody>
+          <a:bodyPr/>
+          <a:lstStyle/>
+          <a:p>
+            <a:r>
+              <a:rPr lang="sv-SE" dirty="0" smtClean="0"/>
               <a:t>Fler utökningar av JDK </a:t>
             </a:r>
             <a:endParaRPr lang="sv-SE" dirty="0"/>
@@ -7392,7 +7542,7 @@
           </a:p>
           <a:p>
             <a:r>
-              <a:rPr lang="sv-SE" sz="2000" smtClean="0"/>
+              <a:rPr lang="sv-SE" sz="2000" dirty="0" err="1" smtClean="0"/>
               <a:t>Optional</a:t>
             </a:r>
             <a:r>
@@ -7479,7 +7629,7 @@
 </p:sld>
 </file>
 
-<file path=ppt/slides/slide31.xml><?xml version="1.0" encoding="utf-8"?>
+<file path=ppt/slides/slide32.xml><?xml version="1.0" encoding="utf-8"?>
 <p:sld xmlns:a="http://schemas.openxmlformats.org/drawingml/2006/main" xmlns:r="http://schemas.openxmlformats.org/officeDocument/2006/relationships" xmlns:p="http://schemas.openxmlformats.org/presentationml/2006/main">
   <p:cSld>
     <p:spTree>
@@ -7750,7 +7900,7 @@
 </p:sld>
 </file>
 
-<file path=ppt/slides/slide32.xml><?xml version="1.0" encoding="utf-8"?>
+<file path=ppt/slides/slide33.xml><?xml version="1.0" encoding="utf-8"?>
 <p:sld xmlns:a="http://schemas.openxmlformats.org/drawingml/2006/main" xmlns:r="http://schemas.openxmlformats.org/officeDocument/2006/relationships" xmlns:p="http://schemas.openxmlformats.org/presentationml/2006/main">
   <p:cSld>
     <p:spTree>
@@ -7865,7 +8015,7 @@
 </p:sld>
 </file>
 
-<file path=ppt/slides/slide33.xml><?xml version="1.0" encoding="utf-8"?>
+<file path=ppt/slides/slide34.xml><?xml version="1.0" encoding="utf-8"?>
 <p:sld xmlns:a="http://schemas.openxmlformats.org/drawingml/2006/main" xmlns:r="http://schemas.openxmlformats.org/officeDocument/2006/relationships" xmlns:p="http://schemas.openxmlformats.org/presentationml/2006/main">
   <p:cSld>
     <p:spTree>
@@ -7990,102 +8140,6 @@
 </p:sld>
 </file>
 
-<file path=ppt/slides/slide34.xml><?xml version="1.0" encoding="utf-8"?>
-<p:sld xmlns:a="http://schemas.openxmlformats.org/drawingml/2006/main" xmlns:r="http://schemas.openxmlformats.org/officeDocument/2006/relationships" xmlns:p="http://schemas.openxmlformats.org/presentationml/2006/main">
-  <p:cSld>
-    <p:spTree>
-      <p:nvGrpSpPr>
-        <p:cNvPr id="1" name=""/>
-        <p:cNvGrpSpPr/>
-        <p:nvPr/>
-      </p:nvGrpSpPr>
-      <p:grpSpPr>
-        <a:xfrm>
-          <a:off x="0" y="0"/>
-          <a:ext cx="0" cy="0"/>
-          <a:chOff x="0" y="0"/>
-          <a:chExt cx="0" cy="0"/>
-        </a:xfrm>
-      </p:grpSpPr>
-      <p:sp>
-        <p:nvSpPr>
-          <p:cNvPr id="2" name="Rubrik 1"/>
-          <p:cNvSpPr>
-            <a:spLocks noGrp="1"/>
-          </p:cNvSpPr>
-          <p:nvPr>
-            <p:ph type="title"/>
-          </p:nvPr>
-        </p:nvSpPr>
-        <p:spPr/>
-        <p:txBody>
-          <a:bodyPr>
-            <a:normAutofit/>
-          </a:bodyPr>
-          <a:lstStyle/>
-          <a:p>
-            <a:r>
-              <a:rPr lang="sv-SE" dirty="0" smtClean="0"/>
-              <a:t>Hantera </a:t>
-            </a:r>
-            <a:r>
-              <a:rPr lang="sv-SE" dirty="0" err="1" smtClean="0"/>
-              <a:t>null</a:t>
-            </a:r>
-            <a:r>
-              <a:rPr lang="sv-SE" dirty="0" smtClean="0"/>
-              <a:t> i </a:t>
-            </a:r>
-            <a:r>
-              <a:rPr lang="sv-SE" dirty="0" err="1" smtClean="0"/>
-              <a:t>Groovy</a:t>
-            </a:r>
-            <a:endParaRPr lang="sv-SE" dirty="0"/>
-          </a:p>
-        </p:txBody>
-      </p:sp>
-      <p:sp>
-        <p:nvSpPr>
-          <p:cNvPr id="3" name="Platshållare för innehåll 2"/>
-          <p:cNvSpPr>
-            <a:spLocks noGrp="1"/>
-          </p:cNvSpPr>
-          <p:nvPr>
-            <p:ph idx="1"/>
-          </p:nvPr>
-        </p:nvSpPr>
-        <p:spPr/>
-        <p:txBody>
-          <a:bodyPr/>
-          <a:lstStyle/>
-          <a:p>
-            <a:pPr>
-              <a:buNone/>
-            </a:pPr>
-            <a:r>
-              <a:rPr lang="sv-SE" dirty="0" smtClean="0"/>
-              <a:t>[</a:t>
-            </a:r>
-            <a:r>
-              <a:rPr lang="sv-SE" dirty="0" err="1" smtClean="0"/>
-              <a:t>Nullsafe.groovy</a:t>
-            </a:r>
-            <a:r>
-              <a:rPr lang="sv-SE" dirty="0" smtClean="0"/>
-              <a:t>]</a:t>
-            </a:r>
-            <a:endParaRPr lang="sv-SE" dirty="0"/>
-          </a:p>
-        </p:txBody>
-      </p:sp>
-    </p:spTree>
-  </p:cSld>
-  <p:clrMapOvr>
-    <a:masterClrMapping/>
-  </p:clrMapOvr>
-</p:sld>
-</file>
-
 <file path=ppt/slides/slide35.xml><?xml version="1.0" encoding="utf-8"?>
 <p:sld xmlns:a="http://schemas.openxmlformats.org/drawingml/2006/main" xmlns:r="http://schemas.openxmlformats.org/officeDocument/2006/relationships" xmlns:p="http://schemas.openxmlformats.org/presentationml/2006/main">
   <p:cSld>
@@ -8115,21 +8169,27 @@
         </p:nvSpPr>
         <p:spPr/>
         <p:txBody>
-          <a:bodyPr/>
-          <a:lstStyle/>
-          <a:p>
+          <a:bodyPr>
+            <a:normAutofit/>
+          </a:bodyPr>
+          <a:lstStyle/>
+          <a:p>
+            <a:r>
+              <a:rPr lang="sv-SE" dirty="0" smtClean="0"/>
+              <a:t>Hantera </a:t>
+            </a:r>
+            <a:r>
+              <a:rPr lang="sv-SE" dirty="0" err="1" smtClean="0"/>
+              <a:t>null</a:t>
+            </a:r>
+            <a:r>
+              <a:rPr lang="sv-SE" dirty="0" smtClean="0"/>
+              <a:t> i </a:t>
+            </a:r>
             <a:r>
               <a:rPr lang="sv-SE" dirty="0" err="1" smtClean="0"/>
               <a:t>Groovy</a:t>
             </a:r>
-            <a:r>
-              <a:rPr lang="sv-SE" dirty="0" smtClean="0"/>
-              <a:t> </a:t>
-            </a:r>
-            <a:r>
-              <a:rPr lang="sv-SE" dirty="0" err="1" smtClean="0"/>
-              <a:t>truth</a:t>
-            </a:r>
             <a:endParaRPr lang="sv-SE" dirty="0"/>
           </a:p>
         </p:txBody>
@@ -8144,12 +8204,7 @@
             <p:ph idx="1"/>
           </p:nvPr>
         </p:nvSpPr>
-        <p:spPr>
-          <a:xfrm>
-            <a:off x="443774" y="1302068"/>
-            <a:ext cx="6636295" cy="605109"/>
-          </a:xfrm>
-        </p:spPr>
+        <p:spPr/>
         <p:txBody>
           <a:bodyPr/>
           <a:lstStyle/>
@@ -8159,129 +8214,17 @@
             </a:pPr>
             <a:r>
               <a:rPr lang="sv-SE" dirty="0" smtClean="0"/>
-              <a:t>Ännu enklare:</a:t>
+              <a:t>[</a:t>
+            </a:r>
+            <a:r>
+              <a:rPr lang="sv-SE" dirty="0" err="1" smtClean="0"/>
+              <a:t>Nullsafe.groovy</a:t>
+            </a:r>
+            <a:r>
+              <a:rPr lang="sv-SE" dirty="0" smtClean="0"/>
+              <a:t>]</a:t>
             </a:r>
             <a:endParaRPr lang="sv-SE" dirty="0"/>
-          </a:p>
-        </p:txBody>
-      </p:sp>
-      <p:sp>
-        <p:nvSpPr>
-          <p:cNvPr id="4" name="Platshållare för innehåll 2"/>
-          <p:cNvSpPr txBox="1">
-            <a:spLocks/>
-          </p:cNvSpPr>
-          <p:nvPr/>
-        </p:nvSpPr>
-        <p:spPr bwMode="auto">
-          <a:xfrm>
-            <a:off x="439419" y="1937794"/>
-            <a:ext cx="8063136" cy="3671436"/>
-          </a:xfrm>
-          <a:prstGeom prst="rect">
-            <a:avLst/>
-          </a:prstGeom>
-          <a:noFill/>
-          <a:ln w="9525">
-            <a:noFill/>
-            <a:miter lim="800000"/>
-            <a:headEnd/>
-            <a:tailEnd/>
-          </a:ln>
-          <a:effectLst/>
-        </p:spPr>
-        <p:txBody>
-          <a:bodyPr vert="horz" wrap="square" lIns="91440" tIns="45720" rIns="91440" bIns="45720" numCol="1" anchor="t" anchorCtr="0" compatLnSpc="1">
-            <a:prstTxWarp prst="textNoShape">
-              <a:avLst/>
-            </a:prstTxWarp>
-          </a:bodyPr>
-          <a:lstStyle/>
-          <a:p>
-            <a:pPr marL="342900" marR="0" lvl="0" indent="-342900" algn="l" defTabSz="914400" rtl="0" eaLnBrk="1" fontAlgn="base" latinLnBrk="0" hangingPunct="1">
-              <a:lnSpc>
-                <a:spcPct val="100000"/>
-              </a:lnSpc>
-              <a:spcBef>
-                <a:spcPct val="20000"/>
-              </a:spcBef>
-              <a:spcAft>
-                <a:spcPct val="0"/>
-              </a:spcAft>
-              <a:buClr>
-                <a:schemeClr val="tx2"/>
-              </a:buClr>
-              <a:buSzPct val="70000"/>
-              <a:buFont typeface="Wingdings" pitchFamily="2" charset="2"/>
-              <a:buNone/>
-              <a:tabLst/>
-              <a:defRPr/>
-            </a:pPr>
-            <a:r>
-              <a:rPr kumimoji="0" lang="sv-SE" sz="3000" b="0" i="0" u="none" strike="noStrike" kern="0" cap="none" spc="0" normalizeH="0" baseline="0" noProof="0" dirty="0" smtClean="0">
-                <a:ln>
-                  <a:noFill/>
-                </a:ln>
-                <a:solidFill>
-                  <a:schemeClr val="tx1"/>
-                </a:solidFill>
-                <a:effectLst/>
-                <a:uLnTx/>
-                <a:uFillTx/>
-                <a:latin typeface="+mn-lt"/>
-                <a:ea typeface="+mn-ea"/>
-                <a:cs typeface="+mn-cs"/>
-              </a:rPr>
-              <a:t>[</a:t>
-            </a:r>
-            <a:r>
-              <a:rPr kumimoji="0" lang="sv-SE" sz="3000" b="0" i="0" u="none" strike="noStrike" kern="0" cap="none" spc="0" normalizeH="0" baseline="0" noProof="0" dirty="0" err="1" smtClean="0">
-                <a:ln>
-                  <a:noFill/>
-                </a:ln>
-                <a:solidFill>
-                  <a:schemeClr val="tx1"/>
-                </a:solidFill>
-                <a:effectLst/>
-                <a:uLnTx/>
-                <a:uFillTx/>
-                <a:latin typeface="+mn-lt"/>
-                <a:ea typeface="+mn-ea"/>
-                <a:cs typeface="+mn-cs"/>
-              </a:rPr>
-              <a:t>Nullsafe.groovy</a:t>
-            </a:r>
-            <a:r>
-              <a:rPr kumimoji="0" lang="sv-SE" sz="3000" b="0" i="0" u="none" strike="noStrike" kern="0" cap="none" spc="0" normalizeH="0" baseline="0" noProof="0" dirty="0" smtClean="0">
-                <a:ln>
-                  <a:noFill/>
-                </a:ln>
-                <a:solidFill>
-                  <a:schemeClr val="tx1"/>
-                </a:solidFill>
-                <a:effectLst/>
-                <a:uLnTx/>
-                <a:uFillTx/>
-                <a:latin typeface="+mn-lt"/>
-                <a:ea typeface="+mn-ea"/>
-                <a:cs typeface="+mn-cs"/>
-              </a:rPr>
-              <a:t>]</a:t>
-            </a:r>
-            <a:endParaRPr kumimoji="0" lang="sv-SE" sz="3000" b="0" i="0" u="none" strike="noStrike" kern="0" cap="none" spc="0" normalizeH="0" baseline="0" noProof="0" dirty="0">
-              <a:ln>
-                <a:noFill/>
-              </a:ln>
-              <a:solidFill>
-                <a:schemeClr val="tx1"/>
-              </a:solidFill>
-              <a:effectLst/>
-              <a:uLnTx/>
-              <a:uFillTx/>
-              <a:latin typeface="+mn-lt"/>
-              <a:ea typeface="+mn-ea"/>
-              <a:cs typeface="+mn-cs"/>
-            </a:endParaRPr>
           </a:p>
         </p:txBody>
       </p:sp>
@@ -8351,7 +8294,12 @@
             <p:ph idx="1"/>
           </p:nvPr>
         </p:nvSpPr>
-        <p:spPr/>
+        <p:spPr>
+          <a:xfrm>
+            <a:off x="443774" y="1302068"/>
+            <a:ext cx="6636295" cy="605109"/>
+          </a:xfrm>
+        </p:spPr>
         <p:txBody>
           <a:bodyPr/>
           <a:lstStyle/>
@@ -8361,17 +8309,129 @@
             </a:pPr>
             <a:r>
               <a:rPr lang="sv-SE" dirty="0" smtClean="0"/>
+              <a:t>Ännu enklare:</a:t>
+            </a:r>
+            <a:endParaRPr lang="sv-SE" dirty="0"/>
+          </a:p>
+        </p:txBody>
+      </p:sp>
+      <p:sp>
+        <p:nvSpPr>
+          <p:cNvPr id="4" name="Platshållare för innehåll 2"/>
+          <p:cNvSpPr txBox="1">
+            <a:spLocks/>
+          </p:cNvSpPr>
+          <p:nvPr/>
+        </p:nvSpPr>
+        <p:spPr bwMode="auto">
+          <a:xfrm>
+            <a:off x="439419" y="1937794"/>
+            <a:ext cx="8063136" cy="3671436"/>
+          </a:xfrm>
+          <a:prstGeom prst="rect">
+            <a:avLst/>
+          </a:prstGeom>
+          <a:noFill/>
+          <a:ln w="9525">
+            <a:noFill/>
+            <a:miter lim="800000"/>
+            <a:headEnd/>
+            <a:tailEnd/>
+          </a:ln>
+          <a:effectLst/>
+        </p:spPr>
+        <p:txBody>
+          <a:bodyPr vert="horz" wrap="square" lIns="91440" tIns="45720" rIns="91440" bIns="45720" numCol="1" anchor="t" anchorCtr="0" compatLnSpc="1">
+            <a:prstTxWarp prst="textNoShape">
+              <a:avLst/>
+            </a:prstTxWarp>
+          </a:bodyPr>
+          <a:lstStyle/>
+          <a:p>
+            <a:pPr marL="342900" marR="0" lvl="0" indent="-342900" algn="l" defTabSz="914400" rtl="0" eaLnBrk="1" fontAlgn="base" latinLnBrk="0" hangingPunct="1">
+              <a:lnSpc>
+                <a:spcPct val="100000"/>
+              </a:lnSpc>
+              <a:spcBef>
+                <a:spcPct val="20000"/>
+              </a:spcBef>
+              <a:spcAft>
+                <a:spcPct val="0"/>
+              </a:spcAft>
+              <a:buClr>
+                <a:schemeClr val="tx2"/>
+              </a:buClr>
+              <a:buSzPct val="70000"/>
+              <a:buFont typeface="Wingdings" pitchFamily="2" charset="2"/>
+              <a:buNone/>
+              <a:tabLst/>
+              <a:defRPr/>
+            </a:pPr>
+            <a:r>
+              <a:rPr kumimoji="0" lang="sv-SE" sz="3000" b="0" i="0" u="none" strike="noStrike" kern="0" cap="none" spc="0" normalizeH="0" baseline="0" noProof="0" dirty="0" smtClean="0">
+                <a:ln>
+                  <a:noFill/>
+                </a:ln>
+                <a:solidFill>
+                  <a:schemeClr val="tx1"/>
+                </a:solidFill>
+                <a:effectLst/>
+                <a:uLnTx/>
+                <a:uFillTx/>
+                <a:latin typeface="+mn-lt"/>
+                <a:ea typeface="+mn-ea"/>
+                <a:cs typeface="+mn-cs"/>
+              </a:rPr>
               <a:t>[</a:t>
             </a:r>
             <a:r>
-              <a:rPr lang="sv-SE" dirty="0" err="1" smtClean="0"/>
-              <a:t>TestGroovyTruth.groovy</a:t>
-            </a:r>
-            <a:r>
-              <a:rPr lang="sv-SE" dirty="0" smtClean="0"/>
+              <a:rPr kumimoji="0" lang="sv-SE" sz="3000" b="0" i="0" u="none" strike="noStrike" kern="0" cap="none" spc="0" normalizeH="0" baseline="0" noProof="0" dirty="0" err="1" smtClean="0">
+                <a:ln>
+                  <a:noFill/>
+                </a:ln>
+                <a:solidFill>
+                  <a:schemeClr val="tx1"/>
+                </a:solidFill>
+                <a:effectLst/>
+                <a:uLnTx/>
+                <a:uFillTx/>
+                <a:latin typeface="+mn-lt"/>
+                <a:ea typeface="+mn-ea"/>
+                <a:cs typeface="+mn-cs"/>
+              </a:rPr>
+              <a:t>Nullsafe.groovy</a:t>
+            </a:r>
+            <a:r>
+              <a:rPr kumimoji="0" lang="sv-SE" sz="3000" b="0" i="0" u="none" strike="noStrike" kern="0" cap="none" spc="0" normalizeH="0" baseline="0" noProof="0" dirty="0" smtClean="0">
+                <a:ln>
+                  <a:noFill/>
+                </a:ln>
+                <a:solidFill>
+                  <a:schemeClr val="tx1"/>
+                </a:solidFill>
+                <a:effectLst/>
+                <a:uLnTx/>
+                <a:uFillTx/>
+                <a:latin typeface="+mn-lt"/>
+                <a:ea typeface="+mn-ea"/>
+                <a:cs typeface="+mn-cs"/>
+              </a:rPr>
               <a:t>]</a:t>
             </a:r>
-            <a:endParaRPr lang="sv-SE" dirty="0"/>
+            <a:endParaRPr kumimoji="0" lang="sv-SE" sz="3000" b="0" i="0" u="none" strike="noStrike" kern="0" cap="none" spc="0" normalizeH="0" baseline="0" noProof="0" dirty="0">
+              <a:ln>
+                <a:noFill/>
+              </a:ln>
+              <a:solidFill>
+                <a:schemeClr val="tx1"/>
+              </a:solidFill>
+              <a:effectLst/>
+              <a:uLnTx/>
+              <a:uFillTx/>
+              <a:latin typeface="+mn-lt"/>
+              <a:ea typeface="+mn-ea"/>
+              <a:cs typeface="+mn-cs"/>
+            </a:endParaRPr>
           </a:p>
         </p:txBody>
       </p:sp>
@@ -8416,16 +8476,16 @@
           <a:lstStyle/>
           <a:p>
             <a:r>
-              <a:rPr lang="sv-SE" dirty="0" smtClean="0"/>
-              <a:t>Default </a:t>
-            </a:r>
-            <a:r>
               <a:rPr lang="sv-SE" dirty="0" err="1" smtClean="0"/>
-              <a:t>konstruktor</a:t>
-            </a:r>
-            <a:r>
-              <a:rPr lang="sv-SE" dirty="0" smtClean="0"/>
-              <a:t> i Java</a:t>
+              <a:t>Groovy</a:t>
+            </a:r>
+            <a:r>
+              <a:rPr lang="sv-SE" dirty="0" smtClean="0"/>
+              <a:t> </a:t>
+            </a:r>
+            <a:r>
+              <a:rPr lang="sv-SE" dirty="0" err="1" smtClean="0"/>
+              <a:t>truth</a:t>
             </a:r>
             <a:endParaRPr lang="sv-SE" dirty="0"/>
           </a:p>
@@ -8455,7 +8515,7 @@
             </a:r>
             <a:r>
               <a:rPr lang="sv-SE" dirty="0" err="1" smtClean="0"/>
-              <a:t>UsingDefaultConstructor.java</a:t>
+              <a:t>TestGroovyTruth.groovy</a:t>
             </a:r>
             <a:r>
               <a:rPr lang="sv-SE" dirty="0" smtClean="0"/>
@@ -8515,11 +8575,7 @@
             </a:r>
             <a:r>
               <a:rPr lang="sv-SE" dirty="0" smtClean="0"/>
-              <a:t> i </a:t>
-            </a:r>
-            <a:r>
-              <a:rPr lang="sv-SE" dirty="0" err="1" smtClean="0"/>
-              <a:t>Groovy</a:t>
+              <a:t> i Java</a:t>
             </a:r>
             <a:endParaRPr lang="sv-SE" dirty="0"/>
           </a:p>
@@ -8549,7 +8605,7 @@
             </a:r>
             <a:r>
               <a:rPr lang="sv-SE" dirty="0" err="1" smtClean="0"/>
-              <a:t>UsingDefaultConstructor.groovy</a:t>
+              <a:t>UsingDefaultConstructor.java</a:t>
             </a:r>
             <a:r>
               <a:rPr lang="sv-SE" dirty="0" smtClean="0"/>
@@ -8600,8 +8656,20 @@
           <a:lstStyle/>
           <a:p>
             <a:r>
+              <a:rPr lang="sv-SE" dirty="0" smtClean="0"/>
+              <a:t>Default </a:t>
+            </a:r>
+            <a:r>
               <a:rPr lang="sv-SE" dirty="0" err="1" smtClean="0"/>
-              <a:t>Bekvämlighetsmetoder:List</a:t>
+              <a:t>konstruktor</a:t>
+            </a:r>
+            <a:r>
+              <a:rPr lang="sv-SE" dirty="0" smtClean="0"/>
+              <a:t> i </a:t>
+            </a:r>
+            <a:r>
+              <a:rPr lang="sv-SE" dirty="0" err="1" smtClean="0"/>
+              <a:t>Groovy</a:t>
             </a:r>
             <a:endParaRPr lang="sv-SE" dirty="0"/>
           </a:p>
@@ -8617,12 +8685,7 @@
             <p:ph idx="1"/>
           </p:nvPr>
         </p:nvSpPr>
-        <p:spPr>
-          <a:xfrm>
-            <a:off x="469900" y="1171435"/>
-            <a:ext cx="8229600" cy="4443412"/>
-          </a:xfrm>
-        </p:spPr>
+        <p:spPr/>
         <p:txBody>
           <a:bodyPr/>
           <a:lstStyle/>
@@ -8636,7 +8699,7 @@
             </a:r>
             <a:r>
               <a:rPr lang="sv-SE" dirty="0" err="1" smtClean="0"/>
-              <a:t>ArrayConveniance.groovy</a:t>
+              <a:t>UsingDefaultConstructor.groovy</a:t>
             </a:r>
             <a:r>
               <a:rPr lang="sv-SE" dirty="0" smtClean="0"/>
@@ -8771,7 +8834,7 @@
           <a:p>
             <a:r>
               <a:rPr lang="sv-SE" dirty="0" err="1" smtClean="0"/>
-              <a:t>Bekvämlighetsmetoder:Map</a:t>
+              <a:t>Bekvämlighetsmetoder:List</a:t>
             </a:r>
             <a:endParaRPr lang="sv-SE" dirty="0"/>
           </a:p>
@@ -8789,8 +8852,8 @@
         </p:nvSpPr>
         <p:spPr>
           <a:xfrm>
-            <a:off x="428596" y="1214422"/>
-            <a:ext cx="8229600" cy="4525963"/>
+            <a:off x="469900" y="1171435"/>
+            <a:ext cx="8229600" cy="4443412"/>
           </a:xfrm>
         </p:spPr>
         <p:txBody>
@@ -8806,7 +8869,7 @@
             </a:r>
             <a:r>
               <a:rPr lang="sv-SE" dirty="0" err="1" smtClean="0"/>
-              <a:t>MapConveniance.groovy</a:t>
+              <a:t>ArrayConveniance.groovy</a:t>
             </a:r>
             <a:r>
               <a:rPr lang="sv-SE" dirty="0" smtClean="0"/>
@@ -8857,12 +8920,8 @@
           <a:lstStyle/>
           <a:p>
             <a:r>
-              <a:rPr lang="sv-SE" dirty="0" smtClean="0"/>
-              <a:t>Operator </a:t>
-            </a:r>
-            <a:r>
               <a:rPr lang="sv-SE" dirty="0" err="1" smtClean="0"/>
-              <a:t>overloading</a:t>
+              <a:t>Bekvämlighetsmetoder:Map</a:t>
             </a:r>
             <a:endParaRPr lang="sv-SE" dirty="0"/>
           </a:p>
@@ -8870,7 +8929,7 @@
       </p:sp>
       <p:sp>
         <p:nvSpPr>
-          <p:cNvPr id="4" name="Platshållare för innehåll 3"/>
+          <p:cNvPr id="3" name="Platshållare för innehåll 2"/>
           <p:cNvSpPr>
             <a:spLocks noGrp="1"/>
           </p:cNvSpPr>
@@ -8878,7 +8937,12 @@
             <p:ph idx="1"/>
           </p:nvPr>
         </p:nvSpPr>
-        <p:spPr/>
+        <p:spPr>
+          <a:xfrm>
+            <a:off x="428596" y="1214422"/>
+            <a:ext cx="8229600" cy="4525963"/>
+          </a:xfrm>
+        </p:spPr>
         <p:txBody>
           <a:bodyPr/>
           <a:lstStyle/>
@@ -8892,7 +8956,7 @@
             </a:r>
             <a:r>
               <a:rPr lang="sv-SE" dirty="0" err="1" smtClean="0"/>
-              <a:t>operatorOverload.groovy</a:t>
+              <a:t>MapConveniance.groovy</a:t>
             </a:r>
             <a:r>
               <a:rPr lang="sv-SE" dirty="0" smtClean="0"/>
@@ -8907,13 +8971,6 @@
   <p:clrMapOvr>
     <a:masterClrMapping/>
   </p:clrMapOvr>
-  <p:timing>
-    <p:tnLst>
-      <p:par>
-        <p:cTn id="1" dur="indefinite" restart="never" nodeType="tmRoot"/>
-      </p:par>
-    </p:tnLst>
-  </p:timing>
 </p:sld>
 </file>
 
@@ -8981,7 +9038,15 @@
             </a:pPr>
             <a:r>
               <a:rPr lang="sv-SE" dirty="0" smtClean="0"/>
-              <a:t>[operatorOverload2.groovy]</a:t>
+              <a:t>[</a:t>
+            </a:r>
+            <a:r>
+              <a:rPr lang="sv-SE" dirty="0" err="1" smtClean="0"/>
+              <a:t>operatorOverload.groovy</a:t>
+            </a:r>
+            <a:r>
+              <a:rPr lang="sv-SE" dirty="0" smtClean="0"/>
+              <a:t>]</a:t>
             </a:r>
             <a:endParaRPr lang="sv-SE" dirty="0"/>
           </a:p>
@@ -9035,12 +9100,12 @@
           <a:lstStyle/>
           <a:p>
             <a:r>
+              <a:rPr lang="sv-SE" dirty="0" smtClean="0"/>
+              <a:t>Operator </a:t>
+            </a:r>
+            <a:r>
               <a:rPr lang="sv-SE" dirty="0" err="1" smtClean="0"/>
-              <a:t>Optional</a:t>
-            </a:r>
-            <a:r>
-              <a:rPr lang="sv-SE" dirty="0" smtClean="0"/>
-              <a:t> parameters i Java</a:t>
+              <a:t>overloading</a:t>
             </a:r>
             <a:endParaRPr lang="sv-SE" dirty="0"/>
           </a:p>
@@ -9048,7 +9113,7 @@
       </p:sp>
       <p:sp>
         <p:nvSpPr>
-          <p:cNvPr id="3" name="Platshållare för innehåll 2"/>
+          <p:cNvPr id="4" name="Platshållare för innehåll 3"/>
           <p:cNvSpPr>
             <a:spLocks noGrp="1"/>
           </p:cNvSpPr>
@@ -9066,15 +9131,7 @@
             </a:pPr>
             <a:r>
               <a:rPr lang="sv-SE" dirty="0" smtClean="0"/>
-              <a:t>[</a:t>
-            </a:r>
-            <a:r>
-              <a:rPr lang="sv-SE" dirty="0" err="1" smtClean="0"/>
-              <a:t>optionalParameters.java</a:t>
-            </a:r>
-            <a:r>
-              <a:rPr lang="sv-SE" dirty="0" smtClean="0"/>
-              <a:t>]</a:t>
+              <a:t>[operatorOverload2.groovy]</a:t>
             </a:r>
             <a:endParaRPr lang="sv-SE" dirty="0"/>
           </a:p>
@@ -9085,6 +9142,13 @@
   <p:clrMapOvr>
     <a:masterClrMapping/>
   </p:clrMapOvr>
+  <p:timing>
+    <p:tnLst>
+      <p:par>
+        <p:cTn id="1" dur="indefinite" restart="never" nodeType="tmRoot"/>
+      </p:par>
+    </p:tnLst>
+  </p:timing>
 </p:sld>
 </file>
 
@@ -9126,11 +9190,7 @@
             </a:r>
             <a:r>
               <a:rPr lang="sv-SE" dirty="0" smtClean="0"/>
-              <a:t> parameters i </a:t>
-            </a:r>
-            <a:r>
-              <a:rPr lang="sv-SE" dirty="0" err="1" smtClean="0"/>
-              <a:t>Groovy</a:t>
+              <a:t> parameters i Java</a:t>
             </a:r>
             <a:endParaRPr lang="sv-SE" dirty="0"/>
           </a:p>
@@ -9160,7 +9220,7 @@
             </a:r>
             <a:r>
               <a:rPr lang="sv-SE" dirty="0" err="1" smtClean="0"/>
-              <a:t>optionalParameter.groovy</a:t>
+              <a:t>optionalParameters.java</a:t>
             </a:r>
             <a:r>
               <a:rPr lang="sv-SE" dirty="0" smtClean="0"/>
@@ -9179,6 +9239,96 @@
 </file>
 
 <file path=ppt/slides/slide45.xml><?xml version="1.0" encoding="utf-8"?>
+<p:sld xmlns:a="http://schemas.openxmlformats.org/drawingml/2006/main" xmlns:r="http://schemas.openxmlformats.org/officeDocument/2006/relationships" xmlns:p="http://schemas.openxmlformats.org/presentationml/2006/main">
+  <p:cSld>
+    <p:spTree>
+      <p:nvGrpSpPr>
+        <p:cNvPr id="1" name=""/>
+        <p:cNvGrpSpPr/>
+        <p:nvPr/>
+      </p:nvGrpSpPr>
+      <p:grpSpPr>
+        <a:xfrm>
+          <a:off x="0" y="0"/>
+          <a:ext cx="0" cy="0"/>
+          <a:chOff x="0" y="0"/>
+          <a:chExt cx="0" cy="0"/>
+        </a:xfrm>
+      </p:grpSpPr>
+      <p:sp>
+        <p:nvSpPr>
+          <p:cNvPr id="2" name="Rubrik 1"/>
+          <p:cNvSpPr>
+            <a:spLocks noGrp="1"/>
+          </p:cNvSpPr>
+          <p:nvPr>
+            <p:ph type="title"/>
+          </p:nvPr>
+        </p:nvSpPr>
+        <p:spPr/>
+        <p:txBody>
+          <a:bodyPr/>
+          <a:lstStyle/>
+          <a:p>
+            <a:r>
+              <a:rPr lang="sv-SE" dirty="0" err="1" smtClean="0"/>
+              <a:t>Optional</a:t>
+            </a:r>
+            <a:r>
+              <a:rPr lang="sv-SE" dirty="0" smtClean="0"/>
+              <a:t> parameters i </a:t>
+            </a:r>
+            <a:r>
+              <a:rPr lang="sv-SE" dirty="0" err="1" smtClean="0"/>
+              <a:t>Groovy</a:t>
+            </a:r>
+            <a:endParaRPr lang="sv-SE" dirty="0"/>
+          </a:p>
+        </p:txBody>
+      </p:sp>
+      <p:sp>
+        <p:nvSpPr>
+          <p:cNvPr id="3" name="Platshållare för innehåll 2"/>
+          <p:cNvSpPr>
+            <a:spLocks noGrp="1"/>
+          </p:cNvSpPr>
+          <p:nvPr>
+            <p:ph idx="1"/>
+          </p:nvPr>
+        </p:nvSpPr>
+        <p:spPr/>
+        <p:txBody>
+          <a:bodyPr/>
+          <a:lstStyle/>
+          <a:p>
+            <a:pPr>
+              <a:buNone/>
+            </a:pPr>
+            <a:r>
+              <a:rPr lang="sv-SE" dirty="0" smtClean="0"/>
+              <a:t>[</a:t>
+            </a:r>
+            <a:r>
+              <a:rPr lang="sv-SE" dirty="0" err="1" smtClean="0"/>
+              <a:t>optionalParameter.groovy</a:t>
+            </a:r>
+            <a:r>
+              <a:rPr lang="sv-SE" dirty="0" smtClean="0"/>
+              <a:t>]</a:t>
+            </a:r>
+            <a:endParaRPr lang="sv-SE" dirty="0"/>
+          </a:p>
+        </p:txBody>
+      </p:sp>
+    </p:spTree>
+  </p:cSld>
+  <p:clrMapOvr>
+    <a:masterClrMapping/>
+  </p:clrMapOvr>
+</p:sld>
+</file>
+
+<file path=ppt/slides/slide46.xml><?xml version="1.0" encoding="utf-8"?>
 <p:sld xmlns:a="http://schemas.openxmlformats.org/drawingml/2006/main" xmlns:r="http://schemas.openxmlformats.org/officeDocument/2006/relationships" xmlns:p="http://schemas.openxmlformats.org/presentationml/2006/main">
   <p:cSld>
     <p:spTree>
@@ -9305,92 +9455,6 @@
 </p:sld>
 </file>
 
-<file path=ppt/slides/slide46.xml><?xml version="1.0" encoding="utf-8"?>
-<p:sld xmlns:a="http://schemas.openxmlformats.org/drawingml/2006/main" xmlns:r="http://schemas.openxmlformats.org/officeDocument/2006/relationships" xmlns:p="http://schemas.openxmlformats.org/presentationml/2006/main">
-  <p:cSld>
-    <p:spTree>
-      <p:nvGrpSpPr>
-        <p:cNvPr id="1" name=""/>
-        <p:cNvGrpSpPr/>
-        <p:nvPr/>
-      </p:nvGrpSpPr>
-      <p:grpSpPr>
-        <a:xfrm>
-          <a:off x="0" y="0"/>
-          <a:ext cx="0" cy="0"/>
-          <a:chOff x="0" y="0"/>
-          <a:chExt cx="0" cy="0"/>
-        </a:xfrm>
-      </p:grpSpPr>
-      <p:sp>
-        <p:nvSpPr>
-          <p:cNvPr id="2" name="Rubrik 1"/>
-          <p:cNvSpPr>
-            <a:spLocks noGrp="1"/>
-          </p:cNvSpPr>
-          <p:nvPr>
-            <p:ph type="title"/>
-          </p:nvPr>
-        </p:nvSpPr>
-        <p:spPr/>
-        <p:txBody>
-          <a:bodyPr/>
-          <a:lstStyle/>
-          <a:p>
-            <a:r>
-              <a:rPr lang="sv-SE" dirty="0" err="1" smtClean="0"/>
-              <a:t>Regular</a:t>
-            </a:r>
-            <a:r>
-              <a:rPr lang="sv-SE" dirty="0" smtClean="0"/>
-              <a:t> expressions</a:t>
-            </a:r>
-            <a:endParaRPr lang="sv-SE" dirty="0"/>
-          </a:p>
-        </p:txBody>
-      </p:sp>
-      <p:sp>
-        <p:nvSpPr>
-          <p:cNvPr id="3" name="Platshållare för innehåll 2"/>
-          <p:cNvSpPr>
-            <a:spLocks noGrp="1"/>
-          </p:cNvSpPr>
-          <p:nvPr>
-            <p:ph idx="1"/>
-          </p:nvPr>
-        </p:nvSpPr>
-        <p:spPr/>
-        <p:txBody>
-          <a:bodyPr/>
-          <a:lstStyle/>
-          <a:p>
-            <a:pPr>
-              <a:buNone/>
-            </a:pPr>
-            <a:r>
-              <a:rPr lang="sv-SE" dirty="0" smtClean="0"/>
-              <a:t>[</a:t>
-            </a:r>
-            <a:r>
-              <a:rPr lang="sv-SE" dirty="0" err="1" smtClean="0"/>
-              <a:t>TestRegExp.groovy</a:t>
-            </a:r>
-            <a:r>
-              <a:rPr lang="sv-SE" dirty="0" smtClean="0"/>
-              <a:t>]</a:t>
-            </a:r>
-            <a:endParaRPr lang="sv-SE" dirty="0"/>
-          </a:p>
-        </p:txBody>
-      </p:sp>
-    </p:spTree>
-  </p:cSld>
-  <p:clrMapOvr>
-    <a:masterClrMapping/>
-  </p:clrMapOvr>
-</p:sld>
-</file>
-
 <file path=ppt/slides/slide47.xml><?xml version="1.0" encoding="utf-8"?>
 <p:sld xmlns:a="http://schemas.openxmlformats.org/drawingml/2006/main" xmlns:r="http://schemas.openxmlformats.org/officeDocument/2006/relationships" xmlns:p="http://schemas.openxmlformats.org/presentationml/2006/main">
   <p:cSld>
@@ -9424,8 +9488,12 @@
           <a:lstStyle/>
           <a:p>
             <a:r>
-              <a:rPr lang="sv-SE" dirty="0" smtClean="0"/>
-              <a:t>Primitives</a:t>
+              <a:rPr lang="sv-SE" dirty="0" err="1" smtClean="0"/>
+              <a:t>Regular</a:t>
+            </a:r>
+            <a:r>
+              <a:rPr lang="sv-SE" dirty="0" smtClean="0"/>
+              <a:t> expressions</a:t>
             </a:r>
             <a:endParaRPr lang="sv-SE" dirty="0"/>
           </a:p>
@@ -9455,7 +9523,7 @@
             </a:r>
             <a:r>
               <a:rPr lang="sv-SE" dirty="0" err="1" smtClean="0"/>
-              <a:t>Primitives.groovy</a:t>
+              <a:t>TestRegExp.groovy</a:t>
             </a:r>
             <a:r>
               <a:rPr lang="sv-SE" dirty="0" smtClean="0"/>
@@ -9502,99 +9570,48 @@
         </p:nvSpPr>
         <p:spPr/>
         <p:txBody>
-          <a:bodyPr>
-            <a:normAutofit fontScale="90000"/>
-          </a:bodyPr>
-          <a:lstStyle/>
-          <a:p>
+          <a:bodyPr/>
+          <a:lstStyle/>
+          <a:p>
+            <a:r>
+              <a:rPr lang="sv-SE" dirty="0" smtClean="0"/>
+              <a:t>Primitives</a:t>
+            </a:r>
+            <a:endParaRPr lang="sv-SE" dirty="0"/>
+          </a:p>
+        </p:txBody>
+      </p:sp>
+      <p:sp>
+        <p:nvSpPr>
+          <p:cNvPr id="3" name="Platshållare för innehåll 2"/>
+          <p:cNvSpPr>
+            <a:spLocks noGrp="1"/>
+          </p:cNvSpPr>
+          <p:nvPr>
+            <p:ph idx="1"/>
+          </p:nvPr>
+        </p:nvSpPr>
+        <p:spPr/>
+        <p:txBody>
+          <a:bodyPr/>
+          <a:lstStyle/>
+          <a:p>
+            <a:pPr>
+              <a:buNone/>
+            </a:pPr>
+            <a:r>
+              <a:rPr lang="sv-SE" dirty="0" smtClean="0"/>
+              <a:t>[</a:t>
+            </a:r>
             <a:r>
               <a:rPr lang="sv-SE" dirty="0" err="1" smtClean="0"/>
-              <a:t>Groovy</a:t>
-            </a:r>
-            <a:r>
-              <a:rPr lang="sv-SE" dirty="0" smtClean="0"/>
-              <a:t> har stöd för samtliga Java 5-features:</a:t>
-            </a:r>
-          </a:p>
-        </p:txBody>
-      </p:sp>
-      <p:sp>
-        <p:nvSpPr>
-          <p:cNvPr id="3" name="Platshållare för innehåll 2"/>
-          <p:cNvSpPr>
-            <a:spLocks noGrp="1"/>
-          </p:cNvSpPr>
-          <p:nvPr>
-            <p:ph idx="1"/>
-          </p:nvPr>
-        </p:nvSpPr>
-        <p:spPr/>
-        <p:txBody>
-          <a:bodyPr>
-            <a:normAutofit lnSpcReduction="10000"/>
-          </a:bodyPr>
-          <a:lstStyle/>
-          <a:p>
-            <a:r>
-              <a:rPr lang="sv-SE" dirty="0" err="1" smtClean="0"/>
-              <a:t>Generics</a:t>
-            </a:r>
-            <a:endParaRPr lang="sv-SE" dirty="0" smtClean="0"/>
-          </a:p>
-          <a:p>
-            <a:r>
-              <a:rPr lang="sv-SE" dirty="0" err="1" smtClean="0"/>
-              <a:t>For-each</a:t>
-            </a:r>
-            <a:endParaRPr lang="sv-SE" dirty="0" smtClean="0"/>
-          </a:p>
-          <a:p>
-            <a:r>
-              <a:rPr lang="sv-SE" dirty="0" err="1" smtClean="0"/>
-              <a:t>Autoboxing</a:t>
-            </a:r>
-            <a:r>
-              <a:rPr lang="sv-SE" dirty="0" smtClean="0"/>
-              <a:t> (fungerar även om man kör java 1.4)</a:t>
-            </a:r>
-          </a:p>
-          <a:p>
-            <a:r>
-              <a:rPr lang="sv-SE" dirty="0" err="1" smtClean="0"/>
-              <a:t>Enum</a:t>
-            </a:r>
-            <a:endParaRPr lang="sv-SE" dirty="0" smtClean="0"/>
-          </a:p>
-          <a:p>
-            <a:r>
-              <a:rPr lang="sv-SE" dirty="0" smtClean="0"/>
-              <a:t>Annotations (fungerar dock ej att skapa egna i </a:t>
-            </a:r>
-            <a:r>
-              <a:rPr lang="sv-SE" dirty="0" err="1" smtClean="0"/>
-              <a:t>Groovy</a:t>
-            </a:r>
-            <a:r>
-              <a:rPr lang="sv-SE" dirty="0" smtClean="0"/>
-              <a:t>)</a:t>
-            </a:r>
-          </a:p>
-          <a:p>
-            <a:r>
-              <a:rPr lang="sv-SE" dirty="0" err="1" smtClean="0"/>
-              <a:t>Varargs</a:t>
-            </a:r>
-            <a:endParaRPr lang="sv-SE" dirty="0" smtClean="0"/>
-          </a:p>
-          <a:p>
-            <a:r>
-              <a:rPr lang="sv-SE" dirty="0" err="1" smtClean="0"/>
-              <a:t>Static</a:t>
-            </a:r>
-            <a:r>
-              <a:rPr lang="sv-SE" dirty="0" smtClean="0"/>
-              <a:t> import</a:t>
-            </a:r>
+              <a:t>Primitives.groovy</a:t>
+            </a:r>
+            <a:r>
+              <a:rPr lang="sv-SE" dirty="0" smtClean="0"/>
+              <a:t>]</a:t>
+            </a:r>
+            <a:endParaRPr lang="sv-SE" dirty="0"/>
           </a:p>
         </p:txBody>
       </p:sp>
@@ -9635,14 +9652,19 @@
         </p:nvSpPr>
         <p:spPr/>
         <p:txBody>
-          <a:bodyPr/>
-          <a:lstStyle/>
-          <a:p>
-            <a:r>
-              <a:rPr lang="sv-SE" dirty="0" smtClean="0"/>
-              <a:t>Sammanfattning</a:t>
-            </a:r>
-            <a:endParaRPr lang="sv-SE" dirty="0"/>
+          <a:bodyPr>
+            <a:normAutofit fontScale="90000"/>
+          </a:bodyPr>
+          <a:lstStyle/>
+          <a:p>
+            <a:r>
+              <a:rPr lang="sv-SE" dirty="0" err="1" smtClean="0"/>
+              <a:t>Groovy</a:t>
+            </a:r>
+            <a:r>
+              <a:rPr lang="sv-SE" dirty="0" smtClean="0"/>
+              <a:t> har stöd för samtliga Java 5-features:</a:t>
+            </a:r>
           </a:p>
         </p:txBody>
       </p:sp>
@@ -9658,24 +9680,71 @@
         </p:nvSpPr>
         <p:spPr/>
         <p:txBody>
-          <a:bodyPr/>
-          <a:lstStyle/>
-          <a:p>
-            <a:r>
-              <a:rPr lang="sv-SE" dirty="0" smtClean="0"/>
-              <a:t>Helt kompatibelt med Java</a:t>
-            </a:r>
-          </a:p>
-          <a:p>
-            <a:r>
-              <a:rPr lang="sv-SE" dirty="0" smtClean="0"/>
-              <a:t>Underlättar Javautveckling på ett </a:t>
-            </a:r>
-            <a:r>
-              <a:rPr lang="sv-SE" smtClean="0"/>
-              <a:t>antal sätt</a:t>
-            </a:r>
-            <a:endParaRPr lang="sv-SE" dirty="0"/>
+          <a:bodyPr>
+            <a:normAutofit lnSpcReduction="10000"/>
+          </a:bodyPr>
+          <a:lstStyle/>
+          <a:p>
+            <a:r>
+              <a:rPr lang="sv-SE" dirty="0" err="1" smtClean="0"/>
+              <a:t>Generics</a:t>
+            </a:r>
+            <a:endParaRPr lang="sv-SE" dirty="0" smtClean="0"/>
+          </a:p>
+          <a:p>
+            <a:r>
+              <a:rPr lang="sv-SE" dirty="0" err="1" smtClean="0"/>
+              <a:t>For-each</a:t>
+            </a:r>
+            <a:endParaRPr lang="sv-SE" dirty="0" smtClean="0"/>
+          </a:p>
+          <a:p>
+            <a:r>
+              <a:rPr lang="sv-SE" dirty="0" err="1" smtClean="0"/>
+              <a:t>Autoboxing</a:t>
+            </a:r>
+            <a:r>
+              <a:rPr lang="sv-SE" dirty="0" smtClean="0"/>
+              <a:t> (fungerar även om man kör java 1.4)</a:t>
+            </a:r>
+          </a:p>
+          <a:p>
+            <a:r>
+              <a:rPr lang="sv-SE" dirty="0" err="1" smtClean="0"/>
+              <a:t>Enum</a:t>
+            </a:r>
+            <a:endParaRPr lang="sv-SE" dirty="0" smtClean="0"/>
+          </a:p>
+          <a:p>
+            <a:r>
+              <a:rPr lang="sv-SE" dirty="0" smtClean="0"/>
+              <a:t>Annotations (fungerar dock ej att skapa egna i </a:t>
+            </a:r>
+            <a:r>
+              <a:rPr lang="sv-SE" dirty="0" err="1" smtClean="0"/>
+              <a:t>Groovy</a:t>
+            </a:r>
+            <a:r>
+              <a:rPr lang="sv-SE" dirty="0" smtClean="0"/>
+              <a:t>)</a:t>
+            </a:r>
+          </a:p>
+          <a:p>
+            <a:r>
+              <a:rPr lang="sv-SE" dirty="0" err="1" smtClean="0"/>
+              <a:t>Varargs</a:t>
+            </a:r>
+            <a:endParaRPr lang="sv-SE" dirty="0" smtClean="0"/>
+          </a:p>
+          <a:p>
+            <a:r>
+              <a:rPr lang="sv-SE" dirty="0" err="1" smtClean="0"/>
+              <a:t>Static</a:t>
+            </a:r>
+            <a:r>
+              <a:rPr lang="sv-SE" dirty="0" smtClean="0"/>
+              <a:t> import</a:t>
+            </a:r>
           </a:p>
         </p:txBody>
       </p:sp>
@@ -9842,12 +9911,8 @@
           <a:lstStyle/>
           <a:p>
             <a:r>
-              <a:rPr lang="sv-SE" dirty="0" err="1" smtClean="0"/>
-              <a:t>Closures</a:t>
-            </a:r>
-            <a:r>
-              <a:rPr lang="sv-SE" dirty="0" smtClean="0"/>
-              <a:t>: fördjupning</a:t>
+              <a:rPr lang="sv-SE" dirty="0" smtClean="0"/>
+              <a:t>Sammanfattning</a:t>
             </a:r>
             <a:endParaRPr lang="sv-SE" dirty="0"/>
           </a:p>
@@ -9870,7 +9935,17 @@
           <a:p>
             <a:r>
               <a:rPr lang="sv-SE" dirty="0" smtClean="0"/>
-              <a:t>Exempel: Summera alla jämna tal från 1 till 10</a:t>
+              <a:t>Helt kompatibelt med Java</a:t>
+            </a:r>
+          </a:p>
+          <a:p>
+            <a:r>
+              <a:rPr lang="sv-SE" dirty="0" smtClean="0"/>
+              <a:t>Underlättar Javautveckling på ett </a:t>
+            </a:r>
+            <a:r>
+              <a:rPr lang="sv-SE" smtClean="0"/>
+              <a:t>antal sätt</a:t>
             </a:r>
             <a:endParaRPr lang="sv-SE" dirty="0"/>
           </a:p>
@@ -9913,14 +9988,16 @@
         </p:nvSpPr>
         <p:spPr/>
         <p:txBody>
-          <a:bodyPr>
-            <a:normAutofit fontScale="90000"/>
-          </a:bodyPr>
-          <a:lstStyle/>
-          <a:p>
-            <a:r>
-              <a:rPr lang="sv-SE" dirty="0" smtClean="0"/>
-              <a:t>Summera alla jämna tal från 1 till 10</a:t>
+          <a:bodyPr/>
+          <a:lstStyle/>
+          <a:p>
+            <a:r>
+              <a:rPr lang="sv-SE" dirty="0" err="1" smtClean="0"/>
+              <a:t>Closures</a:t>
+            </a:r>
+            <a:r>
+              <a:rPr lang="sv-SE" dirty="0" smtClean="0"/>
+              <a:t>: fördjupning</a:t>
             </a:r>
             <a:endParaRPr lang="sv-SE" dirty="0"/>
           </a:p>
@@ -9941,20 +10018,9 @@
           <a:bodyPr/>
           <a:lstStyle/>
           <a:p>
-            <a:pPr>
-              <a:buNone/>
-            </a:pPr>
-            <a:r>
-              <a:rPr lang="sv-SE" dirty="0" smtClean="0"/>
-              <a:t>[</a:t>
-            </a:r>
-            <a:r>
-              <a:rPr lang="sv-SE" dirty="0" err="1" smtClean="0"/>
-              <a:t>sumEvenNumbers.java</a:t>
-            </a:r>
-            <a:r>
-              <a:rPr lang="sv-SE" dirty="0" smtClean="0"/>
-              <a:t>]</a:t>
+            <a:r>
+              <a:rPr lang="sv-SE" dirty="0" smtClean="0"/>
+              <a:t>Exempel: Summera alla jämna tal från 1 till 10</a:t>
             </a:r>
             <a:endParaRPr lang="sv-SE" dirty="0"/>
           </a:p>
@@ -9998,13 +10064,13 @@
         <p:spPr/>
         <p:txBody>
           <a:bodyPr>
-            <a:normAutofit/>
+            <a:normAutofit fontScale="90000"/>
           </a:bodyPr>
           <a:lstStyle/>
           <a:p>
             <a:r>
               <a:rPr lang="sv-SE" dirty="0" smtClean="0"/>
-              <a:t>Multiplicera jämna tal 1 till 10</a:t>
+              <a:t>Summera alla jämna tal från 1 till 10</a:t>
             </a:r>
             <a:endParaRPr lang="sv-SE" dirty="0"/>
           </a:p>
@@ -10034,7 +10100,7 @@
             </a:r>
             <a:r>
               <a:rPr lang="sv-SE" dirty="0" err="1" smtClean="0"/>
-              <a:t>MultiplyEvenNumbers.java</a:t>
+              <a:t>sumEvenNumbers.java</a:t>
             </a:r>
             <a:r>
               <a:rPr lang="sv-SE" dirty="0" smtClean="0"/>
@@ -10053,6 +10119,90 @@
 </file>
 
 <file path=ppt/slides/slide53.xml><?xml version="1.0" encoding="utf-8"?>
+<p:sld xmlns:a="http://schemas.openxmlformats.org/drawingml/2006/main" xmlns:r="http://schemas.openxmlformats.org/officeDocument/2006/relationships" xmlns:p="http://schemas.openxmlformats.org/presentationml/2006/main">
+  <p:cSld>
+    <p:spTree>
+      <p:nvGrpSpPr>
+        <p:cNvPr id="1" name=""/>
+        <p:cNvGrpSpPr/>
+        <p:nvPr/>
+      </p:nvGrpSpPr>
+      <p:grpSpPr>
+        <a:xfrm>
+          <a:off x="0" y="0"/>
+          <a:ext cx="0" cy="0"/>
+          <a:chOff x="0" y="0"/>
+          <a:chExt cx="0" cy="0"/>
+        </a:xfrm>
+      </p:grpSpPr>
+      <p:sp>
+        <p:nvSpPr>
+          <p:cNvPr id="2" name="Rubrik 1"/>
+          <p:cNvSpPr>
+            <a:spLocks noGrp="1"/>
+          </p:cNvSpPr>
+          <p:nvPr>
+            <p:ph type="title"/>
+          </p:nvPr>
+        </p:nvSpPr>
+        <p:spPr/>
+        <p:txBody>
+          <a:bodyPr>
+            <a:normAutofit/>
+          </a:bodyPr>
+          <a:lstStyle/>
+          <a:p>
+            <a:r>
+              <a:rPr lang="sv-SE" dirty="0" smtClean="0"/>
+              <a:t>Multiplicera jämna tal 1 till 10</a:t>
+            </a:r>
+            <a:endParaRPr lang="sv-SE" dirty="0"/>
+          </a:p>
+        </p:txBody>
+      </p:sp>
+      <p:sp>
+        <p:nvSpPr>
+          <p:cNvPr id="3" name="Platshållare för innehåll 2"/>
+          <p:cNvSpPr>
+            <a:spLocks noGrp="1"/>
+          </p:cNvSpPr>
+          <p:nvPr>
+            <p:ph idx="1"/>
+          </p:nvPr>
+        </p:nvSpPr>
+        <p:spPr/>
+        <p:txBody>
+          <a:bodyPr/>
+          <a:lstStyle/>
+          <a:p>
+            <a:pPr>
+              <a:buNone/>
+            </a:pPr>
+            <a:r>
+              <a:rPr lang="sv-SE" dirty="0" smtClean="0"/>
+              <a:t>[</a:t>
+            </a:r>
+            <a:r>
+              <a:rPr lang="sv-SE" dirty="0" err="1" smtClean="0"/>
+              <a:t>MultiplyEvenNumbers.java</a:t>
+            </a:r>
+            <a:r>
+              <a:rPr lang="sv-SE" dirty="0" smtClean="0"/>
+              <a:t>]</a:t>
+            </a:r>
+            <a:endParaRPr lang="sv-SE" dirty="0"/>
+          </a:p>
+        </p:txBody>
+      </p:sp>
+    </p:spTree>
+  </p:cSld>
+  <p:clrMapOvr>
+    <a:masterClrMapping/>
+  </p:clrMapOvr>
+</p:sld>
+</file>
+
+<file path=ppt/slides/slide54.xml><?xml version="1.0" encoding="utf-8"?>
 <p:sld xmlns:a="http://schemas.openxmlformats.org/drawingml/2006/main" xmlns:r="http://schemas.openxmlformats.org/officeDocument/2006/relationships" xmlns:p="http://schemas.openxmlformats.org/presentationml/2006/main">
   <p:cSld>
     <p:spTree>
@@ -10169,7 +10319,7 @@
 </p:sld>
 </file>
 
-<file path=ppt/slides/slide54.xml><?xml version="1.0" encoding="utf-8"?>
+<file path=ppt/slides/slide55.xml><?xml version="1.0" encoding="utf-8"?>
 <p:sld xmlns:a="http://schemas.openxmlformats.org/drawingml/2006/main" xmlns:r="http://schemas.openxmlformats.org/officeDocument/2006/relationships" xmlns:p="http://schemas.openxmlformats.org/presentationml/2006/main">
   <p:cSld>
     <p:spTree>
@@ -10310,7 +10460,7 @@
 </p:sld>
 </file>
 
-<file path=ppt/slides/slide55.xml><?xml version="1.0" encoding="utf-8"?>
+<file path=ppt/slides/slide56.xml><?xml version="1.0" encoding="utf-8"?>
 <p:sld xmlns:a="http://schemas.openxmlformats.org/drawingml/2006/main" xmlns:r="http://schemas.openxmlformats.org/officeDocument/2006/relationships" xmlns:p="http://schemas.openxmlformats.org/presentationml/2006/main">
   <p:cSld>
     <p:spTree>
@@ -10432,7 +10582,7 @@
 </p:sld>
 </file>
 
-<file path=ppt/slides/slide56.xml><?xml version="1.0" encoding="utf-8"?>
+<file path=ppt/slides/slide57.xml><?xml version="1.0" encoding="utf-8"?>
 <p:sld xmlns:a="http://schemas.openxmlformats.org/drawingml/2006/main" xmlns:r="http://schemas.openxmlformats.org/officeDocument/2006/relationships" xmlns:p="http://schemas.openxmlformats.org/presentationml/2006/main">
   <p:cSld>
     <p:spTree>
@@ -10521,7 +10671,7 @@
 </p:sld>
 </file>
 
-<file path=ppt/slides/slide57.xml><?xml version="1.0" encoding="utf-8"?>
+<file path=ppt/slides/slide58.xml><?xml version="1.0" encoding="utf-8"?>
 <p:sld xmlns:a="http://schemas.openxmlformats.org/drawingml/2006/main" xmlns:r="http://schemas.openxmlformats.org/officeDocument/2006/relationships" xmlns:p="http://schemas.openxmlformats.org/presentationml/2006/main">
   <p:cSld>
     <p:spTree>
@@ -11022,82 +11172,19 @@
           <a:bodyPr/>
           <a:lstStyle/>
           <a:p>
-            <a:r>
-              <a:rPr lang="sv-SE" dirty="0" smtClean="0"/>
-              <a:t>Fördelar med dynamiska språk</a:t>
-            </a:r>
-            <a:endParaRPr lang="sv-SE" dirty="0"/>
-          </a:p>
-        </p:txBody>
-      </p:sp>
-      <p:sp>
-        <p:nvSpPr>
-          <p:cNvPr id="3" name="Platshållare för innehåll 2"/>
-          <p:cNvSpPr>
-            <a:spLocks noGrp="1"/>
-          </p:cNvSpPr>
-          <p:nvPr>
-            <p:ph idx="1"/>
-          </p:nvPr>
-        </p:nvSpPr>
-        <p:spPr>
-          <a:xfrm>
-            <a:off x="469900" y="1576388"/>
-            <a:ext cx="8229600" cy="2326872"/>
-          </a:xfrm>
-        </p:spPr>
-        <p:txBody>
-          <a:bodyPr/>
-          <a:lstStyle/>
-          <a:p>
-            <a:r>
-              <a:rPr lang="sv-SE" dirty="0" smtClean="0"/>
-              <a:t>Mindre kod att skriva</a:t>
-            </a:r>
-          </a:p>
-          <a:p>
-            <a:r>
-              <a:rPr lang="sv-SE" dirty="0" smtClean="0"/>
-              <a:t>Mindre kod att läsa</a:t>
-            </a:r>
-          </a:p>
-          <a:p>
-            <a:r>
-              <a:rPr lang="sv-SE" dirty="0" err="1" smtClean="0"/>
-              <a:t>Closures</a:t>
-            </a:r>
-            <a:r>
-              <a:rPr lang="sv-SE" dirty="0" smtClean="0"/>
-              <a:t> </a:t>
-            </a:r>
-          </a:p>
-          <a:p>
-            <a:r>
-              <a:rPr lang="sv-SE" dirty="0" smtClean="0"/>
-              <a:t>Metaprogrammering</a:t>
-            </a:r>
-          </a:p>
-          <a:p>
-            <a:pPr>
-              <a:buNone/>
-            </a:pPr>
-            <a:endParaRPr lang="sv-SE" dirty="0" smtClean="0"/>
-          </a:p>
-          <a:p>
-            <a:pPr>
-              <a:buNone/>
-            </a:pPr>
             <a:endParaRPr lang="sv-SE" dirty="0"/>
           </a:p>
         </p:txBody>
       </p:sp>
       <p:pic>
         <p:nvPicPr>
-          <p:cNvPr id="1030" name="Picture 6"/>
+          <p:cNvPr id="1026" name="Picture 2"/>
           <p:cNvPicPr>
-            <a:picLocks noChangeAspect="1" noChangeArrowheads="1"/>
+            <a:picLocks noGrp="1" noChangeAspect="1" noChangeArrowheads="1"/>
           </p:cNvPicPr>
-          <p:nvPr/>
+          <p:nvPr>
+            <p:ph idx="1"/>
+          </p:nvPr>
         </p:nvPicPr>
         <p:blipFill>
           <a:blip r:embed="rId2"/>
@@ -11108,8 +11195,8 @@
         </p:blipFill>
         <p:spPr bwMode="auto">
           <a:xfrm>
-            <a:off x="4902531" y="1221405"/>
-            <a:ext cx="2914650" cy="4524375"/>
+            <a:off x="3093630" y="2082778"/>
+            <a:ext cx="2381250" cy="2228850"/>
           </a:xfrm>
           <a:prstGeom prst="rect">
             <a:avLst/>
@@ -11124,18 +11211,99 @@
           <a:effectLst/>
         </p:spPr>
       </p:pic>
+      <p:graphicFrame>
+        <p:nvGraphicFramePr>
+          <p:cNvPr id="6" name="Tabell 5"/>
+          <p:cNvGraphicFramePr>
+            <a:graphicFrameLocks noGrp="1"/>
+          </p:cNvGraphicFramePr>
+          <p:nvPr/>
+        </p:nvGraphicFramePr>
+        <p:xfrm>
+          <a:off x="1576251" y="4466771"/>
+          <a:ext cx="5294812" cy="741680"/>
+        </p:xfrm>
+        <a:graphic>
+          <a:graphicData uri="http://schemas.openxmlformats.org/drawingml/2006/table">
+            <a:tbl>
+              <a:tblPr firstRow="1" bandRow="1">
+                <a:tableStyleId>{5C22544A-7EE6-4342-B048-85BDC9FD1C3A}</a:tableStyleId>
+              </a:tblPr>
+              <a:tblGrid>
+                <a:gridCol w="2647406"/>
+                <a:gridCol w="2647406"/>
+              </a:tblGrid>
+              <a:tr h="370840">
+                <a:tc>
+                  <a:txBody>
+                    <a:bodyPr/>
+                    <a:lstStyle/>
+                    <a:p>
+                      <a:r>
+                        <a:rPr lang="sv-SE" dirty="0" smtClean="0"/>
+                        <a:t>Dynamiska Språk</a:t>
+                      </a:r>
+                      <a:endParaRPr lang="sv-SE" dirty="0"/>
+                    </a:p>
+                  </a:txBody>
+                  <a:tcPr/>
+                </a:tc>
+                <a:tc>
+                  <a:txBody>
+                    <a:bodyPr/>
+                    <a:lstStyle/>
+                    <a:p>
+                      <a:pPr algn="r"/>
+                      <a:r>
+                        <a:rPr lang="sv-SE" dirty="0" smtClean="0"/>
+                        <a:t>Statiska språk</a:t>
+                      </a:r>
+                      <a:endParaRPr lang="sv-SE" dirty="0"/>
+                    </a:p>
+                  </a:txBody>
+                  <a:tcPr/>
+                </a:tc>
+              </a:tr>
+              <a:tr h="370840">
+                <a:tc>
+                  <a:txBody>
+                    <a:bodyPr/>
+                    <a:lstStyle/>
+                    <a:p>
+                      <a:r>
+                        <a:rPr lang="sv-SE" dirty="0" smtClean="0"/>
+                        <a:t>Människoprestanda</a:t>
+                      </a:r>
+                      <a:endParaRPr lang="sv-SE" dirty="0"/>
+                    </a:p>
+                  </a:txBody>
+                  <a:tcPr/>
+                </a:tc>
+                <a:tc>
+                  <a:txBody>
+                    <a:bodyPr/>
+                    <a:lstStyle/>
+                    <a:p>
+                      <a:pPr algn="r"/>
+                      <a:r>
+                        <a:rPr lang="sv-SE" dirty="0" smtClean="0"/>
+                        <a:t>Maskinprestanda</a:t>
+                      </a:r>
+                      <a:endParaRPr lang="sv-SE" dirty="0"/>
+                    </a:p>
+                  </a:txBody>
+                  <a:tcPr/>
+                </a:tc>
+              </a:tr>
+            </a:tbl>
+          </a:graphicData>
+        </a:graphic>
+      </p:graphicFrame>
     </p:spTree>
   </p:cSld>
   <p:clrMapOvr>
     <a:masterClrMapping/>
   </p:clrMapOvr>
-  <p:timing>
-    <p:tnLst>
-      <p:par>
-        <p:cTn id="1" dur="indefinite" restart="never" nodeType="tmRoot"/>
-      </p:par>
-    </p:tnLst>
-  </p:timing>
 </p:sld>
 </file>
 

</xml_diff>

<commit_message>
bytt sökväg till filen
</commit_message>
<xml_diff>
--- a/groovyseminarie/dokument/groovyseminarium_source_w_logo.pptx
+++ b/groovyseminarie/dokument/groovyseminarium_source_w_logo.pptx
@@ -9346,7 +9346,7 @@
         </p:spPr>
         <p:txBody>
           <a:bodyPr vert="horz" lIns="91440" tIns="45720" rIns="91440" bIns="45720" rtlCol="0">
-            <a:normAutofit/>
+            <a:normAutofit fontScale="92500"/>
           </a:bodyPr>
           <a:lstStyle/>
           <a:p>
@@ -9357,8 +9357,32 @@
             </a:pPr>
             <a:r>
               <a:rPr lang="sv-SE" sz="3200" dirty="0" smtClean="0"/>
-              <a:t>Hur läser man en fil i Java?</a:t>
-            </a:r>
+              <a:t>Skriv ett javaprogram som läser en textfil (</a:t>
+            </a:r>
+            <a:r>
+              <a:rPr lang="sv-SE" sz="3200" dirty="0" err="1" smtClean="0"/>
+              <a:t>tex</a:t>
+            </a:r>
+            <a:r>
+              <a:rPr lang="sv-SE" sz="3200" dirty="0" smtClean="0"/>
+              <a:t> </a:t>
+            </a:r>
+            <a:r>
+              <a:rPr lang="sv-SE" sz="3200" smtClean="0"/>
+              <a:t>C:/text.txt</a:t>
+            </a:r>
+            <a:r>
+              <a:rPr lang="sv-SE" sz="3200" dirty="0" smtClean="0"/>
+              <a:t>) och skriver ut all text på skärmen.</a:t>
+            </a:r>
+          </a:p>
+          <a:p>
+            <a:pPr marL="342900" indent="-342900">
+              <a:spcBef>
+                <a:spcPct val="20000"/>
+              </a:spcBef>
+            </a:pPr>
+            <a:endParaRPr lang="sv-SE" sz="3200" dirty="0" smtClean="0"/>
           </a:p>
           <a:p>
             <a:pPr marL="342900" marR="0" lvl="0" indent="-342900" algn="l" defTabSz="914400" rtl="0" eaLnBrk="1" fontAlgn="auto" latinLnBrk="0" hangingPunct="1">
@@ -10834,11 +10858,7 @@
             </a:r>
             <a:r>
               <a:rPr lang="sv-SE" dirty="0" smtClean="0"/>
-              <a:t> är helt kompatibelt </a:t>
-            </a:r>
-            <a:r>
-              <a:rPr lang="sv-SE" dirty="0" smtClean="0"/>
-              <a:t>med Java</a:t>
+              <a:t> är helt kompatibelt med Java</a:t>
             </a:r>
           </a:p>
           <a:p>
@@ -11893,13 +11913,8 @@
           <a:p>
             <a:r>
               <a:rPr lang="sv-SE" dirty="0" smtClean="0"/>
-              <a:t>Helt kompatibelt med </a:t>
-            </a:r>
-            <a:r>
-              <a:rPr lang="sv-SE" dirty="0" smtClean="0"/>
-              <a:t>Java</a:t>
-            </a:r>
-            <a:endParaRPr lang="sv-SE" dirty="0" smtClean="0"/>
+              <a:t>Helt kompatibelt med Java</a:t>
+            </a:r>
           </a:p>
         </p:txBody>
       </p:sp>
@@ -12063,13 +12078,8 @@
           <a:p>
             <a:r>
               <a:rPr lang="sv-SE" dirty="0" smtClean="0"/>
-              <a:t>Underlättar Javautveckling på ett antal </a:t>
-            </a:r>
-            <a:r>
-              <a:rPr lang="sv-SE" dirty="0" smtClean="0"/>
-              <a:t>sätt</a:t>
-            </a:r>
-            <a:endParaRPr lang="sv-SE" dirty="0" smtClean="0"/>
+              <a:t>Underlättar Javautveckling på ett antal sätt</a:t>
+            </a:r>
           </a:p>
         </p:txBody>
       </p:sp>

</xml_diff>